<commit_message>
Updating the DeveloperGuide, UserGuide and diagrams. - Got rid of all the black question marks - Edited addressBook to TaskBook - updating the commands list
</commit_message>
<xml_diff>
--- a/docs/diagrams/Diagrams.pptx
+++ b/docs/diagrams/Diagrams.pptx
@@ -115,6 +115,22 @@
       </a:defRPr>
     </a:lvl9pPr>
   </p:defaultTextStyle>
+  <p:extLst>
+    <p:ext uri="{EFAFB233-063F-42B5-8137-9DF3F51BA10A}">
+      <p15:sldGuideLst xmlns:p15="http://schemas.microsoft.com/office/powerpoint/2012/main">
+        <p15:guide id="1" orient="horz" pos="1488">
+          <p15:clr>
+            <a:srgbClr val="A4A3A4"/>
+          </p15:clr>
+        </p15:guide>
+        <p15:guide id="2" pos="2880">
+          <p15:clr>
+            <a:srgbClr val="A4A3A4"/>
+          </p15:clr>
+        </p15:guide>
+      </p15:sldGuideLst>
+    </p:ext>
+  </p:extLst>
 </p:presentation>
 </file>
 
@@ -200,7 +216,7 @@
           <a:p>
             <a:fld id="{F5CC4B3F-88C1-4FFA-B1B6-F41C21DC6924}" type="datetimeFigureOut">
               <a:rPr lang="en-US" smtClean="0"/>
-              <a:t>9/30/2016</a:t>
+              <a:t>10/21/2016</a:t>
             </a:fld>
             <a:endParaRPr lang="en-US"/>
           </a:p>
@@ -264,38 +280,37 @@
           <a:p>
             <a:pPr lvl="0"/>
             <a:r>
-              <a:rPr lang="en-US" smtClean="0"/>
+              <a:rPr lang="en-US"/>
               <a:t>Click to edit Master text styles</a:t>
             </a:r>
           </a:p>
           <a:p>
             <a:pPr lvl="1"/>
             <a:r>
-              <a:rPr lang="en-US" smtClean="0"/>
+              <a:rPr lang="en-US"/>
               <a:t>Second level</a:t>
             </a:r>
           </a:p>
           <a:p>
             <a:pPr lvl="2"/>
             <a:r>
-              <a:rPr lang="en-US" smtClean="0"/>
+              <a:rPr lang="en-US"/>
               <a:t>Third level</a:t>
             </a:r>
           </a:p>
           <a:p>
             <a:pPr lvl="3"/>
             <a:r>
-              <a:rPr lang="en-US" smtClean="0"/>
+              <a:rPr lang="en-US"/>
               <a:t>Fourth level</a:t>
             </a:r>
           </a:p>
           <a:p>
             <a:pPr lvl="4"/>
             <a:r>
-              <a:rPr lang="en-US" smtClean="0"/>
+              <a:rPr lang="en-US"/>
               <a:t>Fifth level</a:t>
             </a:r>
-            <a:endParaRPr lang="en-US"/>
           </a:p>
         </p:txBody>
       </p:sp>
@@ -506,10 +521,9 @@
           <a:lstStyle/>
           <a:p>
             <a:r>
-              <a:rPr lang="en-US" smtClean="0"/>
+              <a:rPr lang="en-US"/>
               <a:t>Click to edit Master title style</a:t>
             </a:r>
-            <a:endParaRPr lang="en-US"/>
           </a:p>
         </p:txBody>
       </p:sp>
@@ -625,10 +639,9 @@
           </a:lstStyle>
           <a:p>
             <a:r>
-              <a:rPr lang="en-US" smtClean="0"/>
+              <a:rPr lang="en-US"/>
               <a:t>Click to edit Master subtitle style</a:t>
             </a:r>
-            <a:endParaRPr lang="en-US"/>
           </a:p>
         </p:txBody>
       </p:sp>
@@ -649,7 +662,7 @@
           <a:p>
             <a:fld id="{78C97017-6FC3-485B-9764-EAC9E56C1D49}" type="datetimeFigureOut">
               <a:rPr lang="en-US" smtClean="0"/>
-              <a:t>9/30/2016</a:t>
+              <a:t>10/21/2016</a:t>
             </a:fld>
             <a:endParaRPr lang="en-US"/>
           </a:p>
@@ -743,10 +756,9 @@
           <a:lstStyle/>
           <a:p>
             <a:r>
-              <a:rPr lang="en-US" smtClean="0"/>
+              <a:rPr lang="en-US"/>
               <a:t>Click to edit Master title style</a:t>
             </a:r>
-            <a:endParaRPr lang="en-US"/>
           </a:p>
         </p:txBody>
       </p:sp>
@@ -767,38 +779,37 @@
           <a:p>
             <a:pPr lvl="0"/>
             <a:r>
-              <a:rPr lang="en-US" smtClean="0"/>
+              <a:rPr lang="en-US"/>
               <a:t>Click to edit Master text styles</a:t>
             </a:r>
           </a:p>
           <a:p>
             <a:pPr lvl="1"/>
             <a:r>
-              <a:rPr lang="en-US" smtClean="0"/>
+              <a:rPr lang="en-US"/>
               <a:t>Second level</a:t>
             </a:r>
           </a:p>
           <a:p>
             <a:pPr lvl="2"/>
             <a:r>
-              <a:rPr lang="en-US" smtClean="0"/>
+              <a:rPr lang="en-US"/>
               <a:t>Third level</a:t>
             </a:r>
           </a:p>
           <a:p>
             <a:pPr lvl="3"/>
             <a:r>
-              <a:rPr lang="en-US" smtClean="0"/>
+              <a:rPr lang="en-US"/>
               <a:t>Fourth level</a:t>
             </a:r>
           </a:p>
           <a:p>
             <a:pPr lvl="4"/>
             <a:r>
-              <a:rPr lang="en-US" smtClean="0"/>
+              <a:rPr lang="en-US"/>
               <a:t>Fifth level</a:t>
             </a:r>
-            <a:endParaRPr lang="en-US"/>
           </a:p>
         </p:txBody>
       </p:sp>
@@ -819,7 +830,7 @@
           <a:p>
             <a:fld id="{78C97017-6FC3-485B-9764-EAC9E56C1D49}" type="datetimeFigureOut">
               <a:rPr lang="en-US" smtClean="0"/>
-              <a:t>9/30/2016</a:t>
+              <a:t>10/21/2016</a:t>
             </a:fld>
             <a:endParaRPr lang="en-US"/>
           </a:p>
@@ -918,10 +929,9 @@
           <a:lstStyle/>
           <a:p>
             <a:r>
-              <a:rPr lang="en-US" smtClean="0"/>
+              <a:rPr lang="en-US"/>
               <a:t>Click to edit Master title style</a:t>
             </a:r>
-            <a:endParaRPr lang="en-US"/>
           </a:p>
         </p:txBody>
       </p:sp>
@@ -947,38 +957,37 @@
           <a:p>
             <a:pPr lvl="0"/>
             <a:r>
-              <a:rPr lang="en-US" smtClean="0"/>
+              <a:rPr lang="en-US"/>
               <a:t>Click to edit Master text styles</a:t>
             </a:r>
           </a:p>
           <a:p>
             <a:pPr lvl="1"/>
             <a:r>
-              <a:rPr lang="en-US" smtClean="0"/>
+              <a:rPr lang="en-US"/>
               <a:t>Second level</a:t>
             </a:r>
           </a:p>
           <a:p>
             <a:pPr lvl="2"/>
             <a:r>
-              <a:rPr lang="en-US" smtClean="0"/>
+              <a:rPr lang="en-US"/>
               <a:t>Third level</a:t>
             </a:r>
           </a:p>
           <a:p>
             <a:pPr lvl="3"/>
             <a:r>
-              <a:rPr lang="en-US" smtClean="0"/>
+              <a:rPr lang="en-US"/>
               <a:t>Fourth level</a:t>
             </a:r>
           </a:p>
           <a:p>
             <a:pPr lvl="4"/>
             <a:r>
-              <a:rPr lang="en-US" smtClean="0"/>
+              <a:rPr lang="en-US"/>
               <a:t>Fifth level</a:t>
             </a:r>
-            <a:endParaRPr lang="en-US"/>
           </a:p>
         </p:txBody>
       </p:sp>
@@ -999,7 +1008,7 @@
           <a:p>
             <a:fld id="{78C97017-6FC3-485B-9764-EAC9E56C1D49}" type="datetimeFigureOut">
               <a:rPr lang="en-US" smtClean="0"/>
-              <a:t>9/30/2016</a:t>
+              <a:t>10/21/2016</a:t>
             </a:fld>
             <a:endParaRPr lang="en-US"/>
           </a:p>
@@ -1093,10 +1102,9 @@
           <a:lstStyle/>
           <a:p>
             <a:r>
-              <a:rPr lang="en-US" smtClean="0"/>
+              <a:rPr lang="en-US"/>
               <a:t>Click to edit Master title style</a:t>
             </a:r>
-            <a:endParaRPr lang="en-US"/>
           </a:p>
         </p:txBody>
       </p:sp>
@@ -1117,38 +1125,37 @@
           <a:p>
             <a:pPr lvl="0"/>
             <a:r>
-              <a:rPr lang="en-US" smtClean="0"/>
+              <a:rPr lang="en-US"/>
               <a:t>Click to edit Master text styles</a:t>
             </a:r>
           </a:p>
           <a:p>
             <a:pPr lvl="1"/>
             <a:r>
-              <a:rPr lang="en-US" smtClean="0"/>
+              <a:rPr lang="en-US"/>
               <a:t>Second level</a:t>
             </a:r>
           </a:p>
           <a:p>
             <a:pPr lvl="2"/>
             <a:r>
-              <a:rPr lang="en-US" smtClean="0"/>
+              <a:rPr lang="en-US"/>
               <a:t>Third level</a:t>
             </a:r>
           </a:p>
           <a:p>
             <a:pPr lvl="3"/>
             <a:r>
-              <a:rPr lang="en-US" smtClean="0"/>
+              <a:rPr lang="en-US"/>
               <a:t>Fourth level</a:t>
             </a:r>
           </a:p>
           <a:p>
             <a:pPr lvl="4"/>
             <a:r>
-              <a:rPr lang="en-US" smtClean="0"/>
+              <a:rPr lang="en-US"/>
               <a:t>Fifth level</a:t>
             </a:r>
-            <a:endParaRPr lang="en-US"/>
           </a:p>
         </p:txBody>
       </p:sp>
@@ -1169,7 +1176,7 @@
           <a:p>
             <a:fld id="{78C97017-6FC3-485B-9764-EAC9E56C1D49}" type="datetimeFigureOut">
               <a:rPr lang="en-US" smtClean="0"/>
-              <a:t>9/30/2016</a:t>
+              <a:t>10/21/2016</a:t>
             </a:fld>
             <a:endParaRPr lang="en-US"/>
           </a:p>
@@ -1272,10 +1279,9 @@
           </a:lstStyle>
           <a:p>
             <a:r>
-              <a:rPr lang="en-US" smtClean="0"/>
+              <a:rPr lang="en-US"/>
               <a:t>Click to edit Master title style</a:t>
             </a:r>
-            <a:endParaRPr lang="en-US"/>
           </a:p>
         </p:txBody>
       </p:sp>
@@ -1392,7 +1398,7 @@
           <a:p>
             <a:pPr lvl="0"/>
             <a:r>
-              <a:rPr lang="en-US" smtClean="0"/>
+              <a:rPr lang="en-US"/>
               <a:t>Click to edit Master text styles</a:t>
             </a:r>
           </a:p>
@@ -1415,7 +1421,7 @@
           <a:p>
             <a:fld id="{78C97017-6FC3-485B-9764-EAC9E56C1D49}" type="datetimeFigureOut">
               <a:rPr lang="en-US" smtClean="0"/>
-              <a:t>9/30/2016</a:t>
+              <a:t>10/21/2016</a:t>
             </a:fld>
             <a:endParaRPr lang="en-US"/>
           </a:p>
@@ -1509,10 +1515,9 @@
           <a:lstStyle/>
           <a:p>
             <a:r>
-              <a:rPr lang="en-US" smtClean="0"/>
+              <a:rPr lang="en-US"/>
               <a:t>Click to edit Master title style</a:t>
             </a:r>
-            <a:endParaRPr lang="en-US"/>
           </a:p>
         </p:txBody>
       </p:sp>
@@ -1566,38 +1571,37 @@
           <a:p>
             <a:pPr lvl="0"/>
             <a:r>
-              <a:rPr lang="en-US" smtClean="0"/>
+              <a:rPr lang="en-US"/>
               <a:t>Click to edit Master text styles</a:t>
             </a:r>
           </a:p>
           <a:p>
             <a:pPr lvl="1"/>
             <a:r>
-              <a:rPr lang="en-US" smtClean="0"/>
+              <a:rPr lang="en-US"/>
               <a:t>Second level</a:t>
             </a:r>
           </a:p>
           <a:p>
             <a:pPr lvl="2"/>
             <a:r>
-              <a:rPr lang="en-US" smtClean="0"/>
+              <a:rPr lang="en-US"/>
               <a:t>Third level</a:t>
             </a:r>
           </a:p>
           <a:p>
             <a:pPr lvl="3"/>
             <a:r>
-              <a:rPr lang="en-US" smtClean="0"/>
+              <a:rPr lang="en-US"/>
               <a:t>Fourth level</a:t>
             </a:r>
           </a:p>
           <a:p>
             <a:pPr lvl="4"/>
             <a:r>
-              <a:rPr lang="en-US" smtClean="0"/>
+              <a:rPr lang="en-US"/>
               <a:t>Fifth level</a:t>
             </a:r>
-            <a:endParaRPr lang="en-US"/>
           </a:p>
         </p:txBody>
       </p:sp>
@@ -1651,38 +1655,37 @@
           <a:p>
             <a:pPr lvl="0"/>
             <a:r>
-              <a:rPr lang="en-US" smtClean="0"/>
+              <a:rPr lang="en-US"/>
               <a:t>Click to edit Master text styles</a:t>
             </a:r>
           </a:p>
           <a:p>
             <a:pPr lvl="1"/>
             <a:r>
-              <a:rPr lang="en-US" smtClean="0"/>
+              <a:rPr lang="en-US"/>
               <a:t>Second level</a:t>
             </a:r>
           </a:p>
           <a:p>
             <a:pPr lvl="2"/>
             <a:r>
-              <a:rPr lang="en-US" smtClean="0"/>
+              <a:rPr lang="en-US"/>
               <a:t>Third level</a:t>
             </a:r>
           </a:p>
           <a:p>
             <a:pPr lvl="3"/>
             <a:r>
-              <a:rPr lang="en-US" smtClean="0"/>
+              <a:rPr lang="en-US"/>
               <a:t>Fourth level</a:t>
             </a:r>
           </a:p>
           <a:p>
             <a:pPr lvl="4"/>
             <a:r>
-              <a:rPr lang="en-US" smtClean="0"/>
+              <a:rPr lang="en-US"/>
               <a:t>Fifth level</a:t>
             </a:r>
-            <a:endParaRPr lang="en-US"/>
           </a:p>
         </p:txBody>
       </p:sp>
@@ -1703,7 +1706,7 @@
           <a:p>
             <a:fld id="{78C97017-6FC3-485B-9764-EAC9E56C1D49}" type="datetimeFigureOut">
               <a:rPr lang="en-US" smtClean="0"/>
-              <a:t>9/30/2016</a:t>
+              <a:t>10/21/2016</a:t>
             </a:fld>
             <a:endParaRPr lang="en-US"/>
           </a:p>
@@ -1801,10 +1804,9 @@
           </a:lstStyle>
           <a:p>
             <a:r>
-              <a:rPr lang="en-US" smtClean="0"/>
+              <a:rPr lang="en-US"/>
               <a:t>Click to edit Master title style</a:t>
             </a:r>
-            <a:endParaRPr lang="en-US"/>
           </a:p>
         </p:txBody>
       </p:sp>
@@ -1867,7 +1869,7 @@
           <a:p>
             <a:pPr lvl="0"/>
             <a:r>
-              <a:rPr lang="en-US" smtClean="0"/>
+              <a:rPr lang="en-US"/>
               <a:t>Click to edit Master text styles</a:t>
             </a:r>
           </a:p>
@@ -1923,38 +1925,37 @@
           <a:p>
             <a:pPr lvl="0"/>
             <a:r>
-              <a:rPr lang="en-US" smtClean="0"/>
+              <a:rPr lang="en-US"/>
               <a:t>Click to edit Master text styles</a:t>
             </a:r>
           </a:p>
           <a:p>
             <a:pPr lvl="1"/>
             <a:r>
-              <a:rPr lang="en-US" smtClean="0"/>
+              <a:rPr lang="en-US"/>
               <a:t>Second level</a:t>
             </a:r>
           </a:p>
           <a:p>
             <a:pPr lvl="2"/>
             <a:r>
-              <a:rPr lang="en-US" smtClean="0"/>
+              <a:rPr lang="en-US"/>
               <a:t>Third level</a:t>
             </a:r>
           </a:p>
           <a:p>
             <a:pPr lvl="3"/>
             <a:r>
-              <a:rPr lang="en-US" smtClean="0"/>
+              <a:rPr lang="en-US"/>
               <a:t>Fourth level</a:t>
             </a:r>
           </a:p>
           <a:p>
             <a:pPr lvl="4"/>
             <a:r>
-              <a:rPr lang="en-US" smtClean="0"/>
+              <a:rPr lang="en-US"/>
               <a:t>Fifth level</a:t>
             </a:r>
-            <a:endParaRPr lang="en-US"/>
           </a:p>
         </p:txBody>
       </p:sp>
@@ -2017,7 +2018,7 @@
           <a:p>
             <a:pPr lvl="0"/>
             <a:r>
-              <a:rPr lang="en-US" smtClean="0"/>
+              <a:rPr lang="en-US"/>
               <a:t>Click to edit Master text styles</a:t>
             </a:r>
           </a:p>
@@ -2073,38 +2074,37 @@
           <a:p>
             <a:pPr lvl="0"/>
             <a:r>
-              <a:rPr lang="en-US" smtClean="0"/>
+              <a:rPr lang="en-US"/>
               <a:t>Click to edit Master text styles</a:t>
             </a:r>
           </a:p>
           <a:p>
             <a:pPr lvl="1"/>
             <a:r>
-              <a:rPr lang="en-US" smtClean="0"/>
+              <a:rPr lang="en-US"/>
               <a:t>Second level</a:t>
             </a:r>
           </a:p>
           <a:p>
             <a:pPr lvl="2"/>
             <a:r>
-              <a:rPr lang="en-US" smtClean="0"/>
+              <a:rPr lang="en-US"/>
               <a:t>Third level</a:t>
             </a:r>
           </a:p>
           <a:p>
             <a:pPr lvl="3"/>
             <a:r>
-              <a:rPr lang="en-US" smtClean="0"/>
+              <a:rPr lang="en-US"/>
               <a:t>Fourth level</a:t>
             </a:r>
           </a:p>
           <a:p>
             <a:pPr lvl="4"/>
             <a:r>
-              <a:rPr lang="en-US" smtClean="0"/>
+              <a:rPr lang="en-US"/>
               <a:t>Fifth level</a:t>
             </a:r>
-            <a:endParaRPr lang="en-US"/>
           </a:p>
         </p:txBody>
       </p:sp>
@@ -2125,7 +2125,7 @@
           <a:p>
             <a:fld id="{78C97017-6FC3-485B-9764-EAC9E56C1D49}" type="datetimeFigureOut">
               <a:rPr lang="en-US" smtClean="0"/>
-              <a:t>9/30/2016</a:t>
+              <a:t>10/21/2016</a:t>
             </a:fld>
             <a:endParaRPr lang="en-US"/>
           </a:p>
@@ -2219,10 +2219,9 @@
           <a:lstStyle/>
           <a:p>
             <a:r>
-              <a:rPr lang="en-US" smtClean="0"/>
+              <a:rPr lang="en-US"/>
               <a:t>Click to edit Master title style</a:t>
             </a:r>
-            <a:endParaRPr lang="en-US"/>
           </a:p>
         </p:txBody>
       </p:sp>
@@ -2243,7 +2242,7 @@
           <a:p>
             <a:fld id="{78C97017-6FC3-485B-9764-EAC9E56C1D49}" type="datetimeFigureOut">
               <a:rPr lang="en-US" smtClean="0"/>
-              <a:t>9/30/2016</a:t>
+              <a:t>10/21/2016</a:t>
             </a:fld>
             <a:endParaRPr lang="en-US"/>
           </a:p>
@@ -2338,7 +2337,7 @@
           <a:p>
             <a:fld id="{78C97017-6FC3-485B-9764-EAC9E56C1D49}" type="datetimeFigureOut">
               <a:rPr lang="en-US" smtClean="0"/>
-              <a:t>9/30/2016</a:t>
+              <a:t>10/21/2016</a:t>
             </a:fld>
             <a:endParaRPr lang="en-US"/>
           </a:p>
@@ -2441,10 +2440,9 @@
           </a:lstStyle>
           <a:p>
             <a:r>
-              <a:rPr lang="en-US" smtClean="0"/>
+              <a:rPr lang="en-US"/>
               <a:t>Click to edit Master title style</a:t>
             </a:r>
-            <a:endParaRPr lang="en-US"/>
           </a:p>
         </p:txBody>
       </p:sp>
@@ -2498,38 +2496,37 @@
           <a:p>
             <a:pPr lvl="0"/>
             <a:r>
-              <a:rPr lang="en-US" smtClean="0"/>
+              <a:rPr lang="en-US"/>
               <a:t>Click to edit Master text styles</a:t>
             </a:r>
           </a:p>
           <a:p>
             <a:pPr lvl="1"/>
             <a:r>
-              <a:rPr lang="en-US" smtClean="0"/>
+              <a:rPr lang="en-US"/>
               <a:t>Second level</a:t>
             </a:r>
           </a:p>
           <a:p>
             <a:pPr lvl="2"/>
             <a:r>
-              <a:rPr lang="en-US" smtClean="0"/>
+              <a:rPr lang="en-US"/>
               <a:t>Third level</a:t>
             </a:r>
           </a:p>
           <a:p>
             <a:pPr lvl="3"/>
             <a:r>
-              <a:rPr lang="en-US" smtClean="0"/>
+              <a:rPr lang="en-US"/>
               <a:t>Fourth level</a:t>
             </a:r>
           </a:p>
           <a:p>
             <a:pPr lvl="4"/>
             <a:r>
-              <a:rPr lang="en-US" smtClean="0"/>
+              <a:rPr lang="en-US"/>
               <a:t>Fifth level</a:t>
             </a:r>
-            <a:endParaRPr lang="en-US"/>
           </a:p>
         </p:txBody>
       </p:sp>
@@ -2592,7 +2589,7 @@
           <a:p>
             <a:pPr lvl="0"/>
             <a:r>
-              <a:rPr lang="en-US" smtClean="0"/>
+              <a:rPr lang="en-US"/>
               <a:t>Click to edit Master text styles</a:t>
             </a:r>
           </a:p>
@@ -2615,7 +2612,7 @@
           <a:p>
             <a:fld id="{78C97017-6FC3-485B-9764-EAC9E56C1D49}" type="datetimeFigureOut">
               <a:rPr lang="en-US" smtClean="0"/>
-              <a:t>9/30/2016</a:t>
+              <a:t>10/21/2016</a:t>
             </a:fld>
             <a:endParaRPr lang="en-US"/>
           </a:p>
@@ -2718,10 +2715,9 @@
           </a:lstStyle>
           <a:p>
             <a:r>
-              <a:rPr lang="en-US" smtClean="0"/>
+              <a:rPr lang="en-US"/>
               <a:t>Click to edit Master title style</a:t>
             </a:r>
-            <a:endParaRPr lang="en-US"/>
           </a:p>
         </p:txBody>
       </p:sp>
@@ -2845,7 +2841,7 @@
           <a:p>
             <a:pPr lvl="0"/>
             <a:r>
-              <a:rPr lang="en-US" smtClean="0"/>
+              <a:rPr lang="en-US"/>
               <a:t>Click to edit Master text styles</a:t>
             </a:r>
           </a:p>
@@ -2868,7 +2864,7 @@
           <a:p>
             <a:fld id="{78C97017-6FC3-485B-9764-EAC9E56C1D49}" type="datetimeFigureOut">
               <a:rPr lang="en-US" smtClean="0"/>
-              <a:t>9/30/2016</a:t>
+              <a:t>10/21/2016</a:t>
             </a:fld>
             <a:endParaRPr lang="en-US"/>
           </a:p>
@@ -2977,10 +2973,9 @@
           <a:lstStyle/>
           <a:p>
             <a:r>
-              <a:rPr lang="en-US" smtClean="0"/>
+              <a:rPr lang="en-US"/>
               <a:t>Click to edit Master title style</a:t>
             </a:r>
-            <a:endParaRPr lang="en-US"/>
           </a:p>
         </p:txBody>
       </p:sp>
@@ -3011,38 +3006,37 @@
           <a:p>
             <a:pPr lvl="0"/>
             <a:r>
-              <a:rPr lang="en-US" smtClean="0"/>
+              <a:rPr lang="en-US"/>
               <a:t>Click to edit Master text styles</a:t>
             </a:r>
           </a:p>
           <a:p>
             <a:pPr lvl="1"/>
             <a:r>
-              <a:rPr lang="en-US" smtClean="0"/>
+              <a:rPr lang="en-US"/>
               <a:t>Second level</a:t>
             </a:r>
           </a:p>
           <a:p>
             <a:pPr lvl="2"/>
             <a:r>
-              <a:rPr lang="en-US" smtClean="0"/>
+              <a:rPr lang="en-US"/>
               <a:t>Third level</a:t>
             </a:r>
           </a:p>
           <a:p>
             <a:pPr lvl="3"/>
             <a:r>
-              <a:rPr lang="en-US" smtClean="0"/>
+              <a:rPr lang="en-US"/>
               <a:t>Fourth level</a:t>
             </a:r>
           </a:p>
           <a:p>
             <a:pPr lvl="4"/>
             <a:r>
-              <a:rPr lang="en-US" smtClean="0"/>
+              <a:rPr lang="en-US"/>
               <a:t>Fifth level</a:t>
             </a:r>
-            <a:endParaRPr lang="en-US"/>
           </a:p>
         </p:txBody>
       </p:sp>
@@ -3081,7 +3075,7 @@
           <a:p>
             <a:fld id="{78C97017-6FC3-485B-9764-EAC9E56C1D49}" type="datetimeFigureOut">
               <a:rPr lang="en-US" smtClean="0"/>
-              <a:t>9/30/2016</a:t>
+              <a:t>10/21/2016</a:t>
             </a:fld>
             <a:endParaRPr lang="en-US"/>
           </a:p>
@@ -3472,14 +3466,13 @@
           <a:lstStyle/>
           <a:p>
             <a:r>
-              <a:rPr lang="en-US" dirty="0" err="1" smtClean="0"/>
-              <a:t>AddressBook</a:t>
-            </a:r>
-            <a:r>
-              <a:rPr lang="en-US" dirty="0" smtClean="0"/>
+              <a:rPr lang="en-US" dirty="0" err="1"/>
+              <a:t>TaskBook</a:t>
+            </a:r>
+            <a:r>
+              <a:rPr lang="en-US" dirty="0"/>
               <a:t> – Level 4</a:t>
             </a:r>
-            <a:endParaRPr lang="en-US" dirty="0"/>
           </a:p>
         </p:txBody>
       </p:sp>
@@ -3499,10 +3492,9 @@
           <a:lstStyle/>
           <a:p>
             <a:r>
-              <a:rPr lang="en-US" dirty="0" smtClean="0"/>
+              <a:rPr lang="en-US" dirty="0"/>
               <a:t>Diagrams</a:t>
             </a:r>
-            <a:endParaRPr lang="en-US" dirty="0"/>
           </a:p>
         </p:txBody>
       </p:sp>
@@ -3634,7 +3626,7 @@
           <a:p>
             <a:pPr algn="ctr"/>
             <a:r>
-              <a:rPr lang="en-US" sz="1600" dirty="0" smtClean="0">
+              <a:rPr lang="en-US" sz="1600" dirty="0">
                 <a:solidFill>
                   <a:schemeClr val="bg1"/>
                 </a:solidFill>
@@ -3693,7 +3685,7 @@
           <a:p>
             <a:pPr algn="ctr"/>
             <a:r>
-              <a:rPr lang="en-US" sz="1600" dirty="0" smtClean="0">
+              <a:rPr lang="en-US" sz="1600" dirty="0">
                 <a:solidFill>
                   <a:schemeClr val="bg1"/>
                 </a:solidFill>
@@ -3756,7 +3748,7 @@
           <a:p>
             <a:pPr algn="ctr"/>
             <a:r>
-              <a:rPr lang="en-US" sz="1600" dirty="0" smtClean="0">
+              <a:rPr lang="en-US" sz="1600" dirty="0">
                 <a:solidFill>
                   <a:schemeClr val="bg1"/>
                 </a:solidFill>
@@ -3815,7 +3807,7 @@
           <a:p>
             <a:pPr algn="ctr"/>
             <a:r>
-              <a:rPr lang="en-US" sz="1600" dirty="0" smtClean="0">
+              <a:rPr lang="en-US" sz="1600" dirty="0">
                 <a:solidFill>
                   <a:schemeClr val="bg1"/>
                 </a:solidFill>
@@ -4401,7 +4393,7 @@
           <a:p>
             <a:pPr algn="ctr"/>
             <a:r>
-              <a:rPr lang="en-US" sz="1600" dirty="0" smtClean="0">
+              <a:rPr lang="en-US" sz="1600" dirty="0">
                 <a:solidFill>
                   <a:schemeClr val="bg1"/>
                 </a:solidFill>
@@ -4752,7 +4744,7 @@
           <a:p>
             <a:pPr algn="ctr"/>
             <a:r>
-              <a:rPr lang="en-US" sz="1600" dirty="0" smtClean="0">
+              <a:rPr lang="en-US" sz="1600" dirty="0">
                 <a:solidFill>
                   <a:schemeClr val="bg1"/>
                 </a:solidFill>
@@ -4760,25 +4752,20 @@
               <a:t>Logs</a:t>
             </a:r>
             <a:br>
-              <a:rPr lang="en-US" sz="1600" dirty="0" smtClean="0">
+              <a:rPr lang="en-US" sz="1600" dirty="0">
                 <a:solidFill>
                   <a:schemeClr val="bg1"/>
                 </a:solidFill>
               </a:rPr>
             </a:br>
             <a:r>
-              <a:rPr lang="en-US" sz="1600" dirty="0" smtClean="0">
+              <a:rPr lang="en-US" sz="1600" dirty="0">
                 <a:solidFill>
                   <a:schemeClr val="bg1"/>
                 </a:solidFill>
               </a:rPr>
               <a:t>Center</a:t>
             </a:r>
-            <a:endParaRPr lang="en-US" sz="1600" dirty="0">
-              <a:solidFill>
-                <a:schemeClr val="bg1"/>
-              </a:solidFill>
-            </a:endParaRPr>
           </a:p>
         </p:txBody>
       </p:sp>
@@ -4935,7 +4922,7 @@
           <a:p>
             <a:pPr algn="ctr"/>
             <a:r>
-              <a:rPr lang="en-US" sz="1600" dirty="0" smtClean="0">
+              <a:rPr lang="en-US" sz="1600" dirty="0">
                 <a:solidFill>
                   <a:schemeClr val="bg1"/>
                 </a:solidFill>
@@ -5299,7 +5286,7 @@
           <a:p>
             <a:pPr algn="ctr"/>
             <a:r>
-              <a:rPr lang="en-US" sz="1600" dirty="0" smtClean="0">
+              <a:rPr lang="en-US" sz="1600" dirty="0">
                 <a:solidFill>
                   <a:schemeClr val="bg1"/>
                 </a:solidFill>
@@ -5446,7 +5433,7 @@
           <a:p>
             <a:pPr algn="ctr"/>
             <a:r>
-              <a:rPr lang="en-US" sz="1600" dirty="0" smtClean="0">
+              <a:rPr lang="en-US" sz="1600" dirty="0">
                 <a:solidFill>
                   <a:schemeClr val="bg1"/>
                 </a:solidFill>
@@ -5608,10 +5595,9 @@
           <a:lstStyle/>
           <a:p>
             <a:r>
-              <a:rPr lang="en-US" sz="1400" dirty="0" smtClean="0"/>
+              <a:rPr lang="en-US" sz="1400" dirty="0"/>
               <a:t>delete 1</a:t>
             </a:r>
-            <a:endParaRPr lang="en-US" sz="1400" dirty="0"/>
           </a:p>
         </p:txBody>
       </p:sp>
@@ -5674,18 +5660,13 @@
           <a:lstStyle/>
           <a:p>
             <a:r>
-              <a:rPr lang="en-US" sz="1400" dirty="0" smtClean="0">
+              <a:rPr lang="en-US" sz="1400" dirty="0">
                 <a:solidFill>
                   <a:srgbClr val="0070C0"/>
                 </a:solidFill>
               </a:rPr>
               <a:t>execute(“delete 1”)</a:t>
             </a:r>
-            <a:endParaRPr lang="en-US" sz="1400" dirty="0">
-              <a:solidFill>
-                <a:srgbClr val="0070C0"/>
-              </a:solidFill>
-            </a:endParaRPr>
           </a:p>
         </p:txBody>
       </p:sp>
@@ -5748,26 +5729,21 @@
           <a:lstStyle/>
           <a:p>
             <a:r>
-              <a:rPr lang="en-US" sz="1400" dirty="0" err="1" smtClean="0">
+              <a:rPr lang="en-US" sz="1400" dirty="0" err="1">
                 <a:solidFill>
                   <a:srgbClr val="7030A0"/>
                 </a:solidFill>
               </a:rPr>
-              <a:t>deletePerson</a:t>
-            </a:r>
-            <a:r>
-              <a:rPr lang="en-US" sz="1400" dirty="0" smtClean="0">
+              <a:t>deleteTask</a:t>
+            </a:r>
+            <a:r>
+              <a:rPr lang="en-US" sz="1400" dirty="0">
                 <a:solidFill>
                   <a:srgbClr val="7030A0"/>
                 </a:solidFill>
               </a:rPr>
               <a:t>(p)</a:t>
             </a:r>
-            <a:endParaRPr lang="en-US" sz="1400" dirty="0">
-              <a:solidFill>
-                <a:srgbClr val="7030A0"/>
-              </a:solidFill>
-            </a:endParaRPr>
           </a:p>
         </p:txBody>
       </p:sp>
@@ -5794,7 +5770,7 @@
           <a:lstStyle/>
           <a:p>
             <a:r>
-              <a:rPr lang="en-US" sz="1400" dirty="0" smtClean="0">
+              <a:rPr lang="en-US" sz="1400" dirty="0">
                 <a:solidFill>
                   <a:schemeClr val="accent5">
                     <a:lumMod val="75000"/>
@@ -5804,17 +5780,17 @@
               <a:t>post(</a:t>
             </a:r>
             <a:r>
-              <a:rPr lang="en-US" sz="1400" dirty="0" err="1" smtClean="0">
+              <a:rPr lang="en-US" sz="1400" dirty="0" err="1">
                 <a:solidFill>
                   <a:schemeClr val="accent5">
                     <a:lumMod val="75000"/>
                   </a:schemeClr>
                 </a:solidFill>
               </a:rPr>
-              <a:t>AddressBookChangedEvent</a:t>
-            </a:r>
-            <a:r>
-              <a:rPr lang="en-US" sz="1400" dirty="0" smtClean="0">
+              <a:t>TaskBookChangedEvent</a:t>
+            </a:r>
+            <a:r>
+              <a:rPr lang="en-US" sz="1400" dirty="0">
                 <a:solidFill>
                   <a:schemeClr val="accent5">
                     <a:lumMod val="75000"/>
@@ -5823,13 +5799,6 @@
               </a:rPr>
               <a:t>)</a:t>
             </a:r>
-            <a:endParaRPr lang="en-US" sz="1400" dirty="0">
-              <a:solidFill>
-                <a:schemeClr val="accent5">
-                  <a:lumMod val="75000"/>
-                </a:schemeClr>
-              </a:solidFill>
-            </a:endParaRPr>
           </a:p>
         </p:txBody>
       </p:sp>
@@ -5995,7 +5964,7 @@
           <a:p>
             <a:pPr algn="ctr"/>
             <a:r>
-              <a:rPr lang="en-US" sz="1600" dirty="0" smtClean="0">
+              <a:rPr lang="en-US" sz="1600" dirty="0">
                 <a:solidFill>
                   <a:schemeClr val="bg1"/>
                 </a:solidFill>
@@ -6003,7 +5972,7 @@
               <a:t>:</a:t>
             </a:r>
             <a:r>
-              <a:rPr lang="en-US" sz="1600" dirty="0" err="1" smtClean="0">
+              <a:rPr lang="en-US" sz="1600" dirty="0" err="1">
                 <a:solidFill>
                   <a:schemeClr val="bg1"/>
                 </a:solidFill>
@@ -6236,7 +6205,7 @@
           <a:p>
             <a:pPr algn="ctr"/>
             <a:r>
-              <a:rPr lang="en-US" sz="1600" dirty="0" smtClean="0">
+              <a:rPr lang="en-US" sz="1600" dirty="0">
                 <a:solidFill>
                   <a:schemeClr val="bg1"/>
                 </a:solidFill>
@@ -6368,7 +6337,7 @@
           <a:lstStyle/>
           <a:p>
             <a:r>
-              <a:rPr lang="en-US" sz="1400" dirty="0" smtClean="0">
+              <a:rPr lang="en-US" sz="1400" dirty="0">
                 <a:solidFill>
                   <a:schemeClr val="accent5">
                     <a:lumMod val="75000"/>
@@ -6378,17 +6347,17 @@
               <a:t>post(</a:t>
             </a:r>
             <a:r>
-              <a:rPr lang="en-US" sz="1400" dirty="0" err="1" smtClean="0">
+              <a:rPr lang="en-US" sz="1400" dirty="0" err="1">
                 <a:solidFill>
                   <a:schemeClr val="accent5">
                     <a:lumMod val="75000"/>
                   </a:schemeClr>
                 </a:solidFill>
               </a:rPr>
-              <a:t>AddressBookChangedEvent</a:t>
-            </a:r>
-            <a:r>
-              <a:rPr lang="en-US" sz="1400" dirty="0" smtClean="0">
+              <a:t>TaskBookChangedEvent</a:t>
+            </a:r>
+            <a:r>
+              <a:rPr lang="en-US" sz="1400" dirty="0">
                 <a:solidFill>
                   <a:schemeClr val="accent5">
                     <a:lumMod val="75000"/>
@@ -6397,13 +6366,6 @@
               </a:rPr>
               <a:t>)</a:t>
             </a:r>
-            <a:endParaRPr lang="en-US" sz="1400" dirty="0">
-              <a:solidFill>
-                <a:schemeClr val="accent5">
-                  <a:lumMod val="75000"/>
-                </a:schemeClr>
-              </a:solidFill>
-            </a:endParaRPr>
           </a:p>
         </p:txBody>
       </p:sp>
@@ -6495,7 +6457,7 @@
           <a:p>
             <a:pPr algn="ctr"/>
             <a:r>
-              <a:rPr lang="en-US" sz="1600" dirty="0" smtClean="0">
+              <a:rPr lang="en-US" sz="1600" dirty="0">
                 <a:solidFill>
                   <a:schemeClr val="bg1"/>
                 </a:solidFill>
@@ -6503,7 +6465,7 @@
               <a:t>:</a:t>
             </a:r>
             <a:r>
-              <a:rPr lang="en-US" sz="1600" dirty="0" err="1" smtClean="0">
+              <a:rPr lang="en-US" sz="1600" dirty="0" err="1">
                 <a:solidFill>
                   <a:schemeClr val="bg1"/>
                 </a:solidFill>
@@ -6750,17 +6712,17 @@
           <a:lstStyle/>
           <a:p>
             <a:r>
-              <a:rPr lang="en-US" sz="1400" dirty="0" err="1" smtClean="0">
+              <a:rPr lang="en-US" sz="1400" dirty="0" err="1">
                 <a:solidFill>
                   <a:schemeClr val="accent6">
                     <a:lumMod val="75000"/>
                   </a:schemeClr>
                 </a:solidFill>
               </a:rPr>
-              <a:t>handleAddresssBookChangedEvent</a:t>
-            </a:r>
-            <a:r>
-              <a:rPr lang="en-US" sz="1400" dirty="0" smtClean="0">
+              <a:t>handleTaskBookChangedEvent</a:t>
+            </a:r>
+            <a:r>
+              <a:rPr lang="en-US" sz="1400" dirty="0">
                 <a:solidFill>
                   <a:schemeClr val="accent6">
                     <a:lumMod val="75000"/>
@@ -6769,13 +6731,6 @@
               </a:rPr>
               <a:t>()</a:t>
             </a:r>
-            <a:endParaRPr lang="en-US" sz="1400" dirty="0">
-              <a:solidFill>
-                <a:schemeClr val="accent6">
-                  <a:lumMod val="75000"/>
-                </a:schemeClr>
-              </a:solidFill>
-            </a:endParaRPr>
           </a:p>
         </p:txBody>
       </p:sp>
@@ -6860,7 +6815,7 @@
           <a:p>
             <a:pPr algn="ctr"/>
             <a:r>
-              <a:rPr lang="en-US" sz="1600" dirty="0" smtClean="0">
+              <a:rPr lang="en-US" sz="1600" dirty="0">
                 <a:solidFill>
                   <a:schemeClr val="bg1"/>
                 </a:solidFill>
@@ -7063,26 +7018,21 @@
           <a:lstStyle/>
           <a:p>
             <a:r>
-              <a:rPr lang="en-US" sz="1400" dirty="0" err="1" smtClean="0">
+              <a:rPr lang="en-US" sz="1400" dirty="0" err="1">
                 <a:solidFill>
                   <a:srgbClr val="00B050"/>
                 </a:solidFill>
               </a:rPr>
-              <a:t>handleAddresssBookChangedEvent</a:t>
-            </a:r>
-            <a:r>
-              <a:rPr lang="en-US" sz="1400" dirty="0" smtClean="0">
+              <a:t>handleTaskBookChangedEvent</a:t>
+            </a:r>
+            <a:r>
+              <a:rPr lang="en-US" sz="1400" dirty="0">
                 <a:solidFill>
                   <a:srgbClr val="00B050"/>
                 </a:solidFill>
               </a:rPr>
               <a:t>()</a:t>
             </a:r>
-            <a:endParaRPr lang="en-US" sz="1400" dirty="0">
-              <a:solidFill>
-                <a:srgbClr val="00B050"/>
-              </a:solidFill>
-            </a:endParaRPr>
           </a:p>
         </p:txBody>
       </p:sp>
@@ -7269,18 +7219,13 @@
           <a:p>
             <a:pPr algn="r"/>
             <a:r>
-              <a:rPr lang="en-US" sz="1400" dirty="0" smtClean="0">
+              <a:rPr lang="en-US" sz="1400" dirty="0">
                 <a:solidFill>
                   <a:srgbClr val="00B050"/>
                 </a:solidFill>
               </a:rPr>
               <a:t>Update status bar</a:t>
             </a:r>
-            <a:endParaRPr lang="en-US" sz="1400" dirty="0">
-              <a:solidFill>
-                <a:srgbClr val="00B050"/>
-              </a:solidFill>
-            </a:endParaRPr>
           </a:p>
         </p:txBody>
       </p:sp>
@@ -7470,7 +7415,7 @@
           <a:lstStyle/>
           <a:p>
             <a:r>
-              <a:rPr lang="en-US" sz="1400" dirty="0" smtClean="0">
+              <a:rPr lang="en-US" sz="1400" dirty="0">
                 <a:solidFill>
                   <a:schemeClr val="accent6">
                     <a:lumMod val="75000"/>
@@ -7480,7 +7425,7 @@
               <a:t>Save </a:t>
             </a:r>
             <a:br>
-              <a:rPr lang="en-US" sz="1400" dirty="0" smtClean="0">
+              <a:rPr lang="en-US" sz="1400" dirty="0">
                 <a:solidFill>
                   <a:schemeClr val="accent6">
                     <a:lumMod val="75000"/>
@@ -7489,7 +7434,7 @@
               </a:rPr>
             </a:br>
             <a:r>
-              <a:rPr lang="en-US" sz="1400" dirty="0" smtClean="0">
+              <a:rPr lang="en-US" sz="1400" dirty="0">
                 <a:solidFill>
                   <a:schemeClr val="accent6">
                     <a:lumMod val="75000"/>
@@ -7498,13 +7443,6 @@
               </a:rPr>
               <a:t>to file</a:t>
             </a:r>
-            <a:endParaRPr lang="en-US" sz="1400" dirty="0">
-              <a:solidFill>
-                <a:schemeClr val="accent6">
-                  <a:lumMod val="75000"/>
-                </a:schemeClr>
-              </a:solidFill>
-            </a:endParaRPr>
           </a:p>
         </p:txBody>
       </p:sp>
@@ -7581,7 +7519,7 @@
           <a:lstStyle/>
           <a:p>
             <a:r>
-              <a:rPr lang="en-US" sz="1200" b="1" dirty="0" smtClean="0">
+              <a:rPr lang="en-US" sz="1200" b="1" dirty="0">
                 <a:solidFill>
                   <a:schemeClr val="accent3">
                     <a:lumMod val="75000"/>
@@ -7764,7 +7702,7 @@
           <a:p>
             <a:pPr algn="ctr"/>
             <a:r>
-              <a:rPr lang="en-US" sz="1050" dirty="0" err="1" smtClean="0">
+              <a:rPr lang="en-US" sz="1050" dirty="0" err="1">
                 <a:solidFill>
                   <a:schemeClr val="bg1"/>
                 </a:solidFill>
@@ -8201,7 +8139,7 @@
                   </a:schemeClr>
                 </a:solidFill>
               </a:rPr>
-              <a:t>PersonCard</a:t>
+              <a:t>TaskCard</a:t>
             </a:r>
             <a:endParaRPr lang="en-SG" sz="1050" b="1" dirty="0">
               <a:solidFill>
@@ -8626,7 +8564,7 @@
           <a:p>
             <a:pPr algn="ctr"/>
             <a:r>
-              <a:rPr lang="en-US" sz="1050" b="1" dirty="0" smtClean="0">
+              <a:rPr lang="en-US" sz="1050" b="1" dirty="0">
                 <a:solidFill>
                   <a:schemeClr val="accent3">
                     <a:lumMod val="75000"/>
@@ -8636,7 +8574,7 @@
               <a:t>{abstract}</a:t>
             </a:r>
             <a:br>
-              <a:rPr lang="en-US" sz="1050" b="1" dirty="0" smtClean="0">
+              <a:rPr lang="en-US" sz="1050" b="1" dirty="0">
                 <a:solidFill>
                   <a:schemeClr val="accent3">
                     <a:lumMod val="75000"/>
@@ -8645,7 +8583,7 @@
               </a:rPr>
             </a:br>
             <a:r>
-              <a:rPr lang="en-US" sz="1050" b="1" dirty="0" err="1" smtClean="0">
+              <a:rPr lang="en-US" sz="1050" b="1" dirty="0" err="1">
                 <a:solidFill>
                   <a:schemeClr val="accent3">
                     <a:lumMod val="75000"/>
@@ -9134,7 +9072,7 @@
           <a:p>
             <a:pPr algn="ctr"/>
             <a:r>
-              <a:rPr lang="en-US" sz="1100" b="1" dirty="0" smtClean="0">
+              <a:rPr lang="en-US" sz="1100" b="1" dirty="0">
                 <a:solidFill>
                   <a:schemeClr val="bg1"/>
                 </a:solidFill>
@@ -9193,7 +9131,7 @@
           <a:p>
             <a:pPr algn="ctr"/>
             <a:r>
-              <a:rPr lang="en-US" sz="1050" dirty="0" smtClean="0">
+              <a:rPr lang="en-US" sz="1050" dirty="0">
                 <a:solidFill>
                   <a:schemeClr val="bg1"/>
                 </a:solidFill>
@@ -9204,7 +9142,7 @@
           <a:p>
             <a:pPr algn="ctr"/>
             <a:r>
-              <a:rPr lang="en-US" sz="1050" dirty="0" err="1" smtClean="0">
+              <a:rPr lang="en-US" sz="1050" dirty="0" err="1">
                 <a:solidFill>
                   <a:schemeClr val="bg1"/>
                 </a:solidFill>
@@ -9753,13 +9691,6 @@
   <p:clrMapOvr>
     <a:masterClrMapping/>
   </p:clrMapOvr>
-  <p:timing>
-    <p:tnLst>
-      <p:par>
-        <p:cTn id="1" dur="indefinite" restart="never" nodeType="tmRoot"/>
-      </p:par>
-    </p:tnLst>
-  </p:timing>
 </p:sld>
 </file>
 
@@ -9826,7 +9757,7 @@
           <a:lstStyle/>
           <a:p>
             <a:r>
-              <a:rPr lang="en-US" sz="1200" b="1" dirty="0" smtClean="0">
+              <a:rPr lang="en-US" sz="1200" b="1" dirty="0">
                 <a:solidFill>
                   <a:srgbClr val="0070C0"/>
                 </a:solidFill>
@@ -10000,7 +9931,7 @@
           <a:p>
             <a:pPr algn="ctr"/>
             <a:r>
-              <a:rPr lang="en-US" sz="1050" dirty="0" err="1" smtClean="0">
+              <a:rPr lang="en-US" sz="1050" dirty="0" err="1">
                 <a:solidFill>
                   <a:schemeClr val="bg1"/>
                 </a:solidFill>
@@ -10362,7 +10293,7 @@
           <a:p>
             <a:pPr algn="ctr"/>
             <a:r>
-              <a:rPr lang="en-US" sz="1050" b="1" dirty="0" smtClean="0">
+              <a:rPr lang="en-US" sz="1050" b="1" dirty="0">
                 <a:solidFill>
                   <a:srgbClr val="0070C0"/>
                 </a:solidFill>
@@ -10370,14 +10301,14 @@
               <a:t>{abstract}</a:t>
             </a:r>
             <a:br>
-              <a:rPr lang="en-US" sz="1050" b="1" dirty="0" smtClean="0">
+              <a:rPr lang="en-US" sz="1050" b="1" dirty="0">
                 <a:solidFill>
                   <a:srgbClr val="0070C0"/>
                 </a:solidFill>
               </a:rPr>
             </a:br>
             <a:r>
-              <a:rPr lang="en-US" sz="1050" b="1" dirty="0" smtClean="0">
+              <a:rPr lang="en-US" sz="1050" b="1" dirty="0">
                 <a:solidFill>
                   <a:srgbClr val="0070C0"/>
                 </a:solidFill>
@@ -11038,7 +10969,7 @@
             <a:p>
               <a:pPr algn="r"/>
               <a:r>
-                <a:rPr lang="en-US" sz="1100" dirty="0" smtClean="0">
+                <a:rPr lang="en-US" sz="1100" dirty="0">
                   <a:solidFill>
                     <a:srgbClr val="0070C0"/>
                   </a:solidFill>
@@ -11137,7 +11068,7 @@
             <a:lstStyle/>
             <a:p>
               <a:r>
-                <a:rPr lang="en-US" sz="1100" dirty="0" smtClean="0">
+                <a:rPr lang="en-US" sz="1100" dirty="0">
                   <a:solidFill>
                     <a:srgbClr val="0070C0"/>
                   </a:solidFill>
@@ -11223,7 +11154,7 @@
           <a:p>
             <a:pPr algn="r"/>
             <a:r>
-              <a:rPr lang="en-US" sz="1100" dirty="0" smtClean="0">
+              <a:rPr lang="en-US" sz="1100" dirty="0">
                 <a:solidFill>
                   <a:srgbClr val="0070C0"/>
                 </a:solidFill>
@@ -11262,7 +11193,7 @@
           <a:p>
             <a:pPr algn="r"/>
             <a:r>
-              <a:rPr lang="en-US" sz="1100" dirty="0" smtClean="0">
+              <a:rPr lang="en-US" sz="1100" dirty="0">
                 <a:solidFill>
                   <a:srgbClr val="0070C0"/>
                 </a:solidFill>
@@ -11315,7 +11246,7 @@
             <a:p>
               <a:pPr algn="r"/>
               <a:r>
-                <a:rPr lang="en-US" sz="1100" dirty="0" smtClean="0">
+                <a:rPr lang="en-US" sz="1100" dirty="0">
                   <a:solidFill>
                     <a:srgbClr val="0070C0"/>
                   </a:solidFill>
@@ -11418,7 +11349,7 @@
           <a:p>
             <a:pPr algn="ctr"/>
             <a:r>
-              <a:rPr lang="en-US" sz="1050" b="1" dirty="0" smtClean="0">
+              <a:rPr lang="en-US" sz="1050" b="1" dirty="0">
                 <a:solidFill>
                   <a:srgbClr val="0070C0"/>
                 </a:solidFill>
@@ -11426,14 +11357,14 @@
               <a:t>Incorrect</a:t>
             </a:r>
             <a:br>
-              <a:rPr lang="en-US" sz="1050" b="1" dirty="0" smtClean="0">
+              <a:rPr lang="en-US" sz="1050" b="1" dirty="0">
                 <a:solidFill>
                   <a:srgbClr val="0070C0"/>
                 </a:solidFill>
               </a:rPr>
             </a:br>
             <a:r>
-              <a:rPr lang="en-US" sz="1050" b="1" dirty="0" smtClean="0">
+              <a:rPr lang="en-US" sz="1050" b="1" dirty="0">
                 <a:solidFill>
                   <a:srgbClr val="0070C0"/>
                 </a:solidFill>
@@ -11542,13 +11473,6 @@
   <p:clrMapOvr>
     <a:masterClrMapping/>
   </p:clrMapOvr>
-  <p:timing>
-    <p:tnLst>
-      <p:par>
-        <p:cTn id="1" dur="indefinite" restart="never" nodeType="tmRoot"/>
-      </p:par>
-    </p:tnLst>
-  </p:timing>
 </p:sld>
 </file>
 
@@ -11615,7 +11539,7 @@
           <a:lstStyle/>
           <a:p>
             <a:r>
-              <a:rPr lang="en-US" sz="1200" b="1" dirty="0" smtClean="0">
+              <a:rPr lang="en-US" sz="1200" b="1" dirty="0">
                 <a:solidFill>
                   <a:srgbClr val="0070C0"/>
                 </a:solidFill>
@@ -11825,7 +11749,7 @@
           <a:p>
             <a:pPr algn="ctr"/>
             <a:r>
-              <a:rPr lang="en-US" sz="1600" dirty="0" smtClean="0">
+              <a:rPr lang="en-US" sz="1600" dirty="0">
                 <a:solidFill>
                   <a:schemeClr val="bg1"/>
                 </a:solidFill>
@@ -11972,20 +11896,12 @@
           <a:p>
             <a:pPr algn="ctr"/>
             <a:r>
-              <a:rPr lang="en-US" sz="1600" dirty="0" smtClean="0">
+              <a:rPr lang="en-US" sz="1600" dirty="0">
                 <a:solidFill>
                   <a:schemeClr val="bg1"/>
                 </a:solidFill>
               </a:rPr>
               <a:t>d:Delete</a:t>
-            </a:r>
-            <a:r>
-              <a:rPr lang="en-US" sz="1600" dirty="0">
-                <a:solidFill>
-                  <a:schemeClr val="bg1"/>
-                </a:solidFill>
-              </a:rPr>
-              <a:t/>
             </a:r>
             <a:br>
               <a:rPr lang="en-US" sz="1600" dirty="0">
@@ -12190,18 +12106,13 @@
           <a:p>
             <a:pPr algn="r"/>
             <a:r>
-              <a:rPr lang="en-US" sz="1400" dirty="0" smtClean="0">
+              <a:rPr lang="en-US" sz="1400" dirty="0">
                 <a:solidFill>
                   <a:srgbClr val="0070C0"/>
                 </a:solidFill>
               </a:rPr>
               <a:t>execute(“delete 1”)</a:t>
             </a:r>
-            <a:endParaRPr lang="en-US" sz="1400" dirty="0">
-              <a:solidFill>
-                <a:srgbClr val="0070C0"/>
-              </a:solidFill>
-            </a:endParaRPr>
           </a:p>
         </p:txBody>
       </p:sp>
@@ -12280,7 +12191,6 @@
               <a:rPr lang="en-US" dirty="0"/>
               <a:t>execute()</a:t>
             </a:r>
-            <a:endParaRPr lang="en-US" dirty="0"/>
           </a:p>
         </p:txBody>
       </p:sp>
@@ -12792,26 +12702,21 @@
           </a:lstStyle>
           <a:p>
             <a:r>
-              <a:rPr lang="en-US" dirty="0" err="1" smtClean="0">
+              <a:rPr lang="en-US" dirty="0" err="1">
                 <a:solidFill>
                   <a:srgbClr val="7030A0"/>
                 </a:solidFill>
               </a:rPr>
-              <a:t>deletePerson</a:t>
-            </a:r>
-            <a:r>
-              <a:rPr lang="en-US" dirty="0" smtClean="0">
+              <a:t>deleteTask</a:t>
+            </a:r>
+            <a:r>
+              <a:rPr lang="en-US" dirty="0">
                 <a:solidFill>
                   <a:srgbClr val="7030A0"/>
                 </a:solidFill>
               </a:rPr>
               <a:t>(p)</a:t>
             </a:r>
-            <a:endParaRPr lang="en-US" dirty="0">
-              <a:solidFill>
-                <a:srgbClr val="7030A0"/>
-              </a:solidFill>
-            </a:endParaRPr>
           </a:p>
         </p:txBody>
       </p:sp>
@@ -12849,10 +12754,9 @@
           </a:lstStyle>
           <a:p>
             <a:r>
-              <a:rPr lang="en-US" dirty="0" smtClean="0"/>
+              <a:rPr lang="en-US" dirty="0"/>
               <a:t>create()</a:t>
             </a:r>
-            <a:endParaRPr lang="en-US" dirty="0"/>
           </a:p>
         </p:txBody>
       </p:sp>
@@ -12890,10 +12794,9 @@
           </a:lstStyle>
           <a:p>
             <a:r>
-              <a:rPr lang="en-US" dirty="0" smtClean="0"/>
+              <a:rPr lang="en-US" dirty="0"/>
               <a:t>parse(“delete 1”)</a:t>
             </a:r>
-            <a:endParaRPr lang="en-US" dirty="0"/>
           </a:p>
         </p:txBody>
       </p:sp>
@@ -12931,10 +12834,9 @@
           </a:lstStyle>
           <a:p>
             <a:r>
-              <a:rPr lang="en-US" dirty="0" smtClean="0"/>
+              <a:rPr lang="en-US" dirty="0"/>
               <a:t>result</a:t>
             </a:r>
-            <a:endParaRPr lang="en-US" dirty="0"/>
           </a:p>
         </p:txBody>
       </p:sp>
@@ -12972,10 +12874,9 @@
           </a:lstStyle>
           <a:p>
             <a:r>
-              <a:rPr lang="en-US" dirty="0" smtClean="0"/>
+              <a:rPr lang="en-US" dirty="0"/>
               <a:t>result</a:t>
             </a:r>
-            <a:endParaRPr lang="en-US" dirty="0"/>
           </a:p>
         </p:txBody>
       </p:sp>
@@ -13023,7 +12924,7 @@
           <a:p>
             <a:pPr algn="ctr"/>
             <a:r>
-              <a:rPr lang="en-US" sz="1600" dirty="0" smtClean="0">
+              <a:rPr lang="en-US" sz="1600" dirty="0">
                 <a:solidFill>
                   <a:schemeClr val="bg1"/>
                 </a:solidFill>
@@ -13031,14 +12932,14 @@
               <a:t>result:</a:t>
             </a:r>
             <a:br>
-              <a:rPr lang="en-US" sz="1600" dirty="0" smtClean="0">
+              <a:rPr lang="en-US" sz="1600" dirty="0">
                 <a:solidFill>
                   <a:schemeClr val="bg1"/>
                 </a:solidFill>
               </a:rPr>
             </a:br>
             <a:r>
-              <a:rPr lang="en-US" sz="1600" dirty="0" err="1" smtClean="0">
+              <a:rPr lang="en-US" sz="1600" dirty="0" err="1">
                 <a:solidFill>
                   <a:schemeClr val="bg1"/>
                 </a:solidFill>
@@ -13208,10 +13109,9 @@
           </a:lstStyle>
           <a:p>
             <a:r>
-              <a:rPr lang="en-US" dirty="0" smtClean="0"/>
+              <a:rPr lang="en-US" dirty="0"/>
               <a:t>d</a:t>
             </a:r>
-            <a:endParaRPr lang="en-US" dirty="0"/>
           </a:p>
         </p:txBody>
       </p:sp>
@@ -13291,7 +13191,7 @@
           <a:lstStyle/>
           <a:p>
             <a:r>
-              <a:rPr lang="en-US" sz="1200" b="1" dirty="0" smtClean="0">
+              <a:rPr lang="en-US" sz="1200" b="1" dirty="0">
                 <a:solidFill>
                   <a:srgbClr val="7030A0"/>
                 </a:solidFill>
@@ -13350,7 +13250,7 @@
           <a:p>
             <a:pPr algn="ctr"/>
             <a:r>
-              <a:rPr lang="en-US" sz="1050" dirty="0" err="1" smtClean="0">
+              <a:rPr lang="en-US" sz="1050" dirty="0" err="1">
                 <a:solidFill>
                   <a:schemeClr val="bg1"/>
                 </a:solidFill>
@@ -13409,7 +13309,7 @@
           <a:p>
             <a:pPr algn="ctr"/>
             <a:r>
-              <a:rPr lang="en-US" sz="1050" dirty="0" err="1" smtClean="0">
+              <a:rPr lang="en-US" sz="1050" dirty="0" err="1">
                 <a:solidFill>
                   <a:schemeClr val="bg1"/>
                 </a:solidFill>
@@ -13565,7 +13465,7 @@
           <a:p>
             <a:pPr algn="ctr"/>
             <a:r>
-              <a:rPr lang="en-US" sz="1050" dirty="0" smtClean="0">
+              <a:rPr lang="en-US" sz="1050" dirty="0">
                 <a:solidFill>
                   <a:schemeClr val="bg1"/>
                 </a:solidFill>
@@ -13931,12 +13831,12 @@
           <a:p>
             <a:pPr algn="ctr"/>
             <a:r>
-              <a:rPr lang="en-US" sz="1050" dirty="0" err="1" smtClean="0">
+              <a:rPr lang="en-US" sz="1050" dirty="0" err="1">
                 <a:solidFill>
                   <a:srgbClr val="7030A0"/>
                 </a:solidFill>
               </a:rPr>
-              <a:t>AddressBook</a:t>
+              <a:t>TaskBook</a:t>
             </a:r>
             <a:endParaRPr lang="en-SG" sz="1050" dirty="0">
               <a:solidFill>
@@ -14073,12 +13973,12 @@
           <a:p>
             <a:pPr algn="ctr"/>
             <a:r>
-              <a:rPr lang="en-US" sz="1050" dirty="0" err="1" smtClean="0">
+              <a:rPr lang="en-US" sz="1050" dirty="0" err="1">
                 <a:solidFill>
                   <a:srgbClr val="7030A0"/>
                 </a:solidFill>
               </a:rPr>
-              <a:t>UniquePersonList</a:t>
+              <a:t>UniqueTaskList</a:t>
             </a:r>
             <a:endParaRPr lang="en-SG" sz="1050" dirty="0">
               <a:solidFill>
@@ -14217,7 +14117,7 @@
           <a:p>
             <a:pPr algn="ctr"/>
             <a:r>
-              <a:rPr lang="en-US" sz="1050" dirty="0" err="1" smtClean="0">
+              <a:rPr lang="en-US" sz="1050" dirty="0" err="1">
                 <a:solidFill>
                   <a:srgbClr val="7030A0"/>
                 </a:solidFill>
@@ -14316,12 +14216,12 @@
           <a:p>
             <a:pPr algn="ctr"/>
             <a:r>
-              <a:rPr lang="en-US" sz="1050" dirty="0" smtClean="0">
+              <a:rPr lang="en-US" sz="1050" dirty="0">
                 <a:solidFill>
                   <a:srgbClr val="7030A0"/>
                 </a:solidFill>
               </a:rPr>
-              <a:t>Person</a:t>
+              <a:t>Task</a:t>
             </a:r>
             <a:endParaRPr lang="en-SG" sz="1050" dirty="0">
               <a:solidFill>
@@ -14458,7 +14358,7 @@
           <a:p>
             <a:pPr algn="ctr"/>
             <a:r>
-              <a:rPr lang="en-US" sz="1050" dirty="0" smtClean="0">
+              <a:rPr lang="en-US" sz="1050" dirty="0">
                 <a:solidFill>
                   <a:srgbClr val="7030A0"/>
                 </a:solidFill>
@@ -14600,7 +14500,7 @@
           <a:p>
             <a:pPr algn="ctr"/>
             <a:r>
-              <a:rPr lang="en-US" sz="1050" dirty="0" smtClean="0">
+              <a:rPr lang="en-US" sz="1050" dirty="0">
                 <a:solidFill>
                   <a:srgbClr val="7030A0"/>
                 </a:solidFill>
@@ -14608,19 +14508,19 @@
               <a:t>&lt;&lt;interface&gt;&gt;</a:t>
             </a:r>
             <a:br>
-              <a:rPr lang="en-US" sz="1050" dirty="0" smtClean="0">
+              <a:rPr lang="en-US" sz="1050" dirty="0">
                 <a:solidFill>
                   <a:srgbClr val="7030A0"/>
                 </a:solidFill>
               </a:rPr>
             </a:br>
             <a:r>
-              <a:rPr lang="en-US" sz="1050" dirty="0" err="1" smtClean="0">
+              <a:rPr lang="en-US" sz="1050" dirty="0" err="1">
                 <a:solidFill>
                   <a:srgbClr val="7030A0"/>
                 </a:solidFill>
               </a:rPr>
-              <a:t>ReadOnlyPerson</a:t>
+              <a:t>ReadOnlyTask</a:t>
             </a:r>
             <a:endParaRPr lang="en-SG" sz="1050" dirty="0">
               <a:solidFill>
@@ -14671,7 +14571,7 @@
           <a:p>
             <a:pPr algn="ctr"/>
             <a:r>
-              <a:rPr lang="en-US" sz="1050" dirty="0" smtClean="0">
+              <a:rPr lang="en-US" sz="1050" dirty="0">
                 <a:solidFill>
                   <a:srgbClr val="7030A0"/>
                 </a:solidFill>
@@ -14815,12 +14715,12 @@
           <a:p>
             <a:pPr algn="ctr"/>
             <a:r>
-              <a:rPr lang="en-US" sz="1050" dirty="0" smtClean="0">
+              <a:rPr lang="en-US" sz="1050" dirty="0" err="1">
                 <a:solidFill>
                   <a:srgbClr val="7030A0"/>
                 </a:solidFill>
               </a:rPr>
-              <a:t>Phone</a:t>
+              <a:t>dateTime</a:t>
             </a:r>
             <a:endParaRPr lang="en-SG" sz="1050" dirty="0">
               <a:solidFill>
@@ -14912,12 +14812,12 @@
           <a:p>
             <a:pPr algn="ctr"/>
             <a:r>
-              <a:rPr lang="en-US" sz="1050" dirty="0" smtClean="0">
+              <a:rPr lang="en-US" sz="1050" dirty="0">
                 <a:solidFill>
                   <a:srgbClr val="7030A0"/>
                 </a:solidFill>
               </a:rPr>
-              <a:t>Email</a:t>
+              <a:t>Status </a:t>
             </a:r>
             <a:endParaRPr lang="en-SG" sz="1050" dirty="0">
               <a:solidFill>
@@ -15009,18 +14909,13 @@
           <a:p>
             <a:pPr algn="ctr"/>
             <a:r>
-              <a:rPr lang="en-US" sz="1050" dirty="0" smtClean="0">
+              <a:rPr lang="en-SG" sz="1050" dirty="0">
                 <a:solidFill>
                   <a:srgbClr val="7030A0"/>
                 </a:solidFill>
               </a:rPr>
-              <a:t>Address</a:t>
-            </a:r>
-            <a:endParaRPr lang="en-SG" sz="1050" dirty="0">
-              <a:solidFill>
-                <a:srgbClr val="7030A0"/>
-              </a:solidFill>
-            </a:endParaRPr>
+              <a:t>priority</a:t>
+            </a:r>
           </a:p>
         </p:txBody>
       </p:sp>
@@ -15197,130 +15092,12 @@
           <a:p>
             <a:pPr algn="ctr"/>
             <a:r>
-              <a:rPr lang="en-US" sz="1050" dirty="0" smtClean="0">
+              <a:rPr lang="en-US" sz="1050" dirty="0">
                 <a:solidFill>
                   <a:srgbClr val="7030A0"/>
                 </a:solidFill>
               </a:rPr>
               <a:t>&lt;&lt;interface&gt;&gt;</a:t>
-            </a:r>
-            <a:br>
-              <a:rPr lang="en-US" sz="1050" dirty="0" smtClean="0">
-                <a:solidFill>
-                  <a:srgbClr val="7030A0"/>
-                </a:solidFill>
-              </a:rPr>
-            </a:br>
-            <a:r>
-              <a:rPr lang="en-US" sz="1050" dirty="0" err="1" smtClean="0">
-                <a:solidFill>
-                  <a:srgbClr val="7030A0"/>
-                </a:solidFill>
-              </a:rPr>
-              <a:t>ReadOnlyAddressBook</a:t>
-            </a:r>
-            <a:endParaRPr lang="en-SG" sz="1050" dirty="0">
-              <a:solidFill>
-                <a:srgbClr val="7030A0"/>
-              </a:solidFill>
-            </a:endParaRPr>
-          </a:p>
-        </p:txBody>
-      </p:sp>
-      <p:sp>
-        <p:nvSpPr>
-          <p:cNvPr id="114" name="TextBox 113"/>
-          <p:cNvSpPr txBox="1"/>
-          <p:nvPr/>
-        </p:nvSpPr>
-        <p:spPr>
-          <a:xfrm rot="16200000">
-            <a:off x="6581354" y="3514530"/>
-            <a:ext cx="881018" cy="261610"/>
-          </a:xfrm>
-          <a:prstGeom prst="rect">
-            <a:avLst/>
-          </a:prstGeom>
-          <a:noFill/>
-        </p:spPr>
-        <p:txBody>
-          <a:bodyPr wrap="square" rtlCol="0">
-            <a:spAutoFit/>
-          </a:bodyPr>
-          <a:lstStyle/>
-          <a:p>
-            <a:pPr algn="r"/>
-            <a:r>
-              <a:rPr lang="en-US" sz="1100" dirty="0" smtClean="0">
-                <a:solidFill>
-                  <a:srgbClr val="7030A0"/>
-                </a:solidFill>
-              </a:rPr>
-              <a:t>filtered list</a:t>
-            </a:r>
-            <a:endParaRPr lang="en-SG" sz="1100" dirty="0">
-              <a:solidFill>
-                <a:srgbClr val="7030A0"/>
-              </a:solidFill>
-            </a:endParaRPr>
-          </a:p>
-        </p:txBody>
-      </p:sp>
-      <p:sp>
-        <p:nvSpPr>
-          <p:cNvPr id="122" name="Rectangle 8"/>
-          <p:cNvSpPr/>
-          <p:nvPr/>
-        </p:nvSpPr>
-        <p:spPr>
-          <a:xfrm>
-            <a:off x="2057400" y="4239491"/>
-            <a:ext cx="1775949" cy="346760"/>
-          </a:xfrm>
-          <a:prstGeom prst="rect">
-            <a:avLst/>
-          </a:prstGeom>
-          <a:ln w="19050">
-            <a:solidFill>
-              <a:srgbClr val="7030A0"/>
-            </a:solidFill>
-          </a:ln>
-          <a:effectLst/>
-        </p:spPr>
-        <p:style>
-          <a:lnRef idx="1">
-            <a:schemeClr val="accent4"/>
-          </a:lnRef>
-          <a:fillRef idx="2">
-            <a:schemeClr val="accent4"/>
-          </a:fillRef>
-          <a:effectRef idx="1">
-            <a:schemeClr val="accent4"/>
-          </a:effectRef>
-          <a:fontRef idx="minor">
-            <a:schemeClr val="dk1"/>
-          </a:fontRef>
-        </p:style>
-        <p:txBody>
-          <a:bodyPr rtlCol="0" anchor="ctr"/>
-          <a:lstStyle/>
-          <a:p>
-            <a:pPr algn="ctr"/>
-            <a:r>
-              <a:rPr lang="en-US" sz="1050" dirty="0" smtClean="0">
-                <a:solidFill>
-                  <a:srgbClr val="7030A0"/>
-                </a:solidFill>
-              </a:rPr>
-              <a:t>&lt;&lt;interface&gt;&gt;</a:t>
-            </a:r>
-            <a:r>
-              <a:rPr lang="en-US" sz="1050" dirty="0">
-                <a:solidFill>
-                  <a:srgbClr val="7030A0"/>
-                </a:solidFill>
-              </a:rPr>
-              <a:t/>
             </a:r>
             <a:br>
               <a:rPr lang="en-US" sz="1050" dirty="0">
@@ -15330,7 +15107,117 @@
               </a:rPr>
             </a:br>
             <a:r>
-              <a:rPr lang="en-US" sz="1050" dirty="0" err="1" smtClean="0">
+              <a:rPr lang="en-US" sz="1050" dirty="0" err="1">
+                <a:solidFill>
+                  <a:srgbClr val="7030A0"/>
+                </a:solidFill>
+              </a:rPr>
+              <a:t>ReadOnlyTaskBook</a:t>
+            </a:r>
+            <a:endParaRPr lang="en-SG" sz="1050" dirty="0">
+              <a:solidFill>
+                <a:srgbClr val="7030A0"/>
+              </a:solidFill>
+            </a:endParaRPr>
+          </a:p>
+        </p:txBody>
+      </p:sp>
+      <p:sp>
+        <p:nvSpPr>
+          <p:cNvPr id="114" name="TextBox 113"/>
+          <p:cNvSpPr txBox="1"/>
+          <p:nvPr/>
+        </p:nvSpPr>
+        <p:spPr>
+          <a:xfrm rot="16200000">
+            <a:off x="6581354" y="3514530"/>
+            <a:ext cx="881018" cy="261610"/>
+          </a:xfrm>
+          <a:prstGeom prst="rect">
+            <a:avLst/>
+          </a:prstGeom>
+          <a:noFill/>
+        </p:spPr>
+        <p:txBody>
+          <a:bodyPr wrap="square" rtlCol="0">
+            <a:spAutoFit/>
+          </a:bodyPr>
+          <a:lstStyle/>
+          <a:p>
+            <a:pPr algn="r"/>
+            <a:r>
+              <a:rPr lang="en-US" sz="1100" dirty="0">
+                <a:solidFill>
+                  <a:srgbClr val="7030A0"/>
+                </a:solidFill>
+              </a:rPr>
+              <a:t>filtered list</a:t>
+            </a:r>
+            <a:endParaRPr lang="en-SG" sz="1100" dirty="0">
+              <a:solidFill>
+                <a:srgbClr val="7030A0"/>
+              </a:solidFill>
+            </a:endParaRPr>
+          </a:p>
+        </p:txBody>
+      </p:sp>
+      <p:sp>
+        <p:nvSpPr>
+          <p:cNvPr id="122" name="Rectangle 8"/>
+          <p:cNvSpPr/>
+          <p:nvPr/>
+        </p:nvSpPr>
+        <p:spPr>
+          <a:xfrm>
+            <a:off x="2057400" y="4239491"/>
+            <a:ext cx="1775949" cy="346760"/>
+          </a:xfrm>
+          <a:prstGeom prst="rect">
+            <a:avLst/>
+          </a:prstGeom>
+          <a:ln w="19050">
+            <a:solidFill>
+              <a:srgbClr val="7030A0"/>
+            </a:solidFill>
+          </a:ln>
+          <a:effectLst/>
+        </p:spPr>
+        <p:style>
+          <a:lnRef idx="1">
+            <a:schemeClr val="accent4"/>
+          </a:lnRef>
+          <a:fillRef idx="2">
+            <a:schemeClr val="accent4"/>
+          </a:fillRef>
+          <a:effectRef idx="1">
+            <a:schemeClr val="accent4"/>
+          </a:effectRef>
+          <a:fontRef idx="minor">
+            <a:schemeClr val="dk1"/>
+          </a:fontRef>
+        </p:style>
+        <p:txBody>
+          <a:bodyPr rtlCol="0" anchor="ctr"/>
+          <a:lstStyle/>
+          <a:p>
+            <a:pPr algn="ctr"/>
+            <a:r>
+              <a:rPr lang="en-US" sz="1050" dirty="0">
+                <a:solidFill>
+                  <a:srgbClr val="7030A0"/>
+                </a:solidFill>
+              </a:rPr>
+              <a:t>&lt;&lt;interface&gt;&gt;</a:t>
+            </a:r>
+            <a:br>
+              <a:rPr lang="en-US" sz="1050" dirty="0">
+                <a:solidFill>
+                  <a:srgbClr val="7030A0"/>
+                </a:solidFill>
+              </a:rPr>
+            </a:br>
+            <a:r>
+              <a:rPr lang="en-US" sz="1050" dirty="0" err="1">
                 <a:solidFill>
                   <a:srgbClr val="7030A0"/>
                 </a:solidFill>
@@ -15397,13 +15284,6 @@
   <p:clrMapOvr>
     <a:masterClrMapping/>
   </p:clrMapOvr>
-  <p:timing>
-    <p:tnLst>
-      <p:par>
-        <p:cTn id="1" dur="indefinite" restart="never" nodeType="tmRoot"/>
-      </p:par>
-    </p:tnLst>
-  </p:timing>
 </p:sld>
 </file>
 
@@ -15470,7 +15350,7 @@
           <a:lstStyle/>
           <a:p>
             <a:r>
-              <a:rPr lang="en-US" sz="1200" b="1" dirty="0" smtClean="0">
+              <a:rPr lang="en-US" sz="1200" b="1" dirty="0">
                 <a:solidFill>
                   <a:schemeClr val="accent6">
                     <a:lumMod val="75000"/>
@@ -15537,147 +15417,6 @@
           <a:p>
             <a:pPr algn="ctr"/>
             <a:r>
-              <a:rPr lang="en-US" sz="1050" dirty="0" smtClean="0">
-                <a:solidFill>
-                  <a:schemeClr val="bg1"/>
-                </a:solidFill>
-              </a:rPr>
-              <a:t>&lt;&lt;interface&gt;&gt;</a:t>
-            </a:r>
-            <a:br>
-              <a:rPr lang="en-US" sz="1050" dirty="0" smtClean="0">
-                <a:solidFill>
-                  <a:schemeClr val="bg1"/>
-                </a:solidFill>
-              </a:rPr>
-            </a:br>
-            <a:r>
-              <a:rPr lang="en-US" sz="1050" dirty="0" err="1" smtClean="0">
-                <a:solidFill>
-                  <a:schemeClr val="bg1"/>
-                </a:solidFill>
-              </a:rPr>
-              <a:t>AddressBookStorage</a:t>
-            </a:r>
-            <a:endParaRPr lang="en-SG" sz="1050" dirty="0">
-              <a:solidFill>
-                <a:schemeClr val="bg1"/>
-              </a:solidFill>
-            </a:endParaRPr>
-          </a:p>
-        </p:txBody>
-      </p:sp>
-      <p:sp>
-        <p:nvSpPr>
-          <p:cNvPr id="9" name="Rectangle 62"/>
-          <p:cNvSpPr/>
-          <p:nvPr/>
-        </p:nvSpPr>
-        <p:spPr>
-          <a:xfrm rot="16200000">
-            <a:off x="1683963" y="2868687"/>
-            <a:ext cx="1093635" cy="346760"/>
-          </a:xfrm>
-          <a:prstGeom prst="rect">
-            <a:avLst/>
-          </a:prstGeom>
-          <a:solidFill>
-            <a:schemeClr val="accent6">
-              <a:lumMod val="75000"/>
-            </a:schemeClr>
-          </a:solidFill>
-          <a:ln w="19050">
-            <a:solidFill>
-              <a:schemeClr val="accent6">
-                <a:lumMod val="75000"/>
-              </a:schemeClr>
-            </a:solidFill>
-          </a:ln>
-          <a:effectLst/>
-        </p:spPr>
-        <p:style>
-          <a:lnRef idx="1">
-            <a:schemeClr val="accent2"/>
-          </a:lnRef>
-          <a:fillRef idx="2">
-            <a:schemeClr val="accent2"/>
-          </a:fillRef>
-          <a:effectRef idx="1">
-            <a:schemeClr val="accent2"/>
-          </a:effectRef>
-          <a:fontRef idx="minor">
-            <a:schemeClr val="dk1"/>
-          </a:fontRef>
-        </p:style>
-        <p:txBody>
-          <a:bodyPr rtlCol="0" anchor="ctr"/>
-          <a:lstStyle/>
-          <a:p>
-            <a:pPr algn="ctr"/>
-            <a:r>
-              <a:rPr lang="en-US" sz="1050" dirty="0" err="1" smtClean="0">
-                <a:solidFill>
-                  <a:schemeClr val="bg1"/>
-                </a:solidFill>
-              </a:rPr>
-              <a:t>StorageManager</a:t>
-            </a:r>
-            <a:endParaRPr lang="en-SG" sz="1050" dirty="0">
-              <a:solidFill>
-                <a:schemeClr val="bg1"/>
-              </a:solidFill>
-            </a:endParaRPr>
-          </a:p>
-        </p:txBody>
-      </p:sp>
-      <p:sp>
-        <p:nvSpPr>
-          <p:cNvPr id="119" name="Rectangle 62"/>
-          <p:cNvSpPr/>
-          <p:nvPr/>
-        </p:nvSpPr>
-        <p:spPr>
-          <a:xfrm rot="16200000">
-            <a:off x="956202" y="2861202"/>
-            <a:ext cx="1093635" cy="346760"/>
-          </a:xfrm>
-          <a:prstGeom prst="rect">
-            <a:avLst/>
-          </a:prstGeom>
-          <a:solidFill>
-            <a:schemeClr val="accent6">
-              <a:lumMod val="75000"/>
-            </a:schemeClr>
-          </a:solidFill>
-          <a:ln w="19050">
-            <a:solidFill>
-              <a:schemeClr val="accent6">
-                <a:lumMod val="75000"/>
-              </a:schemeClr>
-            </a:solidFill>
-          </a:ln>
-          <a:effectLst/>
-        </p:spPr>
-        <p:style>
-          <a:lnRef idx="1">
-            <a:schemeClr val="accent2"/>
-          </a:lnRef>
-          <a:fillRef idx="2">
-            <a:schemeClr val="accent2"/>
-          </a:fillRef>
-          <a:effectRef idx="1">
-            <a:schemeClr val="accent2"/>
-          </a:effectRef>
-          <a:fontRef idx="minor">
-            <a:schemeClr val="dk1"/>
-          </a:fontRef>
-        </p:style>
-        <p:txBody>
-          <a:bodyPr rtlCol="0" anchor="ctr"/>
-          <a:lstStyle/>
-          <a:p>
-            <a:pPr algn="ctr"/>
-            <a:r>
               <a:rPr lang="en-US" sz="1050" dirty="0">
                 <a:solidFill>
                   <a:schemeClr val="bg1"/>
@@ -15685,11 +15424,152 @@
               </a:rPr>
               <a:t>&lt;&lt;interface&gt;&gt;</a:t>
             </a:r>
-          </a:p>
+            <a:br>
+              <a:rPr lang="en-US" sz="1050" dirty="0">
+                <a:solidFill>
+                  <a:schemeClr val="bg1"/>
+                </a:solidFill>
+              </a:rPr>
+            </a:br>
+            <a:r>
+              <a:rPr lang="en-US" sz="1050" dirty="0" err="1">
+                <a:solidFill>
+                  <a:schemeClr val="bg1"/>
+                </a:solidFill>
+              </a:rPr>
+              <a:t>TaskBookStorage</a:t>
+            </a:r>
+            <a:endParaRPr lang="en-SG" sz="1050" dirty="0">
+              <a:solidFill>
+                <a:schemeClr val="bg1"/>
+              </a:solidFill>
+            </a:endParaRPr>
+          </a:p>
+        </p:txBody>
+      </p:sp>
+      <p:sp>
+        <p:nvSpPr>
+          <p:cNvPr id="9" name="Rectangle 62"/>
+          <p:cNvSpPr/>
+          <p:nvPr/>
+        </p:nvSpPr>
+        <p:spPr>
+          <a:xfrm rot="16200000">
+            <a:off x="1683963" y="2868687"/>
+            <a:ext cx="1093635" cy="346760"/>
+          </a:xfrm>
+          <a:prstGeom prst="rect">
+            <a:avLst/>
+          </a:prstGeom>
+          <a:solidFill>
+            <a:schemeClr val="accent6">
+              <a:lumMod val="75000"/>
+            </a:schemeClr>
+          </a:solidFill>
+          <a:ln w="19050">
+            <a:solidFill>
+              <a:schemeClr val="accent6">
+                <a:lumMod val="75000"/>
+              </a:schemeClr>
+            </a:solidFill>
+          </a:ln>
+          <a:effectLst/>
+        </p:spPr>
+        <p:style>
+          <a:lnRef idx="1">
+            <a:schemeClr val="accent2"/>
+          </a:lnRef>
+          <a:fillRef idx="2">
+            <a:schemeClr val="accent2"/>
+          </a:fillRef>
+          <a:effectRef idx="1">
+            <a:schemeClr val="accent2"/>
+          </a:effectRef>
+          <a:fontRef idx="minor">
+            <a:schemeClr val="dk1"/>
+          </a:fontRef>
+        </p:style>
+        <p:txBody>
+          <a:bodyPr rtlCol="0" anchor="ctr"/>
+          <a:lstStyle/>
           <a:p>
             <a:pPr algn="ctr"/>
             <a:r>
-              <a:rPr lang="en-US" sz="1050" dirty="0" smtClean="0">
+              <a:rPr lang="en-US" sz="1050" dirty="0" err="1">
+                <a:solidFill>
+                  <a:schemeClr val="bg1"/>
+                </a:solidFill>
+              </a:rPr>
+              <a:t>StorageManager</a:t>
+            </a:r>
+            <a:endParaRPr lang="en-SG" sz="1050" dirty="0">
+              <a:solidFill>
+                <a:schemeClr val="bg1"/>
+              </a:solidFill>
+            </a:endParaRPr>
+          </a:p>
+        </p:txBody>
+      </p:sp>
+      <p:sp>
+        <p:nvSpPr>
+          <p:cNvPr id="119" name="Rectangle 62"/>
+          <p:cNvSpPr/>
+          <p:nvPr/>
+        </p:nvSpPr>
+        <p:spPr>
+          <a:xfrm rot="16200000">
+            <a:off x="956202" y="2861202"/>
+            <a:ext cx="1093635" cy="346760"/>
+          </a:xfrm>
+          <a:prstGeom prst="rect">
+            <a:avLst/>
+          </a:prstGeom>
+          <a:solidFill>
+            <a:schemeClr val="accent6">
+              <a:lumMod val="75000"/>
+            </a:schemeClr>
+          </a:solidFill>
+          <a:ln w="19050">
+            <a:solidFill>
+              <a:schemeClr val="accent6">
+                <a:lumMod val="75000"/>
+              </a:schemeClr>
+            </a:solidFill>
+          </a:ln>
+          <a:effectLst/>
+        </p:spPr>
+        <p:style>
+          <a:lnRef idx="1">
+            <a:schemeClr val="accent2"/>
+          </a:lnRef>
+          <a:fillRef idx="2">
+            <a:schemeClr val="accent2"/>
+          </a:fillRef>
+          <a:effectRef idx="1">
+            <a:schemeClr val="accent2"/>
+          </a:effectRef>
+          <a:fontRef idx="minor">
+            <a:schemeClr val="dk1"/>
+          </a:fontRef>
+        </p:style>
+        <p:txBody>
+          <a:bodyPr rtlCol="0" anchor="ctr"/>
+          <a:lstStyle/>
+          <a:p>
+            <a:pPr algn="ctr"/>
+            <a:r>
+              <a:rPr lang="en-US" sz="1050" dirty="0">
+                <a:solidFill>
+                  <a:schemeClr val="bg1"/>
+                </a:solidFill>
+              </a:rPr>
+              <a:t>&lt;&lt;interface&gt;&gt;</a:t>
+            </a:r>
+          </a:p>
+          <a:p>
+            <a:pPr algn="ctr"/>
+            <a:r>
+              <a:rPr lang="en-US" sz="1050" dirty="0">
                 <a:solidFill>
                   <a:schemeClr val="bg1"/>
                 </a:solidFill>
@@ -16123,27 +16003,17 @@
           <a:p>
             <a:pPr algn="ctr"/>
             <a:r>
-              <a:rPr lang="en-US" sz="1050" b="1" dirty="0" err="1" smtClean="0">
+              <a:rPr lang="en-US" sz="1050" b="1" dirty="0" err="1">
                 <a:solidFill>
                   <a:schemeClr val="accent6">
                     <a:lumMod val="75000"/>
                   </a:schemeClr>
                 </a:solidFill>
               </a:rPr>
-              <a:t>XmlAddressBook</a:t>
-            </a:r>
-            <a:r>
-              <a:rPr lang="en-US" sz="1050" b="1" dirty="0" smtClean="0">
-                <a:solidFill>
-                  <a:schemeClr val="accent6">
-                    <a:lumMod val="75000"/>
-                  </a:schemeClr>
-                </a:solidFill>
-              </a:rPr>
-              <a:t/>
+              <a:t>XmlTaskbook</a:t>
             </a:r>
             <a:br>
-              <a:rPr lang="en-US" sz="1050" b="1" dirty="0" smtClean="0">
+              <a:rPr lang="en-US" sz="1050" b="1" dirty="0">
                 <a:solidFill>
                   <a:schemeClr val="accent6">
                     <a:lumMod val="75000"/>
@@ -16152,7 +16022,7 @@
               </a:rPr>
             </a:br>
             <a:r>
-              <a:rPr lang="en-US" sz="1050" b="1" dirty="0" smtClean="0">
+              <a:rPr lang="en-US" sz="1050" b="1" dirty="0">
                 <a:solidFill>
                   <a:schemeClr val="accent6">
                     <a:lumMod val="75000"/>
@@ -16219,7 +16089,7 @@
           <a:p>
             <a:pPr algn="ctr"/>
             <a:r>
-              <a:rPr lang="en-US" sz="1050" dirty="0" smtClean="0">
+              <a:rPr lang="en-US" sz="1050" dirty="0">
                 <a:solidFill>
                   <a:schemeClr val="bg1"/>
                 </a:solidFill>
@@ -16227,14 +16097,14 @@
               <a:t>&lt;&lt;interface&gt;&gt;</a:t>
             </a:r>
             <a:br>
-              <a:rPr lang="en-US" sz="1050" dirty="0" smtClean="0">
+              <a:rPr lang="en-US" sz="1050" dirty="0">
                 <a:solidFill>
                   <a:schemeClr val="bg1"/>
                 </a:solidFill>
               </a:rPr>
             </a:br>
             <a:r>
-              <a:rPr lang="en-US" sz="1050" dirty="0" err="1" smtClean="0">
+              <a:rPr lang="en-US" sz="1050" dirty="0" err="1">
                 <a:solidFill>
                   <a:schemeClr val="bg1"/>
                 </a:solidFill>
@@ -16492,30 +16362,22 @@
           <a:p>
             <a:pPr algn="ctr"/>
             <a:r>
-              <a:rPr lang="en-US" sz="1050" dirty="0" err="1" smtClean="0">
+              <a:rPr lang="en-US" sz="1050" dirty="0" err="1">
                 <a:solidFill>
                   <a:schemeClr val="bg1"/>
                 </a:solidFill>
               </a:rPr>
               <a:t>JsonUserPrefs</a:t>
             </a:r>
-            <a:r>
-              <a:rPr lang="en-US" sz="1050" dirty="0" smtClean="0">
-                <a:solidFill>
-                  <a:schemeClr val="bg1"/>
-                </a:solidFill>
-              </a:rPr>
-              <a:t/>
-            </a:r>
             <a:br>
-              <a:rPr lang="en-US" sz="1050" dirty="0" smtClean="0">
+              <a:rPr lang="en-US" sz="1050" dirty="0">
                 <a:solidFill>
                   <a:schemeClr val="bg1"/>
                 </a:solidFill>
               </a:rPr>
             </a:br>
             <a:r>
-              <a:rPr lang="en-US" sz="1050" dirty="0" smtClean="0">
+              <a:rPr lang="en-US" sz="1050" dirty="0">
                 <a:solidFill>
                   <a:schemeClr val="bg1"/>
                 </a:solidFill>
@@ -16567,7 +16429,7 @@
           <a:p>
             <a:pPr algn="ctr"/>
             <a:r>
-              <a:rPr lang="en-US" sz="1050" b="1" dirty="0" err="1" smtClean="0">
+              <a:rPr lang="en-US" sz="1050" b="1" dirty="0" err="1">
                 <a:solidFill>
                   <a:schemeClr val="accent6">
                     <a:lumMod val="75000"/>
@@ -16576,18 +16438,8 @@
               </a:rPr>
               <a:t>XmlSerializable</a:t>
             </a:r>
-            <a:r>
-              <a:rPr lang="en-US" sz="1050" b="1" dirty="0" smtClean="0">
-                <a:solidFill>
-                  <a:schemeClr val="accent6">
-                    <a:lumMod val="75000"/>
-                  </a:schemeClr>
-                </a:solidFill>
-              </a:rPr>
-              <a:t/>
-            </a:r>
             <a:br>
-              <a:rPr lang="en-US" sz="1050" b="1" dirty="0" smtClean="0">
+              <a:rPr lang="en-US" sz="1050" b="1" dirty="0">
                 <a:solidFill>
                   <a:schemeClr val="accent6">
                     <a:lumMod val="75000"/>
@@ -16596,14 +16448,14 @@
               </a:rPr>
             </a:br>
             <a:r>
-              <a:rPr lang="en-US" sz="1050" b="1" dirty="0" err="1" smtClean="0">
+              <a:rPr lang="en-US" sz="1050" b="1" dirty="0" err="1">
                 <a:solidFill>
                   <a:schemeClr val="accent6">
                     <a:lumMod val="75000"/>
                   </a:schemeClr>
                 </a:solidFill>
               </a:rPr>
-              <a:t>AddressBook</a:t>
+              <a:t>TaskBook</a:t>
             </a:r>
             <a:endParaRPr lang="en-SG" sz="1050" b="1" dirty="0">
               <a:solidFill>
@@ -16693,7 +16545,7 @@
           <a:p>
             <a:pPr algn="ctr"/>
             <a:r>
-              <a:rPr lang="en-US" sz="1050" b="1" dirty="0" err="1" smtClean="0">
+              <a:rPr lang="en-US" sz="1050" b="1" dirty="0" err="1">
                 <a:solidFill>
                   <a:schemeClr val="accent6">
                     <a:lumMod val="75000"/>
@@ -16749,14 +16601,14 @@
           <a:p>
             <a:pPr algn="ctr"/>
             <a:r>
-              <a:rPr lang="en-US" sz="1050" b="1" dirty="0" err="1" smtClean="0">
+              <a:rPr lang="en-US" sz="1050" b="1" dirty="0" err="1">
                 <a:solidFill>
                   <a:schemeClr val="accent6">
                     <a:lumMod val="75000"/>
                   </a:schemeClr>
                 </a:solidFill>
               </a:rPr>
-              <a:t>XmlAdaptedPerson</a:t>
+              <a:t>XmlAdaptedTasks</a:t>
             </a:r>
             <a:endParaRPr lang="en-SG" sz="1050" b="1" dirty="0">
               <a:solidFill>
@@ -16819,13 +16671,6 @@
   <p:clrMapOvr>
     <a:masterClrMapping/>
   </p:clrMapOvr>
-  <p:timing>
-    <p:tnLst>
-      <p:par>
-        <p:cTn id="1" dur="indefinite" restart="never" nodeType="tmRoot"/>
-      </p:par>
-    </p:tnLst>
-  </p:timing>
 </p:sld>
 </file>
 

</xml_diff>

<commit_message>
editing userguide to add more pictures
</commit_message>
<xml_diff>
--- a/docs/diagrams/Diagrams.pptx
+++ b/docs/diagrams/Diagrams.pptx
@@ -216,7 +216,7 @@
           <a:p>
             <a:fld id="{F5CC4B3F-88C1-4FFA-B1B6-F41C21DC6924}" type="datetimeFigureOut">
               <a:rPr lang="en-US" smtClean="0"/>
-              <a:t>10/21/2016</a:t>
+              <a:t>11/2/2016</a:t>
             </a:fld>
             <a:endParaRPr lang="en-US"/>
           </a:p>
@@ -662,7 +662,7 @@
           <a:p>
             <a:fld id="{78C97017-6FC3-485B-9764-EAC9E56C1D49}" type="datetimeFigureOut">
               <a:rPr lang="en-US" smtClean="0"/>
-              <a:t>10/21/2016</a:t>
+              <a:t>11/2/2016</a:t>
             </a:fld>
             <a:endParaRPr lang="en-US"/>
           </a:p>
@@ -830,7 +830,7 @@
           <a:p>
             <a:fld id="{78C97017-6FC3-485B-9764-EAC9E56C1D49}" type="datetimeFigureOut">
               <a:rPr lang="en-US" smtClean="0"/>
-              <a:t>10/21/2016</a:t>
+              <a:t>11/2/2016</a:t>
             </a:fld>
             <a:endParaRPr lang="en-US"/>
           </a:p>
@@ -1008,7 +1008,7 @@
           <a:p>
             <a:fld id="{78C97017-6FC3-485B-9764-EAC9E56C1D49}" type="datetimeFigureOut">
               <a:rPr lang="en-US" smtClean="0"/>
-              <a:t>10/21/2016</a:t>
+              <a:t>11/2/2016</a:t>
             </a:fld>
             <a:endParaRPr lang="en-US"/>
           </a:p>
@@ -1176,7 +1176,7 @@
           <a:p>
             <a:fld id="{78C97017-6FC3-485B-9764-EAC9E56C1D49}" type="datetimeFigureOut">
               <a:rPr lang="en-US" smtClean="0"/>
-              <a:t>10/21/2016</a:t>
+              <a:t>11/2/2016</a:t>
             </a:fld>
             <a:endParaRPr lang="en-US"/>
           </a:p>
@@ -1421,7 +1421,7 @@
           <a:p>
             <a:fld id="{78C97017-6FC3-485B-9764-EAC9E56C1D49}" type="datetimeFigureOut">
               <a:rPr lang="en-US" smtClean="0"/>
-              <a:t>10/21/2016</a:t>
+              <a:t>11/2/2016</a:t>
             </a:fld>
             <a:endParaRPr lang="en-US"/>
           </a:p>
@@ -1706,7 +1706,7 @@
           <a:p>
             <a:fld id="{78C97017-6FC3-485B-9764-EAC9E56C1D49}" type="datetimeFigureOut">
               <a:rPr lang="en-US" smtClean="0"/>
-              <a:t>10/21/2016</a:t>
+              <a:t>11/2/2016</a:t>
             </a:fld>
             <a:endParaRPr lang="en-US"/>
           </a:p>
@@ -2125,7 +2125,7 @@
           <a:p>
             <a:fld id="{78C97017-6FC3-485B-9764-EAC9E56C1D49}" type="datetimeFigureOut">
               <a:rPr lang="en-US" smtClean="0"/>
-              <a:t>10/21/2016</a:t>
+              <a:t>11/2/2016</a:t>
             </a:fld>
             <a:endParaRPr lang="en-US"/>
           </a:p>
@@ -2242,7 +2242,7 @@
           <a:p>
             <a:fld id="{78C97017-6FC3-485B-9764-EAC9E56C1D49}" type="datetimeFigureOut">
               <a:rPr lang="en-US" smtClean="0"/>
-              <a:t>10/21/2016</a:t>
+              <a:t>11/2/2016</a:t>
             </a:fld>
             <a:endParaRPr lang="en-US"/>
           </a:p>
@@ -2337,7 +2337,7 @@
           <a:p>
             <a:fld id="{78C97017-6FC3-485B-9764-EAC9E56C1D49}" type="datetimeFigureOut">
               <a:rPr lang="en-US" smtClean="0"/>
-              <a:t>10/21/2016</a:t>
+              <a:t>11/2/2016</a:t>
             </a:fld>
             <a:endParaRPr lang="en-US"/>
           </a:p>
@@ -2612,7 +2612,7 @@
           <a:p>
             <a:fld id="{78C97017-6FC3-485B-9764-EAC9E56C1D49}" type="datetimeFigureOut">
               <a:rPr lang="en-US" smtClean="0"/>
-              <a:t>10/21/2016</a:t>
+              <a:t>11/2/2016</a:t>
             </a:fld>
             <a:endParaRPr lang="en-US"/>
           </a:p>
@@ -2864,7 +2864,7 @@
           <a:p>
             <a:fld id="{78C97017-6FC3-485B-9764-EAC9E56C1D49}" type="datetimeFigureOut">
               <a:rPr lang="en-US" smtClean="0"/>
-              <a:t>10/21/2016</a:t>
+              <a:t>11/2/2016</a:t>
             </a:fld>
             <a:endParaRPr lang="en-US"/>
           </a:p>
@@ -3075,7 +3075,7 @@
           <a:p>
             <a:fld id="{78C97017-6FC3-485B-9764-EAC9E56C1D49}" type="datetimeFigureOut">
               <a:rPr lang="en-US" smtClean="0"/>
-              <a:t>10/21/2016</a:t>
+              <a:t>11/2/2016</a:t>
             </a:fld>
             <a:endParaRPr lang="en-US"/>
           </a:p>
@@ -16691,6 +16691,2707 @@
           <a:chExt cx="0" cy="0"/>
         </a:xfrm>
       </p:grpSpPr>
+      <p:sp>
+        <p:nvSpPr>
+          <p:cNvPr id="2" name="Rectangle: Rounded Corners 1"/>
+          <p:cNvSpPr/>
+          <p:nvPr/>
+        </p:nvSpPr>
+        <p:spPr>
+          <a:xfrm>
+            <a:off x="-654416" y="527530"/>
+            <a:ext cx="2209800" cy="838200"/>
+          </a:xfrm>
+          <a:prstGeom prst="roundRect">
+            <a:avLst/>
+          </a:prstGeom>
+        </p:spPr>
+        <p:style>
+          <a:lnRef idx="2">
+            <a:schemeClr val="accent1">
+              <a:shade val="50000"/>
+            </a:schemeClr>
+          </a:lnRef>
+          <a:fillRef idx="1">
+            <a:schemeClr val="accent1"/>
+          </a:fillRef>
+          <a:effectRef idx="0">
+            <a:schemeClr val="accent1"/>
+          </a:effectRef>
+          <a:fontRef idx="minor">
+            <a:schemeClr val="lt1"/>
+          </a:fontRef>
+        </p:style>
+        <p:txBody>
+          <a:bodyPr rtlCol="0" anchor="ctr"/>
+          <a:lstStyle/>
+          <a:p>
+            <a:pPr algn="ctr"/>
+            <a:r>
+              <a:rPr lang="en-SG" sz="1400" dirty="0">
+                <a:latin typeface="Verdana" panose="020B0604030504040204" pitchFamily="34" charset="0"/>
+                <a:ea typeface="Verdana" panose="020B0604030504040204" pitchFamily="34" charset="0"/>
+                <a:cs typeface="Verdana" panose="020B0604030504040204" pitchFamily="34" charset="0"/>
+              </a:rPr>
+              <a:t>User opens </a:t>
+            </a:r>
+            <a:r>
+              <a:rPr lang="en-SG" sz="1400" dirty="0" err="1">
+                <a:latin typeface="Verdana" panose="020B0604030504040204" pitchFamily="34" charset="0"/>
+                <a:ea typeface="Verdana" panose="020B0604030504040204" pitchFamily="34" charset="0"/>
+                <a:cs typeface="Verdana" panose="020B0604030504040204" pitchFamily="34" charset="0"/>
+              </a:rPr>
+              <a:t>taskbook</a:t>
+            </a:r>
+            <a:endParaRPr lang="en-SG" sz="1400" dirty="0">
+              <a:latin typeface="Verdana" panose="020B0604030504040204" pitchFamily="34" charset="0"/>
+              <a:ea typeface="Verdana" panose="020B0604030504040204" pitchFamily="34" charset="0"/>
+              <a:cs typeface="Verdana" panose="020B0604030504040204" pitchFamily="34" charset="0"/>
+            </a:endParaRPr>
+          </a:p>
+        </p:txBody>
+      </p:sp>
+      <p:sp>
+        <p:nvSpPr>
+          <p:cNvPr id="3" name="Rectangle: Rounded Corners 2"/>
+          <p:cNvSpPr/>
+          <p:nvPr/>
+        </p:nvSpPr>
+        <p:spPr>
+          <a:xfrm>
+            <a:off x="3276600" y="457200"/>
+            <a:ext cx="2819400" cy="990600"/>
+          </a:xfrm>
+          <a:prstGeom prst="roundRect">
+            <a:avLst/>
+          </a:prstGeom>
+        </p:spPr>
+        <p:style>
+          <a:lnRef idx="2">
+            <a:schemeClr val="accent1">
+              <a:shade val="50000"/>
+            </a:schemeClr>
+          </a:lnRef>
+          <a:fillRef idx="1">
+            <a:schemeClr val="accent1"/>
+          </a:fillRef>
+          <a:effectRef idx="0">
+            <a:schemeClr val="accent1"/>
+          </a:effectRef>
+          <a:fontRef idx="minor">
+            <a:schemeClr val="lt1"/>
+          </a:fontRef>
+        </p:style>
+        <p:txBody>
+          <a:bodyPr rtlCol="0" anchor="ctr"/>
+          <a:lstStyle/>
+          <a:p>
+            <a:pPr algn="ctr"/>
+            <a:r>
+              <a:rPr lang="en-SG" sz="1400" dirty="0">
+                <a:latin typeface="Verdana" panose="020B0604030504040204" pitchFamily="34" charset="0"/>
+                <a:ea typeface="Verdana" panose="020B0604030504040204" pitchFamily="34" charset="0"/>
+                <a:cs typeface="Verdana" panose="020B0604030504040204" pitchFamily="34" charset="0"/>
+              </a:rPr>
+              <a:t>User types a command</a:t>
+            </a:r>
+          </a:p>
+        </p:txBody>
+      </p:sp>
+      <p:sp>
+        <p:nvSpPr>
+          <p:cNvPr id="5" name="Diamond 4"/>
+          <p:cNvSpPr/>
+          <p:nvPr/>
+        </p:nvSpPr>
+        <p:spPr>
+          <a:xfrm>
+            <a:off x="1828800" y="3501737"/>
+            <a:ext cx="571501" cy="477583"/>
+          </a:xfrm>
+          <a:prstGeom prst="diamond">
+            <a:avLst/>
+          </a:prstGeom>
+          <a:solidFill>
+            <a:srgbClr val="FFFF00"/>
+          </a:solidFill>
+        </p:spPr>
+        <p:style>
+          <a:lnRef idx="2">
+            <a:schemeClr val="accent1">
+              <a:shade val="50000"/>
+            </a:schemeClr>
+          </a:lnRef>
+          <a:fillRef idx="1">
+            <a:schemeClr val="accent1"/>
+          </a:fillRef>
+          <a:effectRef idx="0">
+            <a:schemeClr val="accent1"/>
+          </a:effectRef>
+          <a:fontRef idx="minor">
+            <a:schemeClr val="lt1"/>
+          </a:fontRef>
+        </p:style>
+        <p:txBody>
+          <a:bodyPr rtlCol="0" anchor="ctr"/>
+          <a:lstStyle/>
+          <a:p>
+            <a:pPr algn="ctr"/>
+            <a:endParaRPr lang="en-SG" sz="1400">
+              <a:latin typeface="Verdana" panose="020B0604030504040204" pitchFamily="34" charset="0"/>
+              <a:ea typeface="Verdana" panose="020B0604030504040204" pitchFamily="34" charset="0"/>
+              <a:cs typeface="Verdana" panose="020B0604030504040204" pitchFamily="34" charset="0"/>
+            </a:endParaRPr>
+          </a:p>
+        </p:txBody>
+      </p:sp>
+      <p:sp>
+        <p:nvSpPr>
+          <p:cNvPr id="6" name="Rectangle: Rounded Corners 5"/>
+          <p:cNvSpPr/>
+          <p:nvPr/>
+        </p:nvSpPr>
+        <p:spPr>
+          <a:xfrm>
+            <a:off x="1490660" y="2492482"/>
+            <a:ext cx="1214440" cy="750487"/>
+          </a:xfrm>
+          <a:prstGeom prst="roundRect">
+            <a:avLst/>
+          </a:prstGeom>
+        </p:spPr>
+        <p:style>
+          <a:lnRef idx="2">
+            <a:schemeClr val="accent1">
+              <a:shade val="50000"/>
+            </a:schemeClr>
+          </a:lnRef>
+          <a:fillRef idx="1">
+            <a:schemeClr val="accent1"/>
+          </a:fillRef>
+          <a:effectRef idx="0">
+            <a:schemeClr val="accent1"/>
+          </a:effectRef>
+          <a:fontRef idx="minor">
+            <a:schemeClr val="lt1"/>
+          </a:fontRef>
+        </p:style>
+        <p:txBody>
+          <a:bodyPr rtlCol="0" anchor="ctr"/>
+          <a:lstStyle/>
+          <a:p>
+            <a:pPr algn="ctr"/>
+            <a:r>
+              <a:rPr lang="en-SG" sz="1400" dirty="0" err="1">
+                <a:latin typeface="Verdana" panose="020B0604030504040204" pitchFamily="34" charset="0"/>
+                <a:ea typeface="Verdana" panose="020B0604030504040204" pitchFamily="34" charset="0"/>
+                <a:cs typeface="Verdana" panose="020B0604030504040204" pitchFamily="34" charset="0"/>
+              </a:rPr>
+              <a:t>Shortkey</a:t>
+            </a:r>
+            <a:endParaRPr lang="en-SG" sz="1400" dirty="0">
+              <a:latin typeface="Verdana" panose="020B0604030504040204" pitchFamily="34" charset="0"/>
+              <a:ea typeface="Verdana" panose="020B0604030504040204" pitchFamily="34" charset="0"/>
+              <a:cs typeface="Verdana" panose="020B0604030504040204" pitchFamily="34" charset="0"/>
+            </a:endParaRPr>
+          </a:p>
+          <a:p>
+            <a:pPr algn="ctr"/>
+            <a:r>
+              <a:rPr lang="en-SG" sz="1400" dirty="0">
+                <a:latin typeface="Verdana" panose="020B0604030504040204" pitchFamily="34" charset="0"/>
+                <a:ea typeface="Verdana" panose="020B0604030504040204" pitchFamily="34" charset="0"/>
+                <a:cs typeface="Verdana" panose="020B0604030504040204" pitchFamily="34" charset="0"/>
+              </a:rPr>
+              <a:t>Command activated</a:t>
+            </a:r>
+          </a:p>
+        </p:txBody>
+      </p:sp>
+      <p:sp>
+        <p:nvSpPr>
+          <p:cNvPr id="7" name="Rectangle: Rounded Corners 6"/>
+          <p:cNvSpPr/>
+          <p:nvPr/>
+        </p:nvSpPr>
+        <p:spPr>
+          <a:xfrm>
+            <a:off x="-1841454" y="2548557"/>
+            <a:ext cx="1187038" cy="694411"/>
+          </a:xfrm>
+          <a:prstGeom prst="roundRect">
+            <a:avLst/>
+          </a:prstGeom>
+        </p:spPr>
+        <p:style>
+          <a:lnRef idx="2">
+            <a:schemeClr val="accent1">
+              <a:shade val="50000"/>
+            </a:schemeClr>
+          </a:lnRef>
+          <a:fillRef idx="1">
+            <a:schemeClr val="accent1"/>
+          </a:fillRef>
+          <a:effectRef idx="0">
+            <a:schemeClr val="accent1"/>
+          </a:effectRef>
+          <a:fontRef idx="minor">
+            <a:schemeClr val="lt1"/>
+          </a:fontRef>
+        </p:style>
+        <p:txBody>
+          <a:bodyPr rtlCol="0" anchor="ctr"/>
+          <a:lstStyle/>
+          <a:p>
+            <a:pPr algn="ctr"/>
+            <a:r>
+              <a:rPr lang="en-SG" sz="1400" dirty="0">
+                <a:latin typeface="Verdana" panose="020B0604030504040204" pitchFamily="34" charset="0"/>
+                <a:ea typeface="Verdana" panose="020B0604030504040204" pitchFamily="34" charset="0"/>
+                <a:cs typeface="Verdana" panose="020B0604030504040204" pitchFamily="34" charset="0"/>
+              </a:rPr>
+              <a:t>Move file</a:t>
+            </a:r>
+          </a:p>
+          <a:p>
+            <a:pPr algn="ctr"/>
+            <a:r>
+              <a:rPr lang="en-SG" sz="1400" dirty="0">
+                <a:latin typeface="Verdana" panose="020B0604030504040204" pitchFamily="34" charset="0"/>
+                <a:ea typeface="Verdana" panose="020B0604030504040204" pitchFamily="34" charset="0"/>
+                <a:cs typeface="Verdana" panose="020B0604030504040204" pitchFamily="34" charset="0"/>
+              </a:rPr>
+              <a:t>Command activated</a:t>
+            </a:r>
+          </a:p>
+        </p:txBody>
+      </p:sp>
+      <p:sp>
+        <p:nvSpPr>
+          <p:cNvPr id="8" name="Rectangle: Rounded Corners 7"/>
+          <p:cNvSpPr/>
+          <p:nvPr/>
+        </p:nvSpPr>
+        <p:spPr>
+          <a:xfrm>
+            <a:off x="4114800" y="2426778"/>
+            <a:ext cx="1210524" cy="805862"/>
+          </a:xfrm>
+          <a:prstGeom prst="roundRect">
+            <a:avLst/>
+          </a:prstGeom>
+        </p:spPr>
+        <p:style>
+          <a:lnRef idx="2">
+            <a:schemeClr val="accent1">
+              <a:shade val="50000"/>
+            </a:schemeClr>
+          </a:lnRef>
+          <a:fillRef idx="1">
+            <a:schemeClr val="accent1"/>
+          </a:fillRef>
+          <a:effectRef idx="0">
+            <a:schemeClr val="accent1"/>
+          </a:effectRef>
+          <a:fontRef idx="minor">
+            <a:schemeClr val="lt1"/>
+          </a:fontRef>
+        </p:style>
+        <p:txBody>
+          <a:bodyPr rtlCol="0" anchor="ctr"/>
+          <a:lstStyle/>
+          <a:p>
+            <a:pPr algn="ctr"/>
+            <a:r>
+              <a:rPr lang="en-SG" sz="1400" dirty="0">
+                <a:latin typeface="Verdana" panose="020B0604030504040204" pitchFamily="34" charset="0"/>
+                <a:ea typeface="Verdana" panose="020B0604030504040204" pitchFamily="34" charset="0"/>
+                <a:cs typeface="Verdana" panose="020B0604030504040204" pitchFamily="34" charset="0"/>
+              </a:rPr>
+              <a:t>Update</a:t>
+            </a:r>
+          </a:p>
+          <a:p>
+            <a:pPr algn="ctr"/>
+            <a:r>
+              <a:rPr lang="en-SG" sz="1400" dirty="0">
+                <a:latin typeface="Verdana" panose="020B0604030504040204" pitchFamily="34" charset="0"/>
+                <a:ea typeface="Verdana" panose="020B0604030504040204" pitchFamily="34" charset="0"/>
+                <a:cs typeface="Verdana" panose="020B0604030504040204" pitchFamily="34" charset="0"/>
+              </a:rPr>
+              <a:t>Command activated</a:t>
+            </a:r>
+          </a:p>
+        </p:txBody>
+      </p:sp>
+      <p:sp>
+        <p:nvSpPr>
+          <p:cNvPr id="9" name="Rectangle: Rounded Corners 8"/>
+          <p:cNvSpPr/>
+          <p:nvPr/>
+        </p:nvSpPr>
+        <p:spPr>
+          <a:xfrm>
+            <a:off x="5384756" y="2478709"/>
+            <a:ext cx="1214440" cy="738805"/>
+          </a:xfrm>
+          <a:prstGeom prst="roundRect">
+            <a:avLst/>
+          </a:prstGeom>
+        </p:spPr>
+        <p:style>
+          <a:lnRef idx="2">
+            <a:schemeClr val="accent1">
+              <a:shade val="50000"/>
+            </a:schemeClr>
+          </a:lnRef>
+          <a:fillRef idx="1">
+            <a:schemeClr val="accent1"/>
+          </a:fillRef>
+          <a:effectRef idx="0">
+            <a:schemeClr val="accent1"/>
+          </a:effectRef>
+          <a:fontRef idx="minor">
+            <a:schemeClr val="lt1"/>
+          </a:fontRef>
+        </p:style>
+        <p:txBody>
+          <a:bodyPr rtlCol="0" anchor="ctr"/>
+          <a:lstStyle/>
+          <a:p>
+            <a:pPr algn="ctr"/>
+            <a:r>
+              <a:rPr lang="en-SG" sz="1400" dirty="0">
+                <a:latin typeface="Verdana" panose="020B0604030504040204" pitchFamily="34" charset="0"/>
+                <a:ea typeface="Verdana" panose="020B0604030504040204" pitchFamily="34" charset="0"/>
+                <a:cs typeface="Verdana" panose="020B0604030504040204" pitchFamily="34" charset="0"/>
+              </a:rPr>
+              <a:t>Delete</a:t>
+            </a:r>
+          </a:p>
+          <a:p>
+            <a:pPr algn="ctr"/>
+            <a:r>
+              <a:rPr lang="en-SG" sz="1400" dirty="0">
+                <a:latin typeface="Verdana" panose="020B0604030504040204" pitchFamily="34" charset="0"/>
+                <a:ea typeface="Verdana" panose="020B0604030504040204" pitchFamily="34" charset="0"/>
+                <a:cs typeface="Verdana" panose="020B0604030504040204" pitchFamily="34" charset="0"/>
+              </a:rPr>
+              <a:t>Command activated</a:t>
+            </a:r>
+          </a:p>
+        </p:txBody>
+      </p:sp>
+      <p:sp>
+        <p:nvSpPr>
+          <p:cNvPr id="10" name="Rectangle: Rounded Corners 9"/>
+          <p:cNvSpPr/>
+          <p:nvPr/>
+        </p:nvSpPr>
+        <p:spPr>
+          <a:xfrm>
+            <a:off x="6678198" y="2466444"/>
+            <a:ext cx="1170402" cy="783198"/>
+          </a:xfrm>
+          <a:prstGeom prst="roundRect">
+            <a:avLst/>
+          </a:prstGeom>
+        </p:spPr>
+        <p:style>
+          <a:lnRef idx="2">
+            <a:schemeClr val="accent1">
+              <a:shade val="50000"/>
+            </a:schemeClr>
+          </a:lnRef>
+          <a:fillRef idx="1">
+            <a:schemeClr val="accent1"/>
+          </a:fillRef>
+          <a:effectRef idx="0">
+            <a:schemeClr val="accent1"/>
+          </a:effectRef>
+          <a:fontRef idx="minor">
+            <a:schemeClr val="lt1"/>
+          </a:fontRef>
+        </p:style>
+        <p:txBody>
+          <a:bodyPr rtlCol="0" anchor="ctr"/>
+          <a:lstStyle/>
+          <a:p>
+            <a:pPr algn="ctr"/>
+            <a:r>
+              <a:rPr lang="en-SG" sz="1400" dirty="0">
+                <a:latin typeface="Verdana" panose="020B0604030504040204" pitchFamily="34" charset="0"/>
+                <a:ea typeface="Verdana" panose="020B0604030504040204" pitchFamily="34" charset="0"/>
+                <a:cs typeface="Verdana" panose="020B0604030504040204" pitchFamily="34" charset="0"/>
+              </a:rPr>
+              <a:t>Add</a:t>
+            </a:r>
+          </a:p>
+          <a:p>
+            <a:pPr algn="ctr"/>
+            <a:r>
+              <a:rPr lang="en-SG" sz="1400" dirty="0">
+                <a:latin typeface="Verdana" panose="020B0604030504040204" pitchFamily="34" charset="0"/>
+                <a:ea typeface="Verdana" panose="020B0604030504040204" pitchFamily="34" charset="0"/>
+                <a:cs typeface="Verdana" panose="020B0604030504040204" pitchFamily="34" charset="0"/>
+              </a:rPr>
+              <a:t>Command activated</a:t>
+            </a:r>
+          </a:p>
+        </p:txBody>
+      </p:sp>
+      <p:sp>
+        <p:nvSpPr>
+          <p:cNvPr id="11" name="Rectangle: Rounded Corners 10"/>
+          <p:cNvSpPr/>
+          <p:nvPr/>
+        </p:nvSpPr>
+        <p:spPr>
+          <a:xfrm>
+            <a:off x="7879914" y="2494367"/>
+            <a:ext cx="1264086" cy="694411"/>
+          </a:xfrm>
+          <a:prstGeom prst="roundRect">
+            <a:avLst/>
+          </a:prstGeom>
+        </p:spPr>
+        <p:style>
+          <a:lnRef idx="2">
+            <a:schemeClr val="accent1">
+              <a:shade val="50000"/>
+            </a:schemeClr>
+          </a:lnRef>
+          <a:fillRef idx="1">
+            <a:schemeClr val="accent1"/>
+          </a:fillRef>
+          <a:effectRef idx="0">
+            <a:schemeClr val="accent1"/>
+          </a:effectRef>
+          <a:fontRef idx="minor">
+            <a:schemeClr val="lt1"/>
+          </a:fontRef>
+        </p:style>
+        <p:txBody>
+          <a:bodyPr rtlCol="0" anchor="ctr"/>
+          <a:lstStyle/>
+          <a:p>
+            <a:pPr algn="ctr"/>
+            <a:r>
+              <a:rPr lang="en-SG" sz="1400" dirty="0">
+                <a:latin typeface="Verdana" panose="020B0604030504040204" pitchFamily="34" charset="0"/>
+                <a:ea typeface="Verdana" panose="020B0604030504040204" pitchFamily="34" charset="0"/>
+                <a:cs typeface="Verdana" panose="020B0604030504040204" pitchFamily="34" charset="0"/>
+              </a:rPr>
+              <a:t>List Command activated</a:t>
+            </a:r>
+          </a:p>
+        </p:txBody>
+      </p:sp>
+      <p:sp>
+        <p:nvSpPr>
+          <p:cNvPr id="12" name="Rectangle: Rounded Corners 11"/>
+          <p:cNvSpPr/>
+          <p:nvPr/>
+        </p:nvSpPr>
+        <p:spPr>
+          <a:xfrm>
+            <a:off x="2828076" y="2466444"/>
+            <a:ext cx="1210524" cy="805862"/>
+          </a:xfrm>
+          <a:prstGeom prst="roundRect">
+            <a:avLst/>
+          </a:prstGeom>
+        </p:spPr>
+        <p:style>
+          <a:lnRef idx="2">
+            <a:schemeClr val="accent1">
+              <a:shade val="50000"/>
+            </a:schemeClr>
+          </a:lnRef>
+          <a:fillRef idx="1">
+            <a:schemeClr val="accent1"/>
+          </a:fillRef>
+          <a:effectRef idx="0">
+            <a:schemeClr val="accent1"/>
+          </a:effectRef>
+          <a:fontRef idx="minor">
+            <a:schemeClr val="lt1"/>
+          </a:fontRef>
+        </p:style>
+        <p:txBody>
+          <a:bodyPr rtlCol="0" anchor="ctr"/>
+          <a:lstStyle/>
+          <a:p>
+            <a:pPr algn="ctr"/>
+            <a:r>
+              <a:rPr lang="en-SG" sz="1400" dirty="0">
+                <a:latin typeface="Verdana" panose="020B0604030504040204" pitchFamily="34" charset="0"/>
+                <a:ea typeface="Verdana" panose="020B0604030504040204" pitchFamily="34" charset="0"/>
+                <a:cs typeface="Verdana" panose="020B0604030504040204" pitchFamily="34" charset="0"/>
+              </a:rPr>
+              <a:t>find</a:t>
+            </a:r>
+          </a:p>
+          <a:p>
+            <a:pPr algn="ctr"/>
+            <a:r>
+              <a:rPr lang="en-SG" sz="1400" dirty="0">
+                <a:latin typeface="Verdana" panose="020B0604030504040204" pitchFamily="34" charset="0"/>
+                <a:ea typeface="Verdana" panose="020B0604030504040204" pitchFamily="34" charset="0"/>
+                <a:cs typeface="Verdana" panose="020B0604030504040204" pitchFamily="34" charset="0"/>
+              </a:rPr>
+              <a:t>Command activated</a:t>
+            </a:r>
+          </a:p>
+        </p:txBody>
+      </p:sp>
+      <p:sp>
+        <p:nvSpPr>
+          <p:cNvPr id="13" name="Rectangle: Rounded Corners 12"/>
+          <p:cNvSpPr/>
+          <p:nvPr/>
+        </p:nvSpPr>
+        <p:spPr>
+          <a:xfrm>
+            <a:off x="9201474" y="2494367"/>
+            <a:ext cx="1187038" cy="694411"/>
+          </a:xfrm>
+          <a:prstGeom prst="roundRect">
+            <a:avLst/>
+          </a:prstGeom>
+        </p:spPr>
+        <p:style>
+          <a:lnRef idx="2">
+            <a:schemeClr val="accent1">
+              <a:shade val="50000"/>
+            </a:schemeClr>
+          </a:lnRef>
+          <a:fillRef idx="1">
+            <a:schemeClr val="accent1"/>
+          </a:fillRef>
+          <a:effectRef idx="0">
+            <a:schemeClr val="accent1"/>
+          </a:effectRef>
+          <a:fontRef idx="minor">
+            <a:schemeClr val="lt1"/>
+          </a:fontRef>
+        </p:style>
+        <p:txBody>
+          <a:bodyPr rtlCol="0" anchor="ctr"/>
+          <a:lstStyle/>
+          <a:p>
+            <a:pPr algn="ctr"/>
+            <a:r>
+              <a:rPr lang="en-SG" sz="1400" dirty="0">
+                <a:latin typeface="Verdana" panose="020B0604030504040204" pitchFamily="34" charset="0"/>
+                <a:ea typeface="Verdana" panose="020B0604030504040204" pitchFamily="34" charset="0"/>
+                <a:cs typeface="Verdana" panose="020B0604030504040204" pitchFamily="34" charset="0"/>
+              </a:rPr>
+              <a:t>undo</a:t>
+            </a:r>
+          </a:p>
+          <a:p>
+            <a:pPr algn="ctr"/>
+            <a:r>
+              <a:rPr lang="en-SG" sz="1400" dirty="0">
+                <a:latin typeface="Verdana" panose="020B0604030504040204" pitchFamily="34" charset="0"/>
+                <a:ea typeface="Verdana" panose="020B0604030504040204" pitchFamily="34" charset="0"/>
+                <a:cs typeface="Verdana" panose="020B0604030504040204" pitchFamily="34" charset="0"/>
+              </a:rPr>
+              <a:t>Command activated</a:t>
+            </a:r>
+          </a:p>
+        </p:txBody>
+      </p:sp>
+      <p:sp>
+        <p:nvSpPr>
+          <p:cNvPr id="14" name="Rectangle: Rounded Corners 13"/>
+          <p:cNvSpPr/>
+          <p:nvPr/>
+        </p:nvSpPr>
+        <p:spPr>
+          <a:xfrm>
+            <a:off x="7743010" y="4698160"/>
+            <a:ext cx="2133600" cy="870536"/>
+          </a:xfrm>
+          <a:prstGeom prst="roundRect">
+            <a:avLst/>
+          </a:prstGeom>
+        </p:spPr>
+        <p:style>
+          <a:lnRef idx="2">
+            <a:schemeClr val="accent1">
+              <a:shade val="50000"/>
+            </a:schemeClr>
+          </a:lnRef>
+          <a:fillRef idx="1">
+            <a:schemeClr val="accent1"/>
+          </a:fillRef>
+          <a:effectRef idx="0">
+            <a:schemeClr val="accent1"/>
+          </a:effectRef>
+          <a:fontRef idx="minor">
+            <a:schemeClr val="lt1"/>
+          </a:fontRef>
+        </p:style>
+        <p:txBody>
+          <a:bodyPr rtlCol="0" anchor="ctr"/>
+          <a:lstStyle/>
+          <a:p>
+            <a:pPr algn="ctr"/>
+            <a:r>
+              <a:rPr lang="en-SG" sz="1400" dirty="0">
+                <a:latin typeface="Verdana" panose="020B0604030504040204" pitchFamily="34" charset="0"/>
+                <a:ea typeface="Verdana" panose="020B0604030504040204" pitchFamily="34" charset="0"/>
+                <a:cs typeface="Verdana" panose="020B0604030504040204" pitchFamily="34" charset="0"/>
+              </a:rPr>
+              <a:t>Changes and saves </a:t>
+            </a:r>
+            <a:r>
+              <a:rPr lang="en-SG" sz="1400" dirty="0" err="1">
+                <a:latin typeface="Verdana" panose="020B0604030504040204" pitchFamily="34" charset="0"/>
+                <a:ea typeface="Verdana" panose="020B0604030504040204" pitchFamily="34" charset="0"/>
+                <a:cs typeface="Verdana" panose="020B0604030504040204" pitchFamily="34" charset="0"/>
+              </a:rPr>
+              <a:t>taskbook</a:t>
+            </a:r>
+            <a:r>
+              <a:rPr lang="en-SG" sz="1400" dirty="0">
+                <a:latin typeface="Verdana" panose="020B0604030504040204" pitchFamily="34" charset="0"/>
+                <a:ea typeface="Verdana" panose="020B0604030504040204" pitchFamily="34" charset="0"/>
+                <a:cs typeface="Verdana" panose="020B0604030504040204" pitchFamily="34" charset="0"/>
+              </a:rPr>
+              <a:t> in predefined xml file</a:t>
+            </a:r>
+          </a:p>
+        </p:txBody>
+      </p:sp>
+      <p:sp>
+        <p:nvSpPr>
+          <p:cNvPr id="16" name="Rectangle: Rounded Corners 15"/>
+          <p:cNvSpPr/>
+          <p:nvPr/>
+        </p:nvSpPr>
+        <p:spPr>
+          <a:xfrm>
+            <a:off x="-2689271" y="4311912"/>
+            <a:ext cx="1219200" cy="1154532"/>
+          </a:xfrm>
+          <a:prstGeom prst="roundRect">
+            <a:avLst/>
+          </a:prstGeom>
+        </p:spPr>
+        <p:style>
+          <a:lnRef idx="2">
+            <a:schemeClr val="accent1">
+              <a:shade val="50000"/>
+            </a:schemeClr>
+          </a:lnRef>
+          <a:fillRef idx="1">
+            <a:schemeClr val="accent1"/>
+          </a:fillRef>
+          <a:effectRef idx="0">
+            <a:schemeClr val="accent1"/>
+          </a:effectRef>
+          <a:fontRef idx="minor">
+            <a:schemeClr val="lt1"/>
+          </a:fontRef>
+        </p:style>
+        <p:txBody>
+          <a:bodyPr rtlCol="0" anchor="ctr"/>
+          <a:lstStyle/>
+          <a:p>
+            <a:pPr algn="ctr"/>
+            <a:r>
+              <a:rPr lang="en-SG" sz="1400" dirty="0">
+                <a:latin typeface="Verdana" panose="020B0604030504040204" pitchFamily="34" charset="0"/>
+                <a:ea typeface="Verdana" panose="020B0604030504040204" pitchFamily="34" charset="0"/>
+                <a:cs typeface="Verdana" panose="020B0604030504040204" pitchFamily="34" charset="0"/>
+              </a:rPr>
+              <a:t>Changes and saves config file in </a:t>
+            </a:r>
+            <a:r>
+              <a:rPr lang="en-SG" sz="1400" dirty="0" err="1">
+                <a:latin typeface="Verdana" panose="020B0604030504040204" pitchFamily="34" charset="0"/>
+                <a:ea typeface="Verdana" panose="020B0604030504040204" pitchFamily="34" charset="0"/>
+                <a:cs typeface="Verdana" panose="020B0604030504040204" pitchFamily="34" charset="0"/>
+              </a:rPr>
+              <a:t>json</a:t>
+            </a:r>
+            <a:endParaRPr lang="en-SG" sz="1400" dirty="0">
+              <a:latin typeface="Verdana" panose="020B0604030504040204" pitchFamily="34" charset="0"/>
+              <a:ea typeface="Verdana" panose="020B0604030504040204" pitchFamily="34" charset="0"/>
+              <a:cs typeface="Verdana" panose="020B0604030504040204" pitchFamily="34" charset="0"/>
+            </a:endParaRPr>
+          </a:p>
+        </p:txBody>
+      </p:sp>
+      <p:sp>
+        <p:nvSpPr>
+          <p:cNvPr id="18" name="Rectangle: Rounded Corners 17"/>
+          <p:cNvSpPr/>
+          <p:nvPr/>
+        </p:nvSpPr>
+        <p:spPr>
+          <a:xfrm>
+            <a:off x="799516" y="4245436"/>
+            <a:ext cx="1249504" cy="1066800"/>
+          </a:xfrm>
+          <a:prstGeom prst="roundRect">
+            <a:avLst/>
+          </a:prstGeom>
+        </p:spPr>
+        <p:style>
+          <a:lnRef idx="2">
+            <a:schemeClr val="accent1">
+              <a:shade val="50000"/>
+            </a:schemeClr>
+          </a:lnRef>
+          <a:fillRef idx="1">
+            <a:schemeClr val="accent1"/>
+          </a:fillRef>
+          <a:effectRef idx="0">
+            <a:schemeClr val="accent1"/>
+          </a:effectRef>
+          <a:fontRef idx="minor">
+            <a:schemeClr val="lt1"/>
+          </a:fontRef>
+        </p:style>
+        <p:txBody>
+          <a:bodyPr rtlCol="0" anchor="ctr"/>
+          <a:lstStyle/>
+          <a:p>
+            <a:pPr algn="ctr"/>
+            <a:r>
+              <a:rPr lang="en-SG" sz="1400" dirty="0">
+                <a:latin typeface="Verdana" panose="020B0604030504040204" pitchFamily="34" charset="0"/>
+                <a:ea typeface="Verdana" panose="020B0604030504040204" pitchFamily="34" charset="0"/>
+                <a:cs typeface="Verdana" panose="020B0604030504040204" pitchFamily="34" charset="0"/>
+              </a:rPr>
+              <a:t>Changes and saves  </a:t>
+            </a:r>
+            <a:r>
+              <a:rPr lang="en-SG" sz="1400" dirty="0" err="1">
+                <a:latin typeface="Verdana" panose="020B0604030504040204" pitchFamily="34" charset="0"/>
+                <a:ea typeface="Verdana" panose="020B0604030504040204" pitchFamily="34" charset="0"/>
+                <a:cs typeface="Verdana" panose="020B0604030504040204" pitchFamily="34" charset="0"/>
+              </a:rPr>
+              <a:t>Shortkey</a:t>
+            </a:r>
+            <a:r>
+              <a:rPr lang="en-SG" sz="1400" dirty="0">
+                <a:latin typeface="Verdana" panose="020B0604030504040204" pitchFamily="34" charset="0"/>
+                <a:ea typeface="Verdana" panose="020B0604030504040204" pitchFamily="34" charset="0"/>
+                <a:cs typeface="Verdana" panose="020B0604030504040204" pitchFamily="34" charset="0"/>
+              </a:rPr>
+              <a:t> file in </a:t>
+            </a:r>
+            <a:r>
+              <a:rPr lang="en-SG" sz="1400" dirty="0" err="1">
+                <a:latin typeface="Verdana" panose="020B0604030504040204" pitchFamily="34" charset="0"/>
+                <a:ea typeface="Verdana" panose="020B0604030504040204" pitchFamily="34" charset="0"/>
+                <a:cs typeface="Verdana" panose="020B0604030504040204" pitchFamily="34" charset="0"/>
+              </a:rPr>
+              <a:t>json</a:t>
+            </a:r>
+            <a:endParaRPr lang="en-SG" sz="1400" dirty="0">
+              <a:latin typeface="Verdana" panose="020B0604030504040204" pitchFamily="34" charset="0"/>
+              <a:ea typeface="Verdana" panose="020B0604030504040204" pitchFamily="34" charset="0"/>
+              <a:cs typeface="Verdana" panose="020B0604030504040204" pitchFamily="34" charset="0"/>
+            </a:endParaRPr>
+          </a:p>
+        </p:txBody>
+      </p:sp>
+      <p:sp>
+        <p:nvSpPr>
+          <p:cNvPr id="21" name="Rectangle: Rounded Corners 20"/>
+          <p:cNvSpPr/>
+          <p:nvPr/>
+        </p:nvSpPr>
+        <p:spPr>
+          <a:xfrm>
+            <a:off x="5660853" y="4638128"/>
+            <a:ext cx="1610573" cy="990600"/>
+          </a:xfrm>
+          <a:prstGeom prst="roundRect">
+            <a:avLst/>
+          </a:prstGeom>
+        </p:spPr>
+        <p:style>
+          <a:lnRef idx="2">
+            <a:schemeClr val="accent1">
+              <a:shade val="50000"/>
+            </a:schemeClr>
+          </a:lnRef>
+          <a:fillRef idx="1">
+            <a:schemeClr val="accent1"/>
+          </a:fillRef>
+          <a:effectRef idx="0">
+            <a:schemeClr val="accent1"/>
+          </a:effectRef>
+          <a:fontRef idx="minor">
+            <a:schemeClr val="lt1"/>
+          </a:fontRef>
+        </p:style>
+        <p:txBody>
+          <a:bodyPr rtlCol="0" anchor="ctr"/>
+          <a:lstStyle/>
+          <a:p>
+            <a:pPr algn="ctr"/>
+            <a:r>
+              <a:rPr lang="en-SG" sz="1400" dirty="0">
+                <a:latin typeface="Verdana" panose="020B0604030504040204" pitchFamily="34" charset="0"/>
+                <a:ea typeface="Verdana" panose="020B0604030504040204" pitchFamily="34" charset="0"/>
+                <a:cs typeface="Verdana" panose="020B0604030504040204" pitchFamily="34" charset="0"/>
+              </a:rPr>
+              <a:t>Creates, and saves </a:t>
+            </a:r>
+            <a:r>
+              <a:rPr lang="en-SG" sz="1400" dirty="0" err="1">
+                <a:latin typeface="Verdana" panose="020B0604030504040204" pitchFamily="34" charset="0"/>
+                <a:ea typeface="Verdana" panose="020B0604030504040204" pitchFamily="34" charset="0"/>
+                <a:cs typeface="Verdana" panose="020B0604030504040204" pitchFamily="34" charset="0"/>
+              </a:rPr>
+              <a:t>taskbook</a:t>
+            </a:r>
+            <a:r>
+              <a:rPr lang="en-SG" sz="1400" dirty="0">
+                <a:latin typeface="Verdana" panose="020B0604030504040204" pitchFamily="34" charset="0"/>
+                <a:ea typeface="Verdana" panose="020B0604030504040204" pitchFamily="34" charset="0"/>
+                <a:cs typeface="Verdana" panose="020B0604030504040204" pitchFamily="34" charset="0"/>
+              </a:rPr>
+              <a:t> in new xml file</a:t>
+            </a:r>
+          </a:p>
+        </p:txBody>
+      </p:sp>
+      <p:sp>
+        <p:nvSpPr>
+          <p:cNvPr id="22" name="Rectangle: Rounded Corners 21"/>
+          <p:cNvSpPr/>
+          <p:nvPr/>
+        </p:nvSpPr>
+        <p:spPr>
+          <a:xfrm>
+            <a:off x="2277783" y="4267200"/>
+            <a:ext cx="1222916" cy="1371600"/>
+          </a:xfrm>
+          <a:prstGeom prst="roundRect">
+            <a:avLst/>
+          </a:prstGeom>
+        </p:spPr>
+        <p:style>
+          <a:lnRef idx="2">
+            <a:schemeClr val="accent1">
+              <a:shade val="50000"/>
+            </a:schemeClr>
+          </a:lnRef>
+          <a:fillRef idx="1">
+            <a:schemeClr val="accent1"/>
+          </a:fillRef>
+          <a:effectRef idx="0">
+            <a:schemeClr val="accent1"/>
+          </a:effectRef>
+          <a:fontRef idx="minor">
+            <a:schemeClr val="lt1"/>
+          </a:fontRef>
+        </p:style>
+        <p:txBody>
+          <a:bodyPr rtlCol="0" anchor="ctr"/>
+          <a:lstStyle/>
+          <a:p>
+            <a:pPr algn="ctr"/>
+            <a:r>
+              <a:rPr lang="en-SG" sz="1400" dirty="0">
+                <a:latin typeface="Verdana" panose="020B0604030504040204" pitchFamily="34" charset="0"/>
+                <a:ea typeface="Verdana" panose="020B0604030504040204" pitchFamily="34" charset="0"/>
+                <a:cs typeface="Verdana" panose="020B0604030504040204" pitchFamily="34" charset="0"/>
+              </a:rPr>
+              <a:t>Creates and saves  </a:t>
+            </a:r>
+            <a:r>
+              <a:rPr lang="en-SG" sz="1400" dirty="0" err="1">
+                <a:latin typeface="Verdana" panose="020B0604030504040204" pitchFamily="34" charset="0"/>
+                <a:ea typeface="Verdana" panose="020B0604030504040204" pitchFamily="34" charset="0"/>
+                <a:cs typeface="Verdana" panose="020B0604030504040204" pitchFamily="34" charset="0"/>
+              </a:rPr>
+              <a:t>Shortkey</a:t>
+            </a:r>
+            <a:r>
+              <a:rPr lang="en-SG" sz="1400" dirty="0">
+                <a:latin typeface="Verdana" panose="020B0604030504040204" pitchFamily="34" charset="0"/>
+                <a:ea typeface="Verdana" panose="020B0604030504040204" pitchFamily="34" charset="0"/>
+                <a:cs typeface="Verdana" panose="020B0604030504040204" pitchFamily="34" charset="0"/>
+              </a:rPr>
+              <a:t> file in </a:t>
+            </a:r>
+            <a:r>
+              <a:rPr lang="en-SG" sz="1400" dirty="0" err="1">
+                <a:latin typeface="Verdana" panose="020B0604030504040204" pitchFamily="34" charset="0"/>
+                <a:ea typeface="Verdana" panose="020B0604030504040204" pitchFamily="34" charset="0"/>
+                <a:cs typeface="Verdana" panose="020B0604030504040204" pitchFamily="34" charset="0"/>
+              </a:rPr>
+              <a:t>json</a:t>
+            </a:r>
+            <a:endParaRPr lang="en-SG" sz="1400" dirty="0">
+              <a:latin typeface="Verdana" panose="020B0604030504040204" pitchFamily="34" charset="0"/>
+              <a:ea typeface="Verdana" panose="020B0604030504040204" pitchFamily="34" charset="0"/>
+              <a:cs typeface="Verdana" panose="020B0604030504040204" pitchFamily="34" charset="0"/>
+            </a:endParaRPr>
+          </a:p>
+        </p:txBody>
+      </p:sp>
+      <p:sp>
+        <p:nvSpPr>
+          <p:cNvPr id="23" name="Rectangle: Rounded Corners 22"/>
+          <p:cNvSpPr/>
+          <p:nvPr/>
+        </p:nvSpPr>
+        <p:spPr>
+          <a:xfrm>
+            <a:off x="-1081761" y="4267200"/>
+            <a:ext cx="1386181" cy="1128417"/>
+          </a:xfrm>
+          <a:prstGeom prst="roundRect">
+            <a:avLst/>
+          </a:prstGeom>
+        </p:spPr>
+        <p:style>
+          <a:lnRef idx="2">
+            <a:schemeClr val="accent1">
+              <a:shade val="50000"/>
+            </a:schemeClr>
+          </a:lnRef>
+          <a:fillRef idx="1">
+            <a:schemeClr val="accent1"/>
+          </a:fillRef>
+          <a:effectRef idx="0">
+            <a:schemeClr val="accent1"/>
+          </a:effectRef>
+          <a:fontRef idx="minor">
+            <a:schemeClr val="lt1"/>
+          </a:fontRef>
+        </p:style>
+        <p:txBody>
+          <a:bodyPr rtlCol="0" anchor="ctr"/>
+          <a:lstStyle/>
+          <a:p>
+            <a:pPr algn="ctr"/>
+            <a:r>
+              <a:rPr lang="en-SG" sz="1400" dirty="0">
+                <a:latin typeface="Verdana" panose="020B0604030504040204" pitchFamily="34" charset="0"/>
+                <a:ea typeface="Verdana" panose="020B0604030504040204" pitchFamily="34" charset="0"/>
+                <a:cs typeface="Verdana" panose="020B0604030504040204" pitchFamily="34" charset="0"/>
+              </a:rPr>
+              <a:t>Creates and saves config file in </a:t>
+            </a:r>
+            <a:r>
+              <a:rPr lang="en-SG" sz="1400" dirty="0" err="1">
+                <a:latin typeface="Verdana" panose="020B0604030504040204" pitchFamily="34" charset="0"/>
+                <a:ea typeface="Verdana" panose="020B0604030504040204" pitchFamily="34" charset="0"/>
+                <a:cs typeface="Verdana" panose="020B0604030504040204" pitchFamily="34" charset="0"/>
+              </a:rPr>
+              <a:t>json</a:t>
+            </a:r>
+            <a:endParaRPr lang="en-SG" sz="1400" dirty="0">
+              <a:latin typeface="Verdana" panose="020B0604030504040204" pitchFamily="34" charset="0"/>
+              <a:ea typeface="Verdana" panose="020B0604030504040204" pitchFamily="34" charset="0"/>
+              <a:cs typeface="Verdana" panose="020B0604030504040204" pitchFamily="34" charset="0"/>
+            </a:endParaRPr>
+          </a:p>
+        </p:txBody>
+      </p:sp>
+      <p:sp>
+        <p:nvSpPr>
+          <p:cNvPr id="24" name="Diamond 23"/>
+          <p:cNvSpPr/>
+          <p:nvPr/>
+        </p:nvSpPr>
+        <p:spPr>
+          <a:xfrm>
+            <a:off x="-1533686" y="3493937"/>
+            <a:ext cx="571501" cy="477583"/>
+          </a:xfrm>
+          <a:prstGeom prst="diamond">
+            <a:avLst/>
+          </a:prstGeom>
+          <a:solidFill>
+            <a:srgbClr val="FFFF00"/>
+          </a:solidFill>
+        </p:spPr>
+        <p:style>
+          <a:lnRef idx="2">
+            <a:schemeClr val="accent1">
+              <a:shade val="50000"/>
+            </a:schemeClr>
+          </a:lnRef>
+          <a:fillRef idx="1">
+            <a:schemeClr val="accent1"/>
+          </a:fillRef>
+          <a:effectRef idx="0">
+            <a:schemeClr val="accent1"/>
+          </a:effectRef>
+          <a:fontRef idx="minor">
+            <a:schemeClr val="lt1"/>
+          </a:fontRef>
+        </p:style>
+        <p:txBody>
+          <a:bodyPr rtlCol="0" anchor="ctr"/>
+          <a:lstStyle/>
+          <a:p>
+            <a:pPr algn="ctr"/>
+            <a:endParaRPr lang="en-SG" sz="1400">
+              <a:latin typeface="Verdana" panose="020B0604030504040204" pitchFamily="34" charset="0"/>
+              <a:ea typeface="Verdana" panose="020B0604030504040204" pitchFamily="34" charset="0"/>
+              <a:cs typeface="Verdana" panose="020B0604030504040204" pitchFamily="34" charset="0"/>
+            </a:endParaRPr>
+          </a:p>
+        </p:txBody>
+      </p:sp>
+      <p:sp>
+        <p:nvSpPr>
+          <p:cNvPr id="25" name="Diamond 24"/>
+          <p:cNvSpPr/>
+          <p:nvPr/>
+        </p:nvSpPr>
+        <p:spPr>
+          <a:xfrm>
+            <a:off x="7192386" y="3971976"/>
+            <a:ext cx="571501" cy="477583"/>
+          </a:xfrm>
+          <a:prstGeom prst="diamond">
+            <a:avLst/>
+          </a:prstGeom>
+          <a:solidFill>
+            <a:srgbClr val="FFFF00"/>
+          </a:solidFill>
+        </p:spPr>
+        <p:style>
+          <a:lnRef idx="2">
+            <a:schemeClr val="accent1">
+              <a:shade val="50000"/>
+            </a:schemeClr>
+          </a:lnRef>
+          <a:fillRef idx="1">
+            <a:schemeClr val="accent1"/>
+          </a:fillRef>
+          <a:effectRef idx="0">
+            <a:schemeClr val="accent1"/>
+          </a:effectRef>
+          <a:fontRef idx="minor">
+            <a:schemeClr val="lt1"/>
+          </a:fontRef>
+        </p:style>
+        <p:txBody>
+          <a:bodyPr rtlCol="0" anchor="ctr"/>
+          <a:lstStyle/>
+          <a:p>
+            <a:pPr algn="ctr"/>
+            <a:endParaRPr lang="en-SG" sz="1400">
+              <a:latin typeface="Verdana" panose="020B0604030504040204" pitchFamily="34" charset="0"/>
+              <a:ea typeface="Verdana" panose="020B0604030504040204" pitchFamily="34" charset="0"/>
+              <a:cs typeface="Verdana" panose="020B0604030504040204" pitchFamily="34" charset="0"/>
+            </a:endParaRPr>
+          </a:p>
+        </p:txBody>
+      </p:sp>
+      <p:sp>
+        <p:nvSpPr>
+          <p:cNvPr id="27" name="Diamond 26"/>
+          <p:cNvSpPr/>
+          <p:nvPr/>
+        </p:nvSpPr>
+        <p:spPr>
+          <a:xfrm>
+            <a:off x="3936303" y="6143910"/>
+            <a:ext cx="571501" cy="477583"/>
+          </a:xfrm>
+          <a:prstGeom prst="diamond">
+            <a:avLst/>
+          </a:prstGeom>
+          <a:solidFill>
+            <a:srgbClr val="FFFF00"/>
+          </a:solidFill>
+        </p:spPr>
+        <p:style>
+          <a:lnRef idx="2">
+            <a:schemeClr val="accent1">
+              <a:shade val="50000"/>
+            </a:schemeClr>
+          </a:lnRef>
+          <a:fillRef idx="1">
+            <a:schemeClr val="accent1"/>
+          </a:fillRef>
+          <a:effectRef idx="0">
+            <a:schemeClr val="accent1"/>
+          </a:effectRef>
+          <a:fontRef idx="minor">
+            <a:schemeClr val="lt1"/>
+          </a:fontRef>
+        </p:style>
+        <p:txBody>
+          <a:bodyPr rtlCol="0" anchor="ctr"/>
+          <a:lstStyle/>
+          <a:p>
+            <a:pPr algn="ctr"/>
+            <a:endParaRPr lang="en-SG" sz="1400">
+              <a:latin typeface="Verdana" panose="020B0604030504040204" pitchFamily="34" charset="0"/>
+              <a:ea typeface="Verdana" panose="020B0604030504040204" pitchFamily="34" charset="0"/>
+              <a:cs typeface="Verdana" panose="020B0604030504040204" pitchFamily="34" charset="0"/>
+            </a:endParaRPr>
+          </a:p>
+        </p:txBody>
+      </p:sp>
+      <p:sp>
+        <p:nvSpPr>
+          <p:cNvPr id="28" name="Rectangle: Rounded Corners 27"/>
+          <p:cNvSpPr/>
+          <p:nvPr/>
+        </p:nvSpPr>
+        <p:spPr>
+          <a:xfrm>
+            <a:off x="354903" y="6935048"/>
+            <a:ext cx="7712483" cy="457200"/>
+          </a:xfrm>
+          <a:prstGeom prst="roundRect">
+            <a:avLst/>
+          </a:prstGeom>
+        </p:spPr>
+        <p:style>
+          <a:lnRef idx="2">
+            <a:schemeClr val="accent1">
+              <a:shade val="50000"/>
+            </a:schemeClr>
+          </a:lnRef>
+          <a:fillRef idx="1">
+            <a:schemeClr val="accent1"/>
+          </a:fillRef>
+          <a:effectRef idx="0">
+            <a:schemeClr val="accent1"/>
+          </a:effectRef>
+          <a:fontRef idx="minor">
+            <a:schemeClr val="lt1"/>
+          </a:fontRef>
+        </p:style>
+        <p:txBody>
+          <a:bodyPr rtlCol="0" anchor="ctr"/>
+          <a:lstStyle/>
+          <a:p>
+            <a:pPr algn="ctr"/>
+            <a:r>
+              <a:rPr lang="en-SG" dirty="0"/>
+              <a:t>Provide user feedback</a:t>
+            </a:r>
+          </a:p>
+        </p:txBody>
+      </p:sp>
+      <p:sp>
+        <p:nvSpPr>
+          <p:cNvPr id="29" name="Rectangle: Rounded Corners 28"/>
+          <p:cNvSpPr/>
+          <p:nvPr/>
+        </p:nvSpPr>
+        <p:spPr>
+          <a:xfrm>
+            <a:off x="10591800" y="2475044"/>
+            <a:ext cx="1219200" cy="953956"/>
+          </a:xfrm>
+          <a:prstGeom prst="roundRect">
+            <a:avLst/>
+          </a:prstGeom>
+        </p:spPr>
+        <p:style>
+          <a:lnRef idx="2">
+            <a:schemeClr val="accent1">
+              <a:shade val="50000"/>
+            </a:schemeClr>
+          </a:lnRef>
+          <a:fillRef idx="1">
+            <a:schemeClr val="accent1"/>
+          </a:fillRef>
+          <a:effectRef idx="0">
+            <a:schemeClr val="accent1"/>
+          </a:effectRef>
+          <a:fontRef idx="minor">
+            <a:schemeClr val="lt1"/>
+          </a:fontRef>
+        </p:style>
+        <p:txBody>
+          <a:bodyPr rtlCol="0" anchor="ctr"/>
+          <a:lstStyle/>
+          <a:p>
+            <a:pPr algn="ctr"/>
+            <a:r>
+              <a:rPr lang="en-SG" dirty="0"/>
+              <a:t>Incorrect command</a:t>
+            </a:r>
+          </a:p>
+        </p:txBody>
+      </p:sp>
+      <p:sp>
+        <p:nvSpPr>
+          <p:cNvPr id="30" name="Diamond 29"/>
+          <p:cNvSpPr/>
+          <p:nvPr/>
+        </p:nvSpPr>
+        <p:spPr>
+          <a:xfrm>
+            <a:off x="4419600" y="1644277"/>
+            <a:ext cx="571501" cy="477583"/>
+          </a:xfrm>
+          <a:prstGeom prst="diamond">
+            <a:avLst/>
+          </a:prstGeom>
+          <a:solidFill>
+            <a:srgbClr val="FFFF00"/>
+          </a:solidFill>
+        </p:spPr>
+        <p:style>
+          <a:lnRef idx="2">
+            <a:schemeClr val="accent1">
+              <a:shade val="50000"/>
+            </a:schemeClr>
+          </a:lnRef>
+          <a:fillRef idx="1">
+            <a:schemeClr val="accent1"/>
+          </a:fillRef>
+          <a:effectRef idx="0">
+            <a:schemeClr val="accent1"/>
+          </a:effectRef>
+          <a:fontRef idx="minor">
+            <a:schemeClr val="lt1"/>
+          </a:fontRef>
+        </p:style>
+        <p:txBody>
+          <a:bodyPr rtlCol="0" anchor="ctr"/>
+          <a:lstStyle/>
+          <a:p>
+            <a:pPr algn="ctr"/>
+            <a:endParaRPr lang="en-SG" sz="1400">
+              <a:latin typeface="Verdana" panose="020B0604030504040204" pitchFamily="34" charset="0"/>
+              <a:ea typeface="Verdana" panose="020B0604030504040204" pitchFamily="34" charset="0"/>
+              <a:cs typeface="Verdana" panose="020B0604030504040204" pitchFamily="34" charset="0"/>
+            </a:endParaRPr>
+          </a:p>
+        </p:txBody>
+      </p:sp>
+      <p:cxnSp>
+        <p:nvCxnSpPr>
+          <p:cNvPr id="32" name="Straight Arrow Connector 31"/>
+          <p:cNvCxnSpPr>
+            <a:stCxn id="3" idx="2"/>
+            <a:endCxn id="30" idx="0"/>
+          </p:cNvCxnSpPr>
+          <p:nvPr/>
+        </p:nvCxnSpPr>
+        <p:spPr>
+          <a:xfrm>
+            <a:off x="4686300" y="1447800"/>
+            <a:ext cx="19051" cy="196477"/>
+          </a:xfrm>
+          <a:prstGeom prst="straightConnector1">
+            <a:avLst/>
+          </a:prstGeom>
+          <a:ln>
+            <a:tailEnd type="triangle"/>
+          </a:ln>
+        </p:spPr>
+        <p:style>
+          <a:lnRef idx="1">
+            <a:schemeClr val="accent1"/>
+          </a:lnRef>
+          <a:fillRef idx="0">
+            <a:schemeClr val="accent1"/>
+          </a:fillRef>
+          <a:effectRef idx="0">
+            <a:schemeClr val="accent1"/>
+          </a:effectRef>
+          <a:fontRef idx="minor">
+            <a:schemeClr val="tx1"/>
+          </a:fontRef>
+        </p:style>
+      </p:cxnSp>
+      <p:cxnSp>
+        <p:nvCxnSpPr>
+          <p:cNvPr id="34" name="Straight Arrow Connector 33"/>
+          <p:cNvCxnSpPr>
+            <a:stCxn id="30" idx="2"/>
+          </p:cNvCxnSpPr>
+          <p:nvPr/>
+        </p:nvCxnSpPr>
+        <p:spPr>
+          <a:xfrm>
+            <a:off x="4705351" y="2121860"/>
+            <a:ext cx="14711" cy="342379"/>
+          </a:xfrm>
+          <a:prstGeom prst="straightConnector1">
+            <a:avLst/>
+          </a:prstGeom>
+          <a:ln>
+            <a:tailEnd type="triangle"/>
+          </a:ln>
+        </p:spPr>
+        <p:style>
+          <a:lnRef idx="1">
+            <a:schemeClr val="accent1"/>
+          </a:lnRef>
+          <a:fillRef idx="0">
+            <a:schemeClr val="accent1"/>
+          </a:fillRef>
+          <a:effectRef idx="0">
+            <a:schemeClr val="accent1"/>
+          </a:effectRef>
+          <a:fontRef idx="minor">
+            <a:schemeClr val="tx1"/>
+          </a:fontRef>
+        </p:style>
+      </p:cxnSp>
+      <p:cxnSp>
+        <p:nvCxnSpPr>
+          <p:cNvPr id="40" name="Straight Connector 39"/>
+          <p:cNvCxnSpPr/>
+          <p:nvPr/>
+        </p:nvCxnSpPr>
+        <p:spPr>
+          <a:xfrm>
+            <a:off x="2106935" y="2149050"/>
+            <a:ext cx="9018950" cy="15561"/>
+          </a:xfrm>
+          <a:prstGeom prst="line">
+            <a:avLst/>
+          </a:prstGeom>
+        </p:spPr>
+        <p:style>
+          <a:lnRef idx="1">
+            <a:schemeClr val="accent1"/>
+          </a:lnRef>
+          <a:fillRef idx="0">
+            <a:schemeClr val="accent1"/>
+          </a:fillRef>
+          <a:effectRef idx="0">
+            <a:schemeClr val="accent1"/>
+          </a:effectRef>
+          <a:fontRef idx="minor">
+            <a:schemeClr val="tx1"/>
+          </a:fontRef>
+        </p:style>
+      </p:cxnSp>
+      <p:cxnSp>
+        <p:nvCxnSpPr>
+          <p:cNvPr id="44" name="Straight Arrow Connector 43"/>
+          <p:cNvCxnSpPr>
+            <a:endCxn id="6" idx="0"/>
+          </p:cNvCxnSpPr>
+          <p:nvPr/>
+        </p:nvCxnSpPr>
+        <p:spPr>
+          <a:xfrm flipH="1">
+            <a:off x="2097880" y="2142089"/>
+            <a:ext cx="9055" cy="350393"/>
+          </a:xfrm>
+          <a:prstGeom prst="straightConnector1">
+            <a:avLst/>
+          </a:prstGeom>
+          <a:ln>
+            <a:tailEnd type="triangle"/>
+          </a:ln>
+        </p:spPr>
+        <p:style>
+          <a:lnRef idx="1">
+            <a:schemeClr val="accent1"/>
+          </a:lnRef>
+          <a:fillRef idx="0">
+            <a:schemeClr val="accent1"/>
+          </a:fillRef>
+          <a:effectRef idx="0">
+            <a:schemeClr val="accent1"/>
+          </a:effectRef>
+          <a:fontRef idx="minor">
+            <a:schemeClr val="tx1"/>
+          </a:fontRef>
+        </p:style>
+      </p:cxnSp>
+      <p:cxnSp>
+        <p:nvCxnSpPr>
+          <p:cNvPr id="46" name="Straight Arrow Connector 45"/>
+          <p:cNvCxnSpPr>
+            <a:endCxn id="12" idx="0"/>
+          </p:cNvCxnSpPr>
+          <p:nvPr/>
+        </p:nvCxnSpPr>
+        <p:spPr>
+          <a:xfrm>
+            <a:off x="3431805" y="2164611"/>
+            <a:ext cx="1533" cy="301833"/>
+          </a:xfrm>
+          <a:prstGeom prst="straightConnector1">
+            <a:avLst/>
+          </a:prstGeom>
+          <a:ln>
+            <a:tailEnd type="triangle"/>
+          </a:ln>
+        </p:spPr>
+        <p:style>
+          <a:lnRef idx="1">
+            <a:schemeClr val="accent1"/>
+          </a:lnRef>
+          <a:fillRef idx="0">
+            <a:schemeClr val="accent1"/>
+          </a:fillRef>
+          <a:effectRef idx="0">
+            <a:schemeClr val="accent1"/>
+          </a:effectRef>
+          <a:fontRef idx="minor">
+            <a:schemeClr val="tx1"/>
+          </a:fontRef>
+        </p:style>
+      </p:cxnSp>
+      <p:cxnSp>
+        <p:nvCxnSpPr>
+          <p:cNvPr id="47" name="Straight Arrow Connector 46"/>
+          <p:cNvCxnSpPr/>
+          <p:nvPr/>
+        </p:nvCxnSpPr>
+        <p:spPr>
+          <a:xfrm>
+            <a:off x="6039044" y="2133600"/>
+            <a:ext cx="1533" cy="301833"/>
+          </a:xfrm>
+          <a:prstGeom prst="straightConnector1">
+            <a:avLst/>
+          </a:prstGeom>
+          <a:ln>
+            <a:tailEnd type="triangle"/>
+          </a:ln>
+        </p:spPr>
+        <p:style>
+          <a:lnRef idx="1">
+            <a:schemeClr val="accent1"/>
+          </a:lnRef>
+          <a:fillRef idx="0">
+            <a:schemeClr val="accent1"/>
+          </a:fillRef>
+          <a:effectRef idx="0">
+            <a:schemeClr val="accent1"/>
+          </a:effectRef>
+          <a:fontRef idx="minor">
+            <a:schemeClr val="tx1"/>
+          </a:fontRef>
+        </p:style>
+      </p:cxnSp>
+      <p:cxnSp>
+        <p:nvCxnSpPr>
+          <p:cNvPr id="48" name="Straight Arrow Connector 47"/>
+          <p:cNvCxnSpPr/>
+          <p:nvPr/>
+        </p:nvCxnSpPr>
+        <p:spPr>
+          <a:xfrm>
+            <a:off x="7259746" y="2142089"/>
+            <a:ext cx="9592" cy="296311"/>
+          </a:xfrm>
+          <a:prstGeom prst="straightConnector1">
+            <a:avLst/>
+          </a:prstGeom>
+          <a:ln>
+            <a:tailEnd type="triangle"/>
+          </a:ln>
+        </p:spPr>
+        <p:style>
+          <a:lnRef idx="1">
+            <a:schemeClr val="accent1"/>
+          </a:lnRef>
+          <a:fillRef idx="0">
+            <a:schemeClr val="accent1"/>
+          </a:fillRef>
+          <a:effectRef idx="0">
+            <a:schemeClr val="accent1"/>
+          </a:effectRef>
+          <a:fontRef idx="minor">
+            <a:schemeClr val="tx1"/>
+          </a:fontRef>
+        </p:style>
+      </p:cxnSp>
+      <p:cxnSp>
+        <p:nvCxnSpPr>
+          <p:cNvPr id="52" name="Straight Arrow Connector 51"/>
+          <p:cNvCxnSpPr/>
+          <p:nvPr/>
+        </p:nvCxnSpPr>
+        <p:spPr>
+          <a:xfrm flipH="1">
+            <a:off x="8543992" y="2161362"/>
+            <a:ext cx="1597" cy="344749"/>
+          </a:xfrm>
+          <a:prstGeom prst="straightConnector1">
+            <a:avLst/>
+          </a:prstGeom>
+          <a:ln>
+            <a:tailEnd type="triangle"/>
+          </a:ln>
+        </p:spPr>
+        <p:style>
+          <a:lnRef idx="1">
+            <a:schemeClr val="accent1"/>
+          </a:lnRef>
+          <a:fillRef idx="0">
+            <a:schemeClr val="accent1"/>
+          </a:fillRef>
+          <a:effectRef idx="0">
+            <a:schemeClr val="accent1"/>
+          </a:effectRef>
+          <a:fontRef idx="minor">
+            <a:schemeClr val="tx1"/>
+          </a:fontRef>
+        </p:style>
+      </p:cxnSp>
+      <p:cxnSp>
+        <p:nvCxnSpPr>
+          <p:cNvPr id="53" name="Straight Arrow Connector 52"/>
+          <p:cNvCxnSpPr>
+            <a:endCxn id="13" idx="0"/>
+          </p:cNvCxnSpPr>
+          <p:nvPr/>
+        </p:nvCxnSpPr>
+        <p:spPr>
+          <a:xfrm>
+            <a:off x="9794993" y="2192545"/>
+            <a:ext cx="0" cy="301822"/>
+          </a:xfrm>
+          <a:prstGeom prst="straightConnector1">
+            <a:avLst/>
+          </a:prstGeom>
+          <a:ln>
+            <a:tailEnd type="triangle"/>
+          </a:ln>
+        </p:spPr>
+        <p:style>
+          <a:lnRef idx="1">
+            <a:schemeClr val="accent1"/>
+          </a:lnRef>
+          <a:fillRef idx="0">
+            <a:schemeClr val="accent1"/>
+          </a:fillRef>
+          <a:effectRef idx="0">
+            <a:schemeClr val="accent1"/>
+          </a:effectRef>
+          <a:fontRef idx="minor">
+            <a:schemeClr val="tx1"/>
+          </a:fontRef>
+        </p:style>
+      </p:cxnSp>
+      <p:cxnSp>
+        <p:nvCxnSpPr>
+          <p:cNvPr id="54" name="Straight Arrow Connector 53"/>
+          <p:cNvCxnSpPr/>
+          <p:nvPr/>
+        </p:nvCxnSpPr>
+        <p:spPr>
+          <a:xfrm>
+            <a:off x="11125200" y="2142089"/>
+            <a:ext cx="9592" cy="296311"/>
+          </a:xfrm>
+          <a:prstGeom prst="straightConnector1">
+            <a:avLst/>
+          </a:prstGeom>
+          <a:ln>
+            <a:tailEnd type="triangle"/>
+          </a:ln>
+        </p:spPr>
+        <p:style>
+          <a:lnRef idx="1">
+            <a:schemeClr val="accent1"/>
+          </a:lnRef>
+          <a:fillRef idx="0">
+            <a:schemeClr val="accent1"/>
+          </a:fillRef>
+          <a:effectRef idx="0">
+            <a:schemeClr val="accent1"/>
+          </a:effectRef>
+          <a:fontRef idx="minor">
+            <a:schemeClr val="tx1"/>
+          </a:fontRef>
+        </p:style>
+      </p:cxnSp>
+      <p:cxnSp>
+        <p:nvCxnSpPr>
+          <p:cNvPr id="63" name="Straight Arrow Connector 62"/>
+          <p:cNvCxnSpPr>
+            <a:stCxn id="6" idx="2"/>
+            <a:endCxn id="5" idx="0"/>
+          </p:cNvCxnSpPr>
+          <p:nvPr/>
+        </p:nvCxnSpPr>
+        <p:spPr>
+          <a:xfrm>
+            <a:off x="2097880" y="3242969"/>
+            <a:ext cx="16671" cy="258768"/>
+          </a:xfrm>
+          <a:prstGeom prst="straightConnector1">
+            <a:avLst/>
+          </a:prstGeom>
+          <a:ln>
+            <a:tailEnd type="triangle"/>
+          </a:ln>
+        </p:spPr>
+        <p:style>
+          <a:lnRef idx="1">
+            <a:schemeClr val="accent1"/>
+          </a:lnRef>
+          <a:fillRef idx="0">
+            <a:schemeClr val="accent1"/>
+          </a:fillRef>
+          <a:effectRef idx="0">
+            <a:schemeClr val="accent1"/>
+          </a:effectRef>
+          <a:fontRef idx="minor">
+            <a:schemeClr val="tx1"/>
+          </a:fontRef>
+        </p:style>
+      </p:cxnSp>
+      <p:cxnSp>
+        <p:nvCxnSpPr>
+          <p:cNvPr id="66" name="Connector: Elbow 65"/>
+          <p:cNvCxnSpPr>
+            <a:stCxn id="5" idx="2"/>
+            <a:endCxn id="18" idx="0"/>
+          </p:cNvCxnSpPr>
+          <p:nvPr/>
+        </p:nvCxnSpPr>
+        <p:spPr>
+          <a:xfrm rot="5400000">
+            <a:off x="1636352" y="3767237"/>
+            <a:ext cx="266116" cy="690283"/>
+          </a:xfrm>
+          <a:prstGeom prst="bentConnector3">
+            <a:avLst/>
+          </a:prstGeom>
+          <a:ln>
+            <a:tailEnd type="triangle"/>
+          </a:ln>
+        </p:spPr>
+        <p:style>
+          <a:lnRef idx="1">
+            <a:schemeClr val="accent1"/>
+          </a:lnRef>
+          <a:fillRef idx="0">
+            <a:schemeClr val="accent1"/>
+          </a:fillRef>
+          <a:effectRef idx="0">
+            <a:schemeClr val="accent1"/>
+          </a:effectRef>
+          <a:fontRef idx="minor">
+            <a:schemeClr val="tx1"/>
+          </a:fontRef>
+        </p:style>
+      </p:cxnSp>
+      <p:cxnSp>
+        <p:nvCxnSpPr>
+          <p:cNvPr id="68" name="Connector: Elbow 67"/>
+          <p:cNvCxnSpPr>
+            <a:stCxn id="5" idx="2"/>
+            <a:endCxn id="22" idx="0"/>
+          </p:cNvCxnSpPr>
+          <p:nvPr/>
+        </p:nvCxnSpPr>
+        <p:spPr>
+          <a:xfrm rot="16200000" flipH="1">
+            <a:off x="2357956" y="3735915"/>
+            <a:ext cx="287880" cy="774690"/>
+          </a:xfrm>
+          <a:prstGeom prst="bentConnector3">
+            <a:avLst/>
+          </a:prstGeom>
+          <a:ln>
+            <a:tailEnd type="triangle"/>
+          </a:ln>
+        </p:spPr>
+        <p:style>
+          <a:lnRef idx="1">
+            <a:schemeClr val="accent1"/>
+          </a:lnRef>
+          <a:fillRef idx="0">
+            <a:schemeClr val="accent1"/>
+          </a:fillRef>
+          <a:effectRef idx="0">
+            <a:schemeClr val="accent1"/>
+          </a:effectRef>
+          <a:fontRef idx="minor">
+            <a:schemeClr val="tx1"/>
+          </a:fontRef>
+        </p:style>
+      </p:cxnSp>
+      <p:cxnSp>
+        <p:nvCxnSpPr>
+          <p:cNvPr id="70" name="Connector: Elbow 69"/>
+          <p:cNvCxnSpPr>
+            <a:stCxn id="8" idx="2"/>
+            <a:endCxn id="25" idx="0"/>
+          </p:cNvCxnSpPr>
+          <p:nvPr/>
+        </p:nvCxnSpPr>
+        <p:spPr>
+          <a:xfrm rot="16200000" flipH="1">
+            <a:off x="5729431" y="2223270"/>
+            <a:ext cx="739336" cy="2758075"/>
+          </a:xfrm>
+          <a:prstGeom prst="bentConnector3">
+            <a:avLst/>
+          </a:prstGeom>
+          <a:ln>
+            <a:tailEnd type="triangle"/>
+          </a:ln>
+        </p:spPr>
+        <p:style>
+          <a:lnRef idx="1">
+            <a:schemeClr val="accent1"/>
+          </a:lnRef>
+          <a:fillRef idx="0">
+            <a:schemeClr val="accent1"/>
+          </a:fillRef>
+          <a:effectRef idx="0">
+            <a:schemeClr val="accent1"/>
+          </a:effectRef>
+          <a:fontRef idx="minor">
+            <a:schemeClr val="tx1"/>
+          </a:fontRef>
+        </p:style>
+      </p:cxnSp>
+      <p:cxnSp>
+        <p:nvCxnSpPr>
+          <p:cNvPr id="72" name="Connector: Elbow 71"/>
+          <p:cNvCxnSpPr>
+            <a:stCxn id="9" idx="2"/>
+            <a:endCxn id="25" idx="0"/>
+          </p:cNvCxnSpPr>
+          <p:nvPr/>
+        </p:nvCxnSpPr>
+        <p:spPr>
+          <a:xfrm rot="16200000" flipH="1">
+            <a:off x="6357825" y="2851664"/>
+            <a:ext cx="754462" cy="1486161"/>
+          </a:xfrm>
+          <a:prstGeom prst="bentConnector3">
+            <a:avLst/>
+          </a:prstGeom>
+          <a:ln>
+            <a:tailEnd type="triangle"/>
+          </a:ln>
+        </p:spPr>
+        <p:style>
+          <a:lnRef idx="1">
+            <a:schemeClr val="accent1"/>
+          </a:lnRef>
+          <a:fillRef idx="0">
+            <a:schemeClr val="accent1"/>
+          </a:fillRef>
+          <a:effectRef idx="0">
+            <a:schemeClr val="accent1"/>
+          </a:effectRef>
+          <a:fontRef idx="minor">
+            <a:schemeClr val="tx1"/>
+          </a:fontRef>
+        </p:style>
+      </p:cxnSp>
+      <p:cxnSp>
+        <p:nvCxnSpPr>
+          <p:cNvPr id="74" name="Connector: Elbow 73"/>
+          <p:cNvCxnSpPr>
+            <a:stCxn id="10" idx="2"/>
+            <a:endCxn id="25" idx="0"/>
+          </p:cNvCxnSpPr>
+          <p:nvPr/>
+        </p:nvCxnSpPr>
+        <p:spPr>
+          <a:xfrm rot="16200000" flipH="1">
+            <a:off x="7009601" y="3503440"/>
+            <a:ext cx="722334" cy="214738"/>
+          </a:xfrm>
+          <a:prstGeom prst="bentConnector3">
+            <a:avLst/>
+          </a:prstGeom>
+          <a:ln>
+            <a:tailEnd type="triangle"/>
+          </a:ln>
+        </p:spPr>
+        <p:style>
+          <a:lnRef idx="1">
+            <a:schemeClr val="accent1"/>
+          </a:lnRef>
+          <a:fillRef idx="0">
+            <a:schemeClr val="accent1"/>
+          </a:fillRef>
+          <a:effectRef idx="0">
+            <a:schemeClr val="accent1"/>
+          </a:effectRef>
+          <a:fontRef idx="minor">
+            <a:schemeClr val="tx1"/>
+          </a:fontRef>
+        </p:style>
+      </p:cxnSp>
+      <p:cxnSp>
+        <p:nvCxnSpPr>
+          <p:cNvPr id="76" name="Connector: Elbow 75"/>
+          <p:cNvCxnSpPr>
+            <a:stCxn id="11" idx="2"/>
+            <a:endCxn id="25" idx="0"/>
+          </p:cNvCxnSpPr>
+          <p:nvPr/>
+        </p:nvCxnSpPr>
+        <p:spPr>
+          <a:xfrm rot="5400000">
+            <a:off x="7603448" y="3063467"/>
+            <a:ext cx="783198" cy="1033820"/>
+          </a:xfrm>
+          <a:prstGeom prst="bentConnector3">
+            <a:avLst>
+              <a:gd name="adj1" fmla="val 50000"/>
+            </a:avLst>
+          </a:prstGeom>
+          <a:ln>
+            <a:tailEnd type="triangle"/>
+          </a:ln>
+        </p:spPr>
+        <p:style>
+          <a:lnRef idx="1">
+            <a:schemeClr val="accent1"/>
+          </a:lnRef>
+          <a:fillRef idx="0">
+            <a:schemeClr val="accent1"/>
+          </a:fillRef>
+          <a:effectRef idx="0">
+            <a:schemeClr val="accent1"/>
+          </a:effectRef>
+          <a:fontRef idx="minor">
+            <a:schemeClr val="tx1"/>
+          </a:fontRef>
+        </p:style>
+      </p:cxnSp>
+      <p:cxnSp>
+        <p:nvCxnSpPr>
+          <p:cNvPr id="78" name="Connector: Elbow 77"/>
+          <p:cNvCxnSpPr>
+            <a:stCxn id="13" idx="2"/>
+            <a:endCxn id="25" idx="0"/>
+          </p:cNvCxnSpPr>
+          <p:nvPr/>
+        </p:nvCxnSpPr>
+        <p:spPr>
+          <a:xfrm rot="5400000">
+            <a:off x="8244966" y="2421949"/>
+            <a:ext cx="783198" cy="2316856"/>
+          </a:xfrm>
+          <a:prstGeom prst="bentConnector3">
+            <a:avLst/>
+          </a:prstGeom>
+          <a:ln>
+            <a:tailEnd type="triangle"/>
+          </a:ln>
+        </p:spPr>
+        <p:style>
+          <a:lnRef idx="1">
+            <a:schemeClr val="accent1"/>
+          </a:lnRef>
+          <a:fillRef idx="0">
+            <a:schemeClr val="accent1"/>
+          </a:fillRef>
+          <a:effectRef idx="0">
+            <a:schemeClr val="accent1"/>
+          </a:effectRef>
+          <a:fontRef idx="minor">
+            <a:schemeClr val="tx1"/>
+          </a:fontRef>
+        </p:style>
+      </p:cxnSp>
+      <p:cxnSp>
+        <p:nvCxnSpPr>
+          <p:cNvPr id="96" name="Connector: Elbow 95"/>
+          <p:cNvCxnSpPr>
+            <a:stCxn id="25" idx="1"/>
+            <a:endCxn id="21" idx="0"/>
+          </p:cNvCxnSpPr>
+          <p:nvPr/>
+        </p:nvCxnSpPr>
+        <p:spPr>
+          <a:xfrm rot="10800000" flipV="1">
+            <a:off x="6466140" y="4210768"/>
+            <a:ext cx="726246" cy="427360"/>
+          </a:xfrm>
+          <a:prstGeom prst="bentConnector2">
+            <a:avLst/>
+          </a:prstGeom>
+          <a:ln>
+            <a:tailEnd type="triangle"/>
+          </a:ln>
+        </p:spPr>
+        <p:style>
+          <a:lnRef idx="1">
+            <a:schemeClr val="accent1"/>
+          </a:lnRef>
+          <a:fillRef idx="0">
+            <a:schemeClr val="accent1"/>
+          </a:fillRef>
+          <a:effectRef idx="0">
+            <a:schemeClr val="accent1"/>
+          </a:effectRef>
+          <a:fontRef idx="minor">
+            <a:schemeClr val="tx1"/>
+          </a:fontRef>
+        </p:style>
+      </p:cxnSp>
+      <p:cxnSp>
+        <p:nvCxnSpPr>
+          <p:cNvPr id="98" name="Connector: Elbow 97"/>
+          <p:cNvCxnSpPr>
+            <a:stCxn id="25" idx="3"/>
+            <a:endCxn id="14" idx="0"/>
+          </p:cNvCxnSpPr>
+          <p:nvPr/>
+        </p:nvCxnSpPr>
+        <p:spPr>
+          <a:xfrm>
+            <a:off x="7763887" y="4210768"/>
+            <a:ext cx="1045923" cy="487392"/>
+          </a:xfrm>
+          <a:prstGeom prst="bentConnector2">
+            <a:avLst/>
+          </a:prstGeom>
+          <a:ln>
+            <a:tailEnd type="triangle"/>
+          </a:ln>
+        </p:spPr>
+        <p:style>
+          <a:lnRef idx="1">
+            <a:schemeClr val="accent1"/>
+          </a:lnRef>
+          <a:fillRef idx="0">
+            <a:schemeClr val="accent1"/>
+          </a:fillRef>
+          <a:effectRef idx="0">
+            <a:schemeClr val="accent1"/>
+          </a:effectRef>
+          <a:fontRef idx="minor">
+            <a:schemeClr val="tx1"/>
+          </a:fontRef>
+        </p:style>
+      </p:cxnSp>
+      <p:cxnSp>
+        <p:nvCxnSpPr>
+          <p:cNvPr id="104" name="Connector: Elbow 103"/>
+          <p:cNvCxnSpPr/>
+          <p:nvPr/>
+        </p:nvCxnSpPr>
+        <p:spPr>
+          <a:xfrm rot="5400000">
+            <a:off x="6371749" y="1541407"/>
+            <a:ext cx="2953702" cy="6693596"/>
+          </a:xfrm>
+          <a:prstGeom prst="bentConnector2">
+            <a:avLst/>
+          </a:prstGeom>
+          <a:ln>
+            <a:tailEnd type="triangle"/>
+          </a:ln>
+        </p:spPr>
+        <p:style>
+          <a:lnRef idx="1">
+            <a:schemeClr val="accent1"/>
+          </a:lnRef>
+          <a:fillRef idx="0">
+            <a:schemeClr val="accent1"/>
+          </a:fillRef>
+          <a:effectRef idx="0">
+            <a:schemeClr val="accent1"/>
+          </a:effectRef>
+          <a:fontRef idx="minor">
+            <a:schemeClr val="tx1"/>
+          </a:fontRef>
+        </p:style>
+      </p:cxnSp>
+      <p:cxnSp>
+        <p:nvCxnSpPr>
+          <p:cNvPr id="110" name="Connector: Elbow 109"/>
+          <p:cNvCxnSpPr>
+            <a:stCxn id="27" idx="2"/>
+            <a:endCxn id="28" idx="0"/>
+          </p:cNvCxnSpPr>
+          <p:nvPr/>
+        </p:nvCxnSpPr>
+        <p:spPr>
+          <a:xfrm rot="5400000">
+            <a:off x="4059823" y="6772816"/>
+            <a:ext cx="313555" cy="10909"/>
+          </a:xfrm>
+          <a:prstGeom prst="bentConnector3">
+            <a:avLst/>
+          </a:prstGeom>
+          <a:ln>
+            <a:tailEnd type="triangle"/>
+          </a:ln>
+        </p:spPr>
+        <p:style>
+          <a:lnRef idx="1">
+            <a:schemeClr val="accent1"/>
+          </a:lnRef>
+          <a:fillRef idx="0">
+            <a:schemeClr val="accent1"/>
+          </a:fillRef>
+          <a:effectRef idx="0">
+            <a:schemeClr val="accent1"/>
+          </a:effectRef>
+          <a:fontRef idx="minor">
+            <a:schemeClr val="tx1"/>
+          </a:fontRef>
+        </p:style>
+      </p:cxnSp>
+      <p:cxnSp>
+        <p:nvCxnSpPr>
+          <p:cNvPr id="31" name="Connector: Elbow 30"/>
+          <p:cNvCxnSpPr>
+            <a:stCxn id="30" idx="2"/>
+            <a:endCxn id="7" idx="0"/>
+          </p:cNvCxnSpPr>
+          <p:nvPr/>
+        </p:nvCxnSpPr>
+        <p:spPr>
+          <a:xfrm rot="5400000">
+            <a:off x="1515360" y="-641435"/>
+            <a:ext cx="426697" cy="5953286"/>
+          </a:xfrm>
+          <a:prstGeom prst="bentConnector3">
+            <a:avLst>
+              <a:gd name="adj1" fmla="val 5967"/>
+            </a:avLst>
+          </a:prstGeom>
+          <a:ln>
+            <a:tailEnd type="triangle"/>
+          </a:ln>
+        </p:spPr>
+        <p:style>
+          <a:lnRef idx="1">
+            <a:schemeClr val="accent1"/>
+          </a:lnRef>
+          <a:fillRef idx="0">
+            <a:schemeClr val="accent1"/>
+          </a:fillRef>
+          <a:effectRef idx="0">
+            <a:schemeClr val="accent1"/>
+          </a:effectRef>
+          <a:fontRef idx="minor">
+            <a:schemeClr val="tx1"/>
+          </a:fontRef>
+        </p:style>
+      </p:cxnSp>
+      <p:cxnSp>
+        <p:nvCxnSpPr>
+          <p:cNvPr id="39" name="Straight Arrow Connector 38"/>
+          <p:cNvCxnSpPr>
+            <a:stCxn id="7" idx="2"/>
+            <a:endCxn id="24" idx="0"/>
+          </p:cNvCxnSpPr>
+          <p:nvPr/>
+        </p:nvCxnSpPr>
+        <p:spPr>
+          <a:xfrm>
+            <a:off x="-1247935" y="3242968"/>
+            <a:ext cx="0" cy="250969"/>
+          </a:xfrm>
+          <a:prstGeom prst="straightConnector1">
+            <a:avLst/>
+          </a:prstGeom>
+          <a:ln>
+            <a:tailEnd type="triangle"/>
+          </a:ln>
+        </p:spPr>
+        <p:style>
+          <a:lnRef idx="1">
+            <a:schemeClr val="accent1"/>
+          </a:lnRef>
+          <a:fillRef idx="0">
+            <a:schemeClr val="accent1"/>
+          </a:fillRef>
+          <a:effectRef idx="0">
+            <a:schemeClr val="accent1"/>
+          </a:effectRef>
+          <a:fontRef idx="minor">
+            <a:schemeClr val="tx1"/>
+          </a:fontRef>
+        </p:style>
+      </p:cxnSp>
+      <p:cxnSp>
+        <p:nvCxnSpPr>
+          <p:cNvPr id="42" name="Connector: Elbow 41"/>
+          <p:cNvCxnSpPr>
+            <a:stCxn id="24" idx="2"/>
+            <a:endCxn id="16" idx="0"/>
+          </p:cNvCxnSpPr>
+          <p:nvPr/>
+        </p:nvCxnSpPr>
+        <p:spPr>
+          <a:xfrm rot="5400000">
+            <a:off x="-1833999" y="3725848"/>
+            <a:ext cx="340392" cy="831736"/>
+          </a:xfrm>
+          <a:prstGeom prst="bentConnector3">
+            <a:avLst/>
+          </a:prstGeom>
+          <a:ln>
+            <a:tailEnd type="triangle"/>
+          </a:ln>
+        </p:spPr>
+        <p:style>
+          <a:lnRef idx="1">
+            <a:schemeClr val="accent1"/>
+          </a:lnRef>
+          <a:fillRef idx="0">
+            <a:schemeClr val="accent1"/>
+          </a:fillRef>
+          <a:effectRef idx="0">
+            <a:schemeClr val="accent1"/>
+          </a:effectRef>
+          <a:fontRef idx="minor">
+            <a:schemeClr val="tx1"/>
+          </a:fontRef>
+        </p:style>
+      </p:cxnSp>
+      <p:cxnSp>
+        <p:nvCxnSpPr>
+          <p:cNvPr id="45" name="Connector: Elbow 44"/>
+          <p:cNvCxnSpPr>
+            <a:stCxn id="24" idx="2"/>
+            <a:endCxn id="23" idx="0"/>
+          </p:cNvCxnSpPr>
+          <p:nvPr/>
+        </p:nvCxnSpPr>
+        <p:spPr>
+          <a:xfrm rot="16200000" flipH="1">
+            <a:off x="-966143" y="3689727"/>
+            <a:ext cx="295680" cy="859265"/>
+          </a:xfrm>
+          <a:prstGeom prst="bentConnector3">
+            <a:avLst>
+              <a:gd name="adj1" fmla="val 58473"/>
+            </a:avLst>
+          </a:prstGeom>
+          <a:ln>
+            <a:tailEnd type="triangle"/>
+          </a:ln>
+        </p:spPr>
+        <p:style>
+          <a:lnRef idx="1">
+            <a:schemeClr val="accent1"/>
+          </a:lnRef>
+          <a:fillRef idx="0">
+            <a:schemeClr val="accent1"/>
+          </a:fillRef>
+          <a:effectRef idx="0">
+            <a:schemeClr val="accent1"/>
+          </a:effectRef>
+          <a:fontRef idx="minor">
+            <a:schemeClr val="tx1"/>
+          </a:fontRef>
+        </p:style>
+      </p:cxnSp>
+      <p:cxnSp>
+        <p:nvCxnSpPr>
+          <p:cNvPr id="57" name="Straight Arrow Connector 56"/>
+          <p:cNvCxnSpPr>
+            <a:stCxn id="2" idx="3"/>
+            <a:endCxn id="3" idx="1"/>
+          </p:cNvCxnSpPr>
+          <p:nvPr/>
+        </p:nvCxnSpPr>
+        <p:spPr>
+          <a:xfrm>
+            <a:off x="1555384" y="946630"/>
+            <a:ext cx="1721216" cy="5870"/>
+          </a:xfrm>
+          <a:prstGeom prst="straightConnector1">
+            <a:avLst/>
+          </a:prstGeom>
+          <a:ln>
+            <a:tailEnd type="triangle"/>
+          </a:ln>
+        </p:spPr>
+        <p:style>
+          <a:lnRef idx="1">
+            <a:schemeClr val="accent1"/>
+          </a:lnRef>
+          <a:fillRef idx="0">
+            <a:schemeClr val="accent1"/>
+          </a:fillRef>
+          <a:effectRef idx="0">
+            <a:schemeClr val="accent1"/>
+          </a:effectRef>
+          <a:fontRef idx="minor">
+            <a:schemeClr val="tx1"/>
+          </a:fontRef>
+        </p:style>
+      </p:cxnSp>
+      <p:sp>
+        <p:nvSpPr>
+          <p:cNvPr id="79" name="Diamond 78"/>
+          <p:cNvSpPr/>
+          <p:nvPr/>
+        </p:nvSpPr>
+        <p:spPr>
+          <a:xfrm>
+            <a:off x="-1509591" y="5466444"/>
+            <a:ext cx="571501" cy="477583"/>
+          </a:xfrm>
+          <a:prstGeom prst="diamond">
+            <a:avLst/>
+          </a:prstGeom>
+          <a:solidFill>
+            <a:srgbClr val="FFFF00"/>
+          </a:solidFill>
+        </p:spPr>
+        <p:style>
+          <a:lnRef idx="2">
+            <a:schemeClr val="accent1">
+              <a:shade val="50000"/>
+            </a:schemeClr>
+          </a:lnRef>
+          <a:fillRef idx="1">
+            <a:schemeClr val="accent1"/>
+          </a:fillRef>
+          <a:effectRef idx="0">
+            <a:schemeClr val="accent1"/>
+          </a:effectRef>
+          <a:fontRef idx="minor">
+            <a:schemeClr val="lt1"/>
+          </a:fontRef>
+        </p:style>
+        <p:txBody>
+          <a:bodyPr rtlCol="0" anchor="ctr"/>
+          <a:lstStyle/>
+          <a:p>
+            <a:pPr algn="ctr"/>
+            <a:endParaRPr lang="en-SG" sz="1400">
+              <a:latin typeface="Verdana" panose="020B0604030504040204" pitchFamily="34" charset="0"/>
+              <a:ea typeface="Verdana" panose="020B0604030504040204" pitchFamily="34" charset="0"/>
+              <a:cs typeface="Verdana" panose="020B0604030504040204" pitchFamily="34" charset="0"/>
+            </a:endParaRPr>
+          </a:p>
+        </p:txBody>
+      </p:sp>
+      <p:sp>
+        <p:nvSpPr>
+          <p:cNvPr id="80" name="Diamond 79"/>
+          <p:cNvSpPr/>
+          <p:nvPr/>
+        </p:nvSpPr>
+        <p:spPr>
+          <a:xfrm>
+            <a:off x="1836845" y="5600116"/>
+            <a:ext cx="571501" cy="477583"/>
+          </a:xfrm>
+          <a:prstGeom prst="diamond">
+            <a:avLst/>
+          </a:prstGeom>
+          <a:solidFill>
+            <a:srgbClr val="FFFF00"/>
+          </a:solidFill>
+        </p:spPr>
+        <p:style>
+          <a:lnRef idx="2">
+            <a:schemeClr val="accent1">
+              <a:shade val="50000"/>
+            </a:schemeClr>
+          </a:lnRef>
+          <a:fillRef idx="1">
+            <a:schemeClr val="accent1"/>
+          </a:fillRef>
+          <a:effectRef idx="0">
+            <a:schemeClr val="accent1"/>
+          </a:effectRef>
+          <a:fontRef idx="minor">
+            <a:schemeClr val="lt1"/>
+          </a:fontRef>
+        </p:style>
+        <p:txBody>
+          <a:bodyPr rtlCol="0" anchor="ctr"/>
+          <a:lstStyle/>
+          <a:p>
+            <a:pPr algn="ctr"/>
+            <a:endParaRPr lang="en-SG" sz="1400">
+              <a:latin typeface="Verdana" panose="020B0604030504040204" pitchFamily="34" charset="0"/>
+              <a:ea typeface="Verdana" panose="020B0604030504040204" pitchFamily="34" charset="0"/>
+              <a:cs typeface="Verdana" panose="020B0604030504040204" pitchFamily="34" charset="0"/>
+            </a:endParaRPr>
+          </a:p>
+        </p:txBody>
+      </p:sp>
+      <p:sp>
+        <p:nvSpPr>
+          <p:cNvPr id="81" name="Diamond 80"/>
+          <p:cNvSpPr/>
+          <p:nvPr/>
+        </p:nvSpPr>
+        <p:spPr>
+          <a:xfrm>
+            <a:off x="7279957" y="5628512"/>
+            <a:ext cx="571501" cy="477583"/>
+          </a:xfrm>
+          <a:prstGeom prst="diamond">
+            <a:avLst/>
+          </a:prstGeom>
+          <a:solidFill>
+            <a:srgbClr val="FFFF00"/>
+          </a:solidFill>
+        </p:spPr>
+        <p:style>
+          <a:lnRef idx="2">
+            <a:schemeClr val="accent1">
+              <a:shade val="50000"/>
+            </a:schemeClr>
+          </a:lnRef>
+          <a:fillRef idx="1">
+            <a:schemeClr val="accent1"/>
+          </a:fillRef>
+          <a:effectRef idx="0">
+            <a:schemeClr val="accent1"/>
+          </a:effectRef>
+          <a:fontRef idx="minor">
+            <a:schemeClr val="lt1"/>
+          </a:fontRef>
+        </p:style>
+        <p:txBody>
+          <a:bodyPr rtlCol="0" anchor="ctr"/>
+          <a:lstStyle/>
+          <a:p>
+            <a:pPr algn="ctr"/>
+            <a:endParaRPr lang="en-SG" sz="1400">
+              <a:latin typeface="Verdana" panose="020B0604030504040204" pitchFamily="34" charset="0"/>
+              <a:ea typeface="Verdana" panose="020B0604030504040204" pitchFamily="34" charset="0"/>
+              <a:cs typeface="Verdana" panose="020B0604030504040204" pitchFamily="34" charset="0"/>
+            </a:endParaRPr>
+          </a:p>
+        </p:txBody>
+      </p:sp>
+      <p:cxnSp>
+        <p:nvCxnSpPr>
+          <p:cNvPr id="64" name="Connector: Elbow 63"/>
+          <p:cNvCxnSpPr>
+            <a:stCxn id="18" idx="2"/>
+            <a:endCxn id="80" idx="1"/>
+          </p:cNvCxnSpPr>
+          <p:nvPr/>
+        </p:nvCxnSpPr>
+        <p:spPr>
+          <a:xfrm rot="16200000" flipH="1">
+            <a:off x="1367220" y="5369283"/>
+            <a:ext cx="526672" cy="412577"/>
+          </a:xfrm>
+          <a:prstGeom prst="bentConnector2">
+            <a:avLst/>
+          </a:prstGeom>
+          <a:ln>
+            <a:tailEnd type="triangle"/>
+          </a:ln>
+        </p:spPr>
+        <p:style>
+          <a:lnRef idx="1">
+            <a:schemeClr val="accent1"/>
+          </a:lnRef>
+          <a:fillRef idx="0">
+            <a:schemeClr val="accent1"/>
+          </a:fillRef>
+          <a:effectRef idx="0">
+            <a:schemeClr val="accent1"/>
+          </a:effectRef>
+          <a:fontRef idx="minor">
+            <a:schemeClr val="tx1"/>
+          </a:fontRef>
+        </p:style>
+      </p:cxnSp>
+      <p:cxnSp>
+        <p:nvCxnSpPr>
+          <p:cNvPr id="84" name="Connector: Elbow 83"/>
+          <p:cNvCxnSpPr>
+            <a:stCxn id="22" idx="2"/>
+            <a:endCxn id="80" idx="3"/>
+          </p:cNvCxnSpPr>
+          <p:nvPr/>
+        </p:nvCxnSpPr>
+        <p:spPr>
+          <a:xfrm rot="5400000">
+            <a:off x="2548740" y="5498407"/>
+            <a:ext cx="200108" cy="480895"/>
+          </a:xfrm>
+          <a:prstGeom prst="bentConnector2">
+            <a:avLst/>
+          </a:prstGeom>
+          <a:ln>
+            <a:tailEnd type="triangle"/>
+          </a:ln>
+        </p:spPr>
+        <p:style>
+          <a:lnRef idx="1">
+            <a:schemeClr val="accent1"/>
+          </a:lnRef>
+          <a:fillRef idx="0">
+            <a:schemeClr val="accent1"/>
+          </a:fillRef>
+          <a:effectRef idx="0">
+            <a:schemeClr val="accent1"/>
+          </a:effectRef>
+          <a:fontRef idx="minor">
+            <a:schemeClr val="tx1"/>
+          </a:fontRef>
+        </p:style>
+      </p:cxnSp>
+      <p:cxnSp>
+        <p:nvCxnSpPr>
+          <p:cNvPr id="88" name="Connector: Elbow 87"/>
+          <p:cNvCxnSpPr>
+            <a:stCxn id="80" idx="2"/>
+            <a:endCxn id="27" idx="1"/>
+          </p:cNvCxnSpPr>
+          <p:nvPr/>
+        </p:nvCxnSpPr>
+        <p:spPr>
+          <a:xfrm rot="16200000" flipH="1">
+            <a:off x="2876948" y="5323346"/>
+            <a:ext cx="305003" cy="1813707"/>
+          </a:xfrm>
+          <a:prstGeom prst="bentConnector2">
+            <a:avLst/>
+          </a:prstGeom>
+          <a:ln>
+            <a:tailEnd type="triangle"/>
+          </a:ln>
+        </p:spPr>
+        <p:style>
+          <a:lnRef idx="1">
+            <a:schemeClr val="accent1"/>
+          </a:lnRef>
+          <a:fillRef idx="0">
+            <a:schemeClr val="accent1"/>
+          </a:fillRef>
+          <a:effectRef idx="0">
+            <a:schemeClr val="accent1"/>
+          </a:effectRef>
+          <a:fontRef idx="minor">
+            <a:schemeClr val="tx1"/>
+          </a:fontRef>
+        </p:style>
+      </p:cxnSp>
+      <p:cxnSp>
+        <p:nvCxnSpPr>
+          <p:cNvPr id="91" name="Connector: Elbow 90"/>
+          <p:cNvCxnSpPr>
+            <a:endCxn id="27" idx="3"/>
+          </p:cNvCxnSpPr>
+          <p:nvPr/>
+        </p:nvCxnSpPr>
+        <p:spPr>
+          <a:xfrm rot="10800000" flipV="1">
+            <a:off x="4507805" y="6070240"/>
+            <a:ext cx="3060033" cy="312461"/>
+          </a:xfrm>
+          <a:prstGeom prst="bentConnector3">
+            <a:avLst>
+              <a:gd name="adj1" fmla="val 469"/>
+            </a:avLst>
+          </a:prstGeom>
+          <a:ln>
+            <a:tailEnd type="triangle"/>
+          </a:ln>
+        </p:spPr>
+        <p:style>
+          <a:lnRef idx="1">
+            <a:schemeClr val="accent1"/>
+          </a:lnRef>
+          <a:fillRef idx="0">
+            <a:schemeClr val="accent1"/>
+          </a:fillRef>
+          <a:effectRef idx="0">
+            <a:schemeClr val="accent1"/>
+          </a:effectRef>
+          <a:fontRef idx="minor">
+            <a:schemeClr val="tx1"/>
+          </a:fontRef>
+        </p:style>
+      </p:cxnSp>
+      <p:cxnSp>
+        <p:nvCxnSpPr>
+          <p:cNvPr id="97" name="Connector: Elbow 96"/>
+          <p:cNvCxnSpPr>
+            <a:stCxn id="16" idx="2"/>
+            <a:endCxn id="79" idx="1"/>
+          </p:cNvCxnSpPr>
+          <p:nvPr/>
+        </p:nvCxnSpPr>
+        <p:spPr>
+          <a:xfrm rot="16200000" flipH="1">
+            <a:off x="-1914027" y="5300800"/>
+            <a:ext cx="238792" cy="570080"/>
+          </a:xfrm>
+          <a:prstGeom prst="bentConnector2">
+            <a:avLst/>
+          </a:prstGeom>
+          <a:ln>
+            <a:tailEnd type="triangle"/>
+          </a:ln>
+        </p:spPr>
+        <p:style>
+          <a:lnRef idx="1">
+            <a:schemeClr val="accent1"/>
+          </a:lnRef>
+          <a:fillRef idx="0">
+            <a:schemeClr val="accent1"/>
+          </a:fillRef>
+          <a:effectRef idx="0">
+            <a:schemeClr val="accent1"/>
+          </a:effectRef>
+          <a:fontRef idx="minor">
+            <a:schemeClr val="tx1"/>
+          </a:fontRef>
+        </p:style>
+      </p:cxnSp>
+      <p:cxnSp>
+        <p:nvCxnSpPr>
+          <p:cNvPr id="99" name="Connector: Elbow 98"/>
+          <p:cNvCxnSpPr>
+            <a:stCxn id="23" idx="2"/>
+            <a:endCxn id="79" idx="3"/>
+          </p:cNvCxnSpPr>
+          <p:nvPr/>
+        </p:nvCxnSpPr>
+        <p:spPr>
+          <a:xfrm rot="5400000">
+            <a:off x="-818189" y="5275716"/>
+            <a:ext cx="309619" cy="549420"/>
+          </a:xfrm>
+          <a:prstGeom prst="bentConnector2">
+            <a:avLst/>
+          </a:prstGeom>
+          <a:ln>
+            <a:tailEnd type="triangle"/>
+          </a:ln>
+        </p:spPr>
+        <p:style>
+          <a:lnRef idx="1">
+            <a:schemeClr val="accent1"/>
+          </a:lnRef>
+          <a:fillRef idx="0">
+            <a:schemeClr val="accent1"/>
+          </a:fillRef>
+          <a:effectRef idx="0">
+            <a:schemeClr val="accent1"/>
+          </a:effectRef>
+          <a:fontRef idx="minor">
+            <a:schemeClr val="tx1"/>
+          </a:fontRef>
+        </p:style>
+      </p:cxnSp>
+      <p:cxnSp>
+        <p:nvCxnSpPr>
+          <p:cNvPr id="103" name="Connector: Elbow 102"/>
+          <p:cNvCxnSpPr/>
+          <p:nvPr/>
+        </p:nvCxnSpPr>
+        <p:spPr>
+          <a:xfrm rot="16200000" flipH="1">
+            <a:off x="1152527" y="3587568"/>
+            <a:ext cx="438675" cy="5160143"/>
+          </a:xfrm>
+          <a:prstGeom prst="bentConnector2">
+            <a:avLst/>
+          </a:prstGeom>
+          <a:ln>
+            <a:tailEnd type="triangle"/>
+          </a:ln>
+        </p:spPr>
+        <p:style>
+          <a:lnRef idx="1">
+            <a:schemeClr val="accent1"/>
+          </a:lnRef>
+          <a:fillRef idx="0">
+            <a:schemeClr val="accent1"/>
+          </a:fillRef>
+          <a:effectRef idx="0">
+            <a:schemeClr val="accent1"/>
+          </a:effectRef>
+          <a:fontRef idx="minor">
+            <a:schemeClr val="tx1"/>
+          </a:fontRef>
+        </p:style>
+      </p:cxnSp>
+      <p:cxnSp>
+        <p:nvCxnSpPr>
+          <p:cNvPr id="101" name="Connector: Elbow 100"/>
+          <p:cNvCxnSpPr>
+            <a:endCxn id="81" idx="1"/>
+          </p:cNvCxnSpPr>
+          <p:nvPr/>
+        </p:nvCxnSpPr>
+        <p:spPr>
+          <a:xfrm>
+            <a:off x="6599198" y="5647200"/>
+            <a:ext cx="680759" cy="220104"/>
+          </a:xfrm>
+          <a:prstGeom prst="bentConnector3">
+            <a:avLst>
+              <a:gd name="adj1" fmla="val 1240"/>
+            </a:avLst>
+          </a:prstGeom>
+          <a:ln>
+            <a:tailEnd type="triangle"/>
+          </a:ln>
+        </p:spPr>
+        <p:style>
+          <a:lnRef idx="1">
+            <a:schemeClr val="accent1"/>
+          </a:lnRef>
+          <a:fillRef idx="0">
+            <a:schemeClr val="accent1"/>
+          </a:fillRef>
+          <a:effectRef idx="0">
+            <a:schemeClr val="accent1"/>
+          </a:effectRef>
+          <a:fontRef idx="minor">
+            <a:schemeClr val="tx1"/>
+          </a:fontRef>
+        </p:style>
+      </p:cxnSp>
+      <p:cxnSp>
+        <p:nvCxnSpPr>
+          <p:cNvPr id="111" name="Connector: Elbow 110"/>
+          <p:cNvCxnSpPr>
+            <a:stCxn id="14" idx="2"/>
+            <a:endCxn id="81" idx="3"/>
+          </p:cNvCxnSpPr>
+          <p:nvPr/>
+        </p:nvCxnSpPr>
+        <p:spPr>
+          <a:xfrm rot="5400000">
+            <a:off x="8181330" y="5238824"/>
+            <a:ext cx="298608" cy="958352"/>
+          </a:xfrm>
+          <a:prstGeom prst="bentConnector2">
+            <a:avLst/>
+          </a:prstGeom>
+          <a:ln>
+            <a:tailEnd type="triangle"/>
+          </a:ln>
+        </p:spPr>
+        <p:style>
+          <a:lnRef idx="1">
+            <a:schemeClr val="accent1"/>
+          </a:lnRef>
+          <a:fillRef idx="0">
+            <a:schemeClr val="accent1"/>
+          </a:fillRef>
+          <a:effectRef idx="0">
+            <a:schemeClr val="accent1"/>
+          </a:effectRef>
+          <a:fontRef idx="minor">
+            <a:schemeClr val="tx1"/>
+          </a:fontRef>
+        </p:style>
+      </p:cxnSp>
     </p:spTree>
     <p:extLst>
       <p:ext uri="{BB962C8B-B14F-4D97-AF65-F5344CB8AC3E}">

</xml_diff>